<commit_message>
Update Building block documentation
</commit_message>
<xml_diff>
--- a/docs/Blocos_de_constru.pptx
+++ b/docs/Blocos_de_constru.pptx
@@ -9,6 +9,7 @@
     <p:sldId id="259" r:id="rId3"/>
     <p:sldId id="257" r:id="rId4"/>
     <p:sldId id="258" r:id="rId5"/>
+    <p:sldId id="260" r:id="rId6"/>
   </p:sldIdLst>
   <p:sldSz cx="11520488" cy="11160125"/>
   <p:notesSz cx="6858000" cy="9144000"/>
@@ -246,7 +247,7 @@
           <a:p>
             <a:fld id="{DBC44DCA-8DCD-44D5-A529-810413827672}" type="datetimeFigureOut">
               <a:rPr lang="pt-BR" smtClean="0"/>
-              <a:t>29/03/2022</a:t>
+              <a:t>23/01/2023</a:t>
             </a:fld>
             <a:endParaRPr lang="pt-BR"/>
           </a:p>
@@ -416,7 +417,7 @@
           <a:p>
             <a:fld id="{DBC44DCA-8DCD-44D5-A529-810413827672}" type="datetimeFigureOut">
               <a:rPr lang="pt-BR" smtClean="0"/>
-              <a:t>29/03/2022</a:t>
+              <a:t>23/01/2023</a:t>
             </a:fld>
             <a:endParaRPr lang="pt-BR"/>
           </a:p>
@@ -596,7 +597,7 @@
           <a:p>
             <a:fld id="{DBC44DCA-8DCD-44D5-A529-810413827672}" type="datetimeFigureOut">
               <a:rPr lang="pt-BR" smtClean="0"/>
-              <a:t>29/03/2022</a:t>
+              <a:t>23/01/2023</a:t>
             </a:fld>
             <a:endParaRPr lang="pt-BR"/>
           </a:p>
@@ -766,7 +767,7 @@
           <a:p>
             <a:fld id="{DBC44DCA-8DCD-44D5-A529-810413827672}" type="datetimeFigureOut">
               <a:rPr lang="pt-BR" smtClean="0"/>
-              <a:t>29/03/2022</a:t>
+              <a:t>23/01/2023</a:t>
             </a:fld>
             <a:endParaRPr lang="pt-BR"/>
           </a:p>
@@ -1010,7 +1011,7 @@
           <a:p>
             <a:fld id="{DBC44DCA-8DCD-44D5-A529-810413827672}" type="datetimeFigureOut">
               <a:rPr lang="pt-BR" smtClean="0"/>
-              <a:t>29/03/2022</a:t>
+              <a:t>23/01/2023</a:t>
             </a:fld>
             <a:endParaRPr lang="pt-BR"/>
           </a:p>
@@ -1242,7 +1243,7 @@
           <a:p>
             <a:fld id="{DBC44DCA-8DCD-44D5-A529-810413827672}" type="datetimeFigureOut">
               <a:rPr lang="pt-BR" smtClean="0"/>
-              <a:t>29/03/2022</a:t>
+              <a:t>23/01/2023</a:t>
             </a:fld>
             <a:endParaRPr lang="pt-BR"/>
           </a:p>
@@ -1609,7 +1610,7 @@
           <a:p>
             <a:fld id="{DBC44DCA-8DCD-44D5-A529-810413827672}" type="datetimeFigureOut">
               <a:rPr lang="pt-BR" smtClean="0"/>
-              <a:t>29/03/2022</a:t>
+              <a:t>23/01/2023</a:t>
             </a:fld>
             <a:endParaRPr lang="pt-BR"/>
           </a:p>
@@ -1727,7 +1728,7 @@
           <a:p>
             <a:fld id="{DBC44DCA-8DCD-44D5-A529-810413827672}" type="datetimeFigureOut">
               <a:rPr lang="pt-BR" smtClean="0"/>
-              <a:t>29/03/2022</a:t>
+              <a:t>23/01/2023</a:t>
             </a:fld>
             <a:endParaRPr lang="pt-BR"/>
           </a:p>
@@ -1822,7 +1823,7 @@
           <a:p>
             <a:fld id="{DBC44DCA-8DCD-44D5-A529-810413827672}" type="datetimeFigureOut">
               <a:rPr lang="pt-BR" smtClean="0"/>
-              <a:t>29/03/2022</a:t>
+              <a:t>23/01/2023</a:t>
             </a:fld>
             <a:endParaRPr lang="pt-BR"/>
           </a:p>
@@ -2099,7 +2100,7 @@
           <a:p>
             <a:fld id="{DBC44DCA-8DCD-44D5-A529-810413827672}" type="datetimeFigureOut">
               <a:rPr lang="pt-BR" smtClean="0"/>
-              <a:t>29/03/2022</a:t>
+              <a:t>23/01/2023</a:t>
             </a:fld>
             <a:endParaRPr lang="pt-BR"/>
           </a:p>
@@ -2356,7 +2357,7 @@
           <a:p>
             <a:fld id="{DBC44DCA-8DCD-44D5-A529-810413827672}" type="datetimeFigureOut">
               <a:rPr lang="pt-BR" smtClean="0"/>
-              <a:t>29/03/2022</a:t>
+              <a:t>23/01/2023</a:t>
             </a:fld>
             <a:endParaRPr lang="pt-BR"/>
           </a:p>
@@ -2569,7 +2570,7 @@
           <a:p>
             <a:fld id="{DBC44DCA-8DCD-44D5-A529-810413827672}" type="datetimeFigureOut">
               <a:rPr lang="pt-BR" smtClean="0"/>
-              <a:t>29/03/2022</a:t>
+              <a:t>23/01/2023</a:t>
             </a:fld>
             <a:endParaRPr lang="pt-BR"/>
           </a:p>
@@ -3083,12 +3084,12 @@
             <a:graphicData uri="http://schemas.openxmlformats.org/presentationml/2006/ole">
               <mc:AlternateContent xmlns:mc="http://schemas.openxmlformats.org/markup-compatibility/2006">
                 <mc:Choice xmlns:v="urn:schemas-microsoft-com:vml" Requires="v">
-                  <p:oleObj spid="_x0000_s1086" name="CS ChemDraw Drawing" r:id="rId3" imgW="12860827" imgH="4477072" progId="ChemDraw.Document.6.0">
+                  <p:oleObj name="CS ChemDraw Drawing" r:id="rId2" imgW="12860827" imgH="4477072" progId="ChemDraw.Document.6.0">
                     <p:embed/>
                   </p:oleObj>
                 </mc:Choice>
                 <mc:Fallback>
-                  <p:oleObj name="CS ChemDraw Drawing" r:id="rId3" imgW="12860827" imgH="4477072" progId="ChemDraw.Document.6.0">
+                  <p:oleObj name="CS ChemDraw Drawing" r:id="rId2" imgW="12860827" imgH="4477072" progId="ChemDraw.Document.6.0">
                     <p:embed/>
                     <p:pic>
                       <p:nvPicPr>
@@ -3103,7 +3104,7 @@
                         <p:nvPr/>
                       </p:nvPicPr>
                       <p:blipFill>
-                        <a:blip r:embed="rId4"/>
+                        <a:blip r:embed="rId3"/>
                         <a:stretch>
                           <a:fillRect/>
                         </a:stretch>
@@ -4622,12 +4623,12 @@
             <a:graphicData uri="http://schemas.openxmlformats.org/presentationml/2006/ole">
               <mc:AlternateContent xmlns:mc="http://schemas.openxmlformats.org/markup-compatibility/2006">
                 <mc:Choice xmlns:v="urn:schemas-microsoft-com:vml" Requires="v">
-                  <p:oleObj spid="_x0000_s1087" name="CS ChemDraw Drawing" r:id="rId5" imgW="6109345" imgH="7438248" progId="ChemDraw.Document.6.0">
+                  <p:oleObj name="CS ChemDraw Drawing" r:id="rId4" imgW="6109345" imgH="7438248" progId="ChemDraw.Document.6.0">
                     <p:embed/>
                   </p:oleObj>
                 </mc:Choice>
                 <mc:Fallback>
-                  <p:oleObj name="CS ChemDraw Drawing" r:id="rId5" imgW="6109345" imgH="7438248" progId="ChemDraw.Document.6.0">
+                  <p:oleObj name="CS ChemDraw Drawing" r:id="rId4" imgW="6109345" imgH="7438248" progId="ChemDraw.Document.6.0">
                     <p:embed/>
                     <p:pic>
                       <p:nvPicPr>
@@ -4642,7 +4643,7 @@
                         <p:nvPr/>
                       </p:nvPicPr>
                       <p:blipFill>
-                        <a:blip r:embed="rId6"/>
+                        <a:blip r:embed="rId5"/>
                         <a:stretch>
                           <a:fillRect/>
                         </a:stretch>
@@ -5363,12 +5364,12 @@
             <a:graphicData uri="http://schemas.openxmlformats.org/presentationml/2006/ole">
               <mc:AlternateContent xmlns:mc="http://schemas.openxmlformats.org/markup-compatibility/2006">
                 <mc:Choice xmlns:v="urn:schemas-microsoft-com:vml" Requires="v">
-                  <p:oleObj spid="_x0000_s1088" name="CS ChemDraw Drawing" r:id="rId7" imgW="4958553" imgH="6260204" progId="ChemDraw.Document.6.0">
+                  <p:oleObj name="CS ChemDraw Drawing" r:id="rId6" imgW="4958553" imgH="6260204" progId="ChemDraw.Document.6.0">
                     <p:embed/>
                   </p:oleObj>
                 </mc:Choice>
                 <mc:Fallback>
-                  <p:oleObj name="CS ChemDraw Drawing" r:id="rId7" imgW="4958553" imgH="6260204" progId="ChemDraw.Document.6.0">
+                  <p:oleObj name="CS ChemDraw Drawing" r:id="rId6" imgW="4958553" imgH="6260204" progId="ChemDraw.Document.6.0">
                     <p:embed/>
                     <p:pic>
                       <p:nvPicPr>
@@ -5383,7 +5384,7 @@
                         <p:nvPr/>
                       </p:nvPicPr>
                       <p:blipFill>
-                        <a:blip r:embed="rId8"/>
+                        <a:blip r:embed="rId7"/>
                         <a:stretch>
                           <a:fillRect/>
                         </a:stretch>
@@ -6094,12 +6095,12 @@
             <a:graphicData uri="http://schemas.openxmlformats.org/presentationml/2006/ole">
               <mc:AlternateContent xmlns:mc="http://schemas.openxmlformats.org/markup-compatibility/2006">
                 <mc:Choice xmlns:v="urn:schemas-microsoft-com:vml" Requires="v">
-                  <p:oleObj spid="_x0000_s1089" name="CS ChemDraw Drawing" r:id="rId9" imgW="415599" imgH="176326" progId="ChemDraw.Document.6.0">
+                  <p:oleObj name="CS ChemDraw Drawing" r:id="rId8" imgW="415599" imgH="176326" progId="ChemDraw.Document.6.0">
                     <p:embed/>
                   </p:oleObj>
                 </mc:Choice>
                 <mc:Fallback>
-                  <p:oleObj name="CS ChemDraw Drawing" r:id="rId9" imgW="415599" imgH="176326" progId="ChemDraw.Document.6.0">
+                  <p:oleObj name="CS ChemDraw Drawing" r:id="rId8" imgW="415599" imgH="176326" progId="ChemDraw.Document.6.0">
                     <p:embed/>
                     <p:pic>
                       <p:nvPicPr>
@@ -6114,7 +6115,7 @@
                         <p:nvPr/>
                       </p:nvPicPr>
                       <p:blipFill>
-                        <a:blip r:embed="rId10"/>
+                        <a:blip r:embed="rId9"/>
                         <a:stretch>
                           <a:fillRect/>
                         </a:stretch>
@@ -6163,12 +6164,12 @@
             <a:graphicData uri="http://schemas.openxmlformats.org/presentationml/2006/ole">
               <mc:AlternateContent xmlns:mc="http://schemas.openxmlformats.org/markup-compatibility/2006">
                 <mc:Choice xmlns:v="urn:schemas-microsoft-com:vml" Requires="v">
-                  <p:oleObj spid="_x0000_s1090" name="CS ChemDraw Drawing" r:id="rId11" imgW="367175" imgH="467665" progId="ChemDraw.Document.6.0">
+                  <p:oleObj name="CS ChemDraw Drawing" r:id="rId10" imgW="367175" imgH="467665" progId="ChemDraw.Document.6.0">
                     <p:embed/>
                   </p:oleObj>
                 </mc:Choice>
                 <mc:Fallback>
-                  <p:oleObj name="CS ChemDraw Drawing" r:id="rId11" imgW="367175" imgH="467665" progId="ChemDraw.Document.6.0">
+                  <p:oleObj name="CS ChemDraw Drawing" r:id="rId10" imgW="367175" imgH="467665" progId="ChemDraw.Document.6.0">
                     <p:embed/>
                     <p:pic>
                       <p:nvPicPr>
@@ -6183,7 +6184,7 @@
                         <p:nvPr/>
                       </p:nvPicPr>
                       <p:blipFill>
-                        <a:blip r:embed="rId12"/>
+                        <a:blip r:embed="rId11"/>
                         <a:stretch>
                           <a:fillRect/>
                         </a:stretch>
@@ -6232,12 +6233,12 @@
             <a:graphicData uri="http://schemas.openxmlformats.org/presentationml/2006/ole">
               <mc:AlternateContent xmlns:mc="http://schemas.openxmlformats.org/markup-compatibility/2006">
                 <mc:Choice xmlns:v="urn:schemas-microsoft-com:vml" Requires="v">
-                  <p:oleObj spid="_x0000_s1091" name="CS ChemDraw Drawing" r:id="rId13" imgW="458548" imgH="468934" progId="ChemDraw.Document.6.0">
+                  <p:oleObj name="CS ChemDraw Drawing" r:id="rId12" imgW="458548" imgH="468934" progId="ChemDraw.Document.6.0">
                     <p:embed/>
                   </p:oleObj>
                 </mc:Choice>
                 <mc:Fallback>
-                  <p:oleObj name="CS ChemDraw Drawing" r:id="rId13" imgW="458548" imgH="468934" progId="ChemDraw.Document.6.0">
+                  <p:oleObj name="CS ChemDraw Drawing" r:id="rId12" imgW="458548" imgH="468934" progId="ChemDraw.Document.6.0">
                     <p:embed/>
                     <p:pic>
                       <p:nvPicPr>
@@ -6252,7 +6253,7 @@
                         <p:nvPr/>
                       </p:nvPicPr>
                       <p:blipFill>
-                        <a:blip r:embed="rId14"/>
+                        <a:blip r:embed="rId13"/>
                         <a:stretch>
                           <a:fillRect/>
                         </a:stretch>
@@ -6301,12 +6302,12 @@
             <a:graphicData uri="http://schemas.openxmlformats.org/presentationml/2006/ole">
               <mc:AlternateContent xmlns:mc="http://schemas.openxmlformats.org/markup-compatibility/2006">
                 <mc:Choice xmlns:v="urn:schemas-microsoft-com:vml" Requires="v">
-                  <p:oleObj spid="_x0000_s1092" name="CS ChemDraw Drawing" r:id="rId15" imgW="363807" imgH="152224" progId="ChemDraw.Document.6.0">
+                  <p:oleObj name="CS ChemDraw Drawing" r:id="rId14" imgW="363807" imgH="152224" progId="ChemDraw.Document.6.0">
                     <p:embed/>
                   </p:oleObj>
                 </mc:Choice>
                 <mc:Fallback>
-                  <p:oleObj name="CS ChemDraw Drawing" r:id="rId15" imgW="363807" imgH="152224" progId="ChemDraw.Document.6.0">
+                  <p:oleObj name="CS ChemDraw Drawing" r:id="rId14" imgW="363807" imgH="152224" progId="ChemDraw.Document.6.0">
                     <p:embed/>
                     <p:pic>
                       <p:nvPicPr>
@@ -6321,7 +6322,7 @@
                         <p:nvPr/>
                       </p:nvPicPr>
                       <p:blipFill>
-                        <a:blip r:embed="rId16"/>
+                        <a:blip r:embed="rId15"/>
                         <a:stretch>
                           <a:fillRect/>
                         </a:stretch>
@@ -6370,12 +6371,12 @@
             <a:graphicData uri="http://schemas.openxmlformats.org/presentationml/2006/ole">
               <mc:AlternateContent xmlns:mc="http://schemas.openxmlformats.org/markup-compatibility/2006">
                 <mc:Choice xmlns:v="urn:schemas-microsoft-com:vml" Requires="v">
-                  <p:oleObj spid="_x0000_s1093" name="CS ChemDraw Drawing" r:id="rId17" imgW="508656" imgH="307408" progId="ChemDraw.Document.6.0">
+                  <p:oleObj name="CS ChemDraw Drawing" r:id="rId16" imgW="508656" imgH="307408" progId="ChemDraw.Document.6.0">
                     <p:embed/>
                   </p:oleObj>
                 </mc:Choice>
                 <mc:Fallback>
-                  <p:oleObj name="CS ChemDraw Drawing" r:id="rId17" imgW="508656" imgH="307408" progId="ChemDraw.Document.6.0">
+                  <p:oleObj name="CS ChemDraw Drawing" r:id="rId16" imgW="508656" imgH="307408" progId="ChemDraw.Document.6.0">
                     <p:embed/>
                     <p:pic>
                       <p:nvPicPr>
@@ -6390,7 +6391,7 @@
                         <p:nvPr/>
                       </p:nvPicPr>
                       <p:blipFill>
-                        <a:blip r:embed="rId18"/>
+                        <a:blip r:embed="rId17"/>
                         <a:stretch>
                           <a:fillRect/>
                         </a:stretch>
@@ -6439,12 +6440,12 @@
             <a:graphicData uri="http://schemas.openxmlformats.org/presentationml/2006/ole">
               <mc:AlternateContent xmlns:mc="http://schemas.openxmlformats.org/markup-compatibility/2006">
                 <mc:Choice xmlns:v="urn:schemas-microsoft-com:vml" Requires="v">
-                  <p:oleObj spid="_x0000_s1094" name="CS ChemDraw Drawing" r:id="rId19" imgW="310752" imgH="148841" progId="ChemDraw.Document.6.0">
+                  <p:oleObj name="CS ChemDraw Drawing" r:id="rId18" imgW="310752" imgH="148841" progId="ChemDraw.Document.6.0">
                     <p:embed/>
                   </p:oleObj>
                 </mc:Choice>
                 <mc:Fallback>
-                  <p:oleObj name="CS ChemDraw Drawing" r:id="rId19" imgW="310752" imgH="148841" progId="ChemDraw.Document.6.0">
+                  <p:oleObj name="CS ChemDraw Drawing" r:id="rId18" imgW="310752" imgH="148841" progId="ChemDraw.Document.6.0">
                     <p:embed/>
                     <p:pic>
                       <p:nvPicPr>
@@ -6459,7 +6460,7 @@
                         <p:nvPr/>
                       </p:nvPicPr>
                       <p:blipFill>
-                        <a:blip r:embed="rId20"/>
+                        <a:blip r:embed="rId19"/>
                         <a:stretch>
                           <a:fillRect/>
                         </a:stretch>
@@ -6508,12 +6509,12 @@
             <a:graphicData uri="http://schemas.openxmlformats.org/presentationml/2006/ole">
               <mc:AlternateContent xmlns:mc="http://schemas.openxmlformats.org/markup-compatibility/2006">
                 <mc:Choice xmlns:v="urn:schemas-microsoft-com:vml" Requires="v">
-                  <p:oleObj spid="_x0000_s1095" name="CS ChemDraw Drawing" r:id="rId21" imgW="690138" imgH="467665" progId="ChemDraw.Document.6.0">
+                  <p:oleObj name="CS ChemDraw Drawing" r:id="rId20" imgW="690138" imgH="467665" progId="ChemDraw.Document.6.0">
                     <p:embed/>
                   </p:oleObj>
                 </mc:Choice>
                 <mc:Fallback>
-                  <p:oleObj name="CS ChemDraw Drawing" r:id="rId21" imgW="690138" imgH="467665" progId="ChemDraw.Document.6.0">
+                  <p:oleObj name="CS ChemDraw Drawing" r:id="rId20" imgW="690138" imgH="467665" progId="ChemDraw.Document.6.0">
                     <p:embed/>
                     <p:pic>
                       <p:nvPicPr>
@@ -6528,7 +6529,7 @@
                         <p:nvPr/>
                       </p:nvPicPr>
                       <p:blipFill>
-                        <a:blip r:embed="rId22"/>
+                        <a:blip r:embed="rId21"/>
                         <a:stretch>
                           <a:fillRect/>
                         </a:stretch>
@@ -7672,12 +7673,12 @@
           <a:graphicData uri="http://schemas.openxmlformats.org/presentationml/2006/ole">
             <mc:AlternateContent xmlns:mc="http://schemas.openxmlformats.org/markup-compatibility/2006">
               <mc:Choice xmlns:v="urn:schemas-microsoft-com:vml" Requires="v">
-                <p:oleObj spid="_x0000_s4118" name="CS ChemDraw Drawing" r:id="rId3" imgW="796670" imgH="4294403" progId="ChemDraw.Document.6.0">
+                <p:oleObj name="CS ChemDraw Drawing" r:id="rId2" imgW="796670" imgH="4294403" progId="ChemDraw.Document.6.0">
                   <p:embed/>
                 </p:oleObj>
               </mc:Choice>
               <mc:Fallback>
-                <p:oleObj name="CS ChemDraw Drawing" r:id="rId3" imgW="796670" imgH="4294403" progId="ChemDraw.Document.6.0">
+                <p:oleObj name="CS ChemDraw Drawing" r:id="rId2" imgW="796670" imgH="4294403" progId="ChemDraw.Document.6.0">
                   <p:embed/>
                   <p:pic>
                     <p:nvPicPr>
@@ -7686,7 +7687,7 @@
                       <p:nvPr/>
                     </p:nvPicPr>
                     <p:blipFill>
-                      <a:blip r:embed="rId4"/>
+                      <a:blip r:embed="rId3"/>
                       <a:stretch>
                         <a:fillRect/>
                       </a:stretch>
@@ -8155,12 +8156,12 @@
           <a:graphicData uri="http://schemas.openxmlformats.org/presentationml/2006/ole">
             <mc:AlternateContent xmlns:mc="http://schemas.openxmlformats.org/markup-compatibility/2006">
               <mc:Choice xmlns:v="urn:schemas-microsoft-com:vml" Requires="v">
-                <p:oleObj spid="_x0000_s4119" name="CS ChemDraw Drawing" r:id="rId5" imgW="626135" imgH="4382777" progId="ChemDraw.Document.6.0">
+                <p:oleObj name="CS ChemDraw Drawing" r:id="rId4" imgW="626135" imgH="4382777" progId="ChemDraw.Document.6.0">
                   <p:embed/>
                 </p:oleObj>
               </mc:Choice>
               <mc:Fallback>
-                <p:oleObj name="CS ChemDraw Drawing" r:id="rId5" imgW="626135" imgH="4382777" progId="ChemDraw.Document.6.0">
+                <p:oleObj name="CS ChemDraw Drawing" r:id="rId4" imgW="626135" imgH="4382777" progId="ChemDraw.Document.6.0">
                   <p:embed/>
                   <p:pic>
                     <p:nvPicPr>
@@ -8169,7 +8170,7 @@
                       <p:nvPr/>
                     </p:nvPicPr>
                     <p:blipFill>
-                      <a:blip r:embed="rId6"/>
+                      <a:blip r:embed="rId5"/>
                       <a:stretch>
                         <a:fillRect/>
                       </a:stretch>
@@ -9128,12 +9129,12 @@
           <a:graphicData uri="http://schemas.openxmlformats.org/presentationml/2006/ole">
             <mc:AlternateContent xmlns:mc="http://schemas.openxmlformats.org/markup-compatibility/2006">
               <mc:Choice xmlns:v="urn:schemas-microsoft-com:vml" Requires="v">
-                <p:oleObj spid="_x0000_s4120" name="CS ChemDraw Drawing" r:id="rId7" imgW="572238" imgH="4277489" progId="ChemDraw.Document.6.0">
+                <p:oleObj name="CS ChemDraw Drawing" r:id="rId6" imgW="572238" imgH="4277489" progId="ChemDraw.Document.6.0">
                   <p:embed/>
                 </p:oleObj>
               </mc:Choice>
               <mc:Fallback>
-                <p:oleObj name="CS ChemDraw Drawing" r:id="rId7" imgW="572238" imgH="4277489" progId="ChemDraw.Document.6.0">
+                <p:oleObj name="CS ChemDraw Drawing" r:id="rId6" imgW="572238" imgH="4277489" progId="ChemDraw.Document.6.0">
                   <p:embed/>
                   <p:pic>
                     <p:nvPicPr>
@@ -9142,7 +9143,7 @@
                       <p:nvPr/>
                     </p:nvPicPr>
                     <p:blipFill>
-                      <a:blip r:embed="rId8"/>
+                      <a:blip r:embed="rId7"/>
                       <a:stretch>
                         <a:fillRect/>
                       </a:stretch>
@@ -9191,12 +9192,12 @@
           <a:graphicData uri="http://schemas.openxmlformats.org/presentationml/2006/ole">
             <mc:AlternateContent xmlns:mc="http://schemas.openxmlformats.org/markup-compatibility/2006">
               <mc:Choice xmlns:v="urn:schemas-microsoft-com:vml" Requires="v">
-                <p:oleObj spid="_x0000_s4121" name="CS ChemDraw Drawing" r:id="rId9" imgW="839619" imgH="2405982" progId="ChemDraw.Document.6.0">
+                <p:oleObj name="CS ChemDraw Drawing" r:id="rId8" imgW="839619" imgH="2405982" progId="ChemDraw.Document.6.0">
                   <p:embed/>
                 </p:oleObj>
               </mc:Choice>
               <mc:Fallback>
-                <p:oleObj name="CS ChemDraw Drawing" r:id="rId9" imgW="839619" imgH="2405982" progId="ChemDraw.Document.6.0">
+                <p:oleObj name="CS ChemDraw Drawing" r:id="rId8" imgW="839619" imgH="2405982" progId="ChemDraw.Document.6.0">
                   <p:embed/>
                   <p:pic>
                     <p:nvPicPr>
@@ -9205,7 +9206,7 @@
                       <p:nvPr/>
                     </p:nvPicPr>
                     <p:blipFill>
-                      <a:blip r:embed="rId10"/>
+                      <a:blip r:embed="rId9"/>
                       <a:stretch>
                         <a:fillRect/>
                       </a:stretch>
@@ -9468,12 +9469,12 @@
           <a:graphicData uri="http://schemas.openxmlformats.org/presentationml/2006/ole">
             <mc:AlternateContent xmlns:mc="http://schemas.openxmlformats.org/markup-compatibility/2006">
               <mc:Choice xmlns:v="urn:schemas-microsoft-com:vml" Requires="v">
-                <p:oleObj spid="_x0000_s4122" name="CS ChemDraw Drawing" r:id="rId11" imgW="1464070" imgH="4100740" progId="ChemDraw.Document.6.0">
+                <p:oleObj name="CS ChemDraw Drawing" r:id="rId10" imgW="1464070" imgH="4100740" progId="ChemDraw.Document.6.0">
                   <p:embed/>
                 </p:oleObj>
               </mc:Choice>
               <mc:Fallback>
-                <p:oleObj name="CS ChemDraw Drawing" r:id="rId11" imgW="1464070" imgH="4100740" progId="ChemDraw.Document.6.0">
+                <p:oleObj name="CS ChemDraw Drawing" r:id="rId10" imgW="1464070" imgH="4100740" progId="ChemDraw.Document.6.0">
                   <p:embed/>
                   <p:pic>
                     <p:nvPicPr>
@@ -9482,7 +9483,7 @@
                       <p:nvPr/>
                     </p:nvPicPr>
                     <p:blipFill>
-                      <a:blip r:embed="rId12"/>
+                      <a:blip r:embed="rId11"/>
                       <a:stretch>
                         <a:fillRect/>
                       </a:stretch>
@@ -11263,12 +11264,12 @@
           <a:graphicData uri="http://schemas.openxmlformats.org/presentationml/2006/ole">
             <mc:AlternateContent xmlns:mc="http://schemas.openxmlformats.org/markup-compatibility/2006">
               <mc:Choice xmlns:v="urn:schemas-microsoft-com:vml" Requires="v">
-                <p:oleObj spid="_x0000_s2189" name="CS ChemDraw Drawing" r:id="rId3" imgW="1422805" imgH="1191151" progId="ChemDraw.Document.6.0">
+                <p:oleObj name="CS ChemDraw Drawing" r:id="rId2" imgW="1422805" imgH="1191151" progId="ChemDraw.Document.6.0">
                   <p:embed/>
                 </p:oleObj>
               </mc:Choice>
               <mc:Fallback>
-                <p:oleObj name="CS ChemDraw Drawing" r:id="rId3" imgW="1422805" imgH="1191151" progId="ChemDraw.Document.6.0">
+                <p:oleObj name="CS ChemDraw Drawing" r:id="rId2" imgW="1422805" imgH="1191151" progId="ChemDraw.Document.6.0">
                   <p:embed/>
                   <p:pic>
                     <p:nvPicPr>
@@ -11277,7 +11278,7 @@
                       <p:nvPr/>
                     </p:nvPicPr>
                     <p:blipFill>
-                      <a:blip r:embed="rId4"/>
+                      <a:blip r:embed="rId3"/>
                       <a:stretch>
                         <a:fillRect/>
                       </a:stretch>
@@ -11326,12 +11327,12 @@
           <a:graphicData uri="http://schemas.openxmlformats.org/presentationml/2006/ole">
             <mc:AlternateContent xmlns:mc="http://schemas.openxmlformats.org/markup-compatibility/2006">
               <mc:Choice xmlns:v="urn:schemas-microsoft-com:vml" Requires="v">
-                <p:oleObj spid="_x0000_s2190" name="CS ChemDraw Drawing" r:id="rId5" imgW="1421542" imgH="1128993" progId="ChemDraw.Document.6.0">
+                <p:oleObj name="CS ChemDraw Drawing" r:id="rId4" imgW="1421542" imgH="1128993" progId="ChemDraw.Document.6.0">
                   <p:embed/>
                 </p:oleObj>
               </mc:Choice>
               <mc:Fallback>
-                <p:oleObj name="CS ChemDraw Drawing" r:id="rId5" imgW="1421542" imgH="1128993" progId="ChemDraw.Document.6.0">
+                <p:oleObj name="CS ChemDraw Drawing" r:id="rId4" imgW="1421542" imgH="1128993" progId="ChemDraw.Document.6.0">
                   <p:embed/>
                   <p:pic>
                     <p:nvPicPr>
@@ -11340,7 +11341,7 @@
                       <p:nvPr/>
                     </p:nvPicPr>
                     <p:blipFill>
-                      <a:blip r:embed="rId6"/>
+                      <a:blip r:embed="rId5"/>
                       <a:stretch>
                         <a:fillRect/>
                       </a:stretch>
@@ -11389,12 +11390,12 @@
           <a:graphicData uri="http://schemas.openxmlformats.org/presentationml/2006/ole">
             <mc:AlternateContent xmlns:mc="http://schemas.openxmlformats.org/markup-compatibility/2006">
               <mc:Choice xmlns:v="urn:schemas-microsoft-com:vml" Requires="v">
-                <p:oleObj spid="_x0000_s2191" name="CS ChemDraw Drawing" r:id="rId7" imgW="1519231" imgH="1273606" progId="ChemDraw.Document.6.0">
+                <p:oleObj name="CS ChemDraw Drawing" r:id="rId6" imgW="1519231" imgH="1273606" progId="ChemDraw.Document.6.0">
                   <p:embed/>
                 </p:oleObj>
               </mc:Choice>
               <mc:Fallback>
-                <p:oleObj name="CS ChemDraw Drawing" r:id="rId7" imgW="1519231" imgH="1273606" progId="ChemDraw.Document.6.0">
+                <p:oleObj name="CS ChemDraw Drawing" r:id="rId6" imgW="1519231" imgH="1273606" progId="ChemDraw.Document.6.0">
                   <p:embed/>
                   <p:pic>
                     <p:nvPicPr>
@@ -11403,7 +11404,7 @@
                       <p:nvPr/>
                     </p:nvPicPr>
                     <p:blipFill>
-                      <a:blip r:embed="rId8"/>
+                      <a:blip r:embed="rId7"/>
                       <a:stretch>
                         <a:fillRect/>
                       </a:stretch>
@@ -11452,12 +11453,12 @@
           <a:graphicData uri="http://schemas.openxmlformats.org/presentationml/2006/ole">
             <mc:AlternateContent xmlns:mc="http://schemas.openxmlformats.org/markup-compatibility/2006">
               <mc:Choice xmlns:v="urn:schemas-microsoft-com:vml" Requires="v">
-                <p:oleObj spid="_x0000_s2192" name="CS ChemDraw Drawing" r:id="rId9" imgW="2101153" imgH="1214408" progId="ChemDraw.Document.6.0">
+                <p:oleObj name="CS ChemDraw Drawing" r:id="rId8" imgW="2101153" imgH="1214408" progId="ChemDraw.Document.6.0">
                   <p:embed/>
                 </p:oleObj>
               </mc:Choice>
               <mc:Fallback>
-                <p:oleObj name="CS ChemDraw Drawing" r:id="rId9" imgW="2101153" imgH="1214408" progId="ChemDraw.Document.6.0">
+                <p:oleObj name="CS ChemDraw Drawing" r:id="rId8" imgW="2101153" imgH="1214408" progId="ChemDraw.Document.6.0">
                   <p:embed/>
                   <p:pic>
                     <p:nvPicPr>
@@ -11466,7 +11467,7 @@
                       <p:nvPr/>
                     </p:nvPicPr>
                     <p:blipFill>
-                      <a:blip r:embed="rId10"/>
+                      <a:blip r:embed="rId9"/>
                       <a:stretch>
                         <a:fillRect/>
                       </a:stretch>
@@ -11515,12 +11516,12 @@
           <a:graphicData uri="http://schemas.openxmlformats.org/presentationml/2006/ole">
             <mc:AlternateContent xmlns:mc="http://schemas.openxmlformats.org/markup-compatibility/2006">
               <mc:Choice xmlns:v="urn:schemas-microsoft-com:vml" Requires="v">
-                <p:oleObj spid="_x0000_s2193" name="CS ChemDraw Drawing" r:id="rId11" imgW="874568" imgH="1224979" progId="ChemDraw.Document.6.0">
+                <p:oleObj name="CS ChemDraw Drawing" r:id="rId10" imgW="874568" imgH="1224979" progId="ChemDraw.Document.6.0">
                   <p:embed/>
                 </p:oleObj>
               </mc:Choice>
               <mc:Fallback>
-                <p:oleObj name="CS ChemDraw Drawing" r:id="rId11" imgW="874568" imgH="1224979" progId="ChemDraw.Document.6.0">
+                <p:oleObj name="CS ChemDraw Drawing" r:id="rId10" imgW="874568" imgH="1224979" progId="ChemDraw.Document.6.0">
                   <p:embed/>
                   <p:pic>
                     <p:nvPicPr>
@@ -11529,7 +11530,7 @@
                       <p:nvPr/>
                     </p:nvPicPr>
                     <p:blipFill>
-                      <a:blip r:embed="rId12"/>
+                      <a:blip r:embed="rId11"/>
                       <a:stretch>
                         <a:fillRect/>
                       </a:stretch>
@@ -11578,12 +11579,12 @@
           <a:graphicData uri="http://schemas.openxmlformats.org/presentationml/2006/ole">
             <mc:AlternateContent xmlns:mc="http://schemas.openxmlformats.org/markup-compatibility/2006">
               <mc:Choice xmlns:v="urn:schemas-microsoft-com:vml" Requires="v">
-                <p:oleObj spid="_x0000_s2194" name="CS ChemDraw Drawing" r:id="rId13" imgW="1422805" imgH="1224979" progId="ChemDraw.Document.6.0">
+                <p:oleObj name="CS ChemDraw Drawing" r:id="rId12" imgW="1422805" imgH="1224979" progId="ChemDraw.Document.6.0">
                   <p:embed/>
                 </p:oleObj>
               </mc:Choice>
               <mc:Fallback>
-                <p:oleObj name="CS ChemDraw Drawing" r:id="rId13" imgW="1422805" imgH="1224979" progId="ChemDraw.Document.6.0">
+                <p:oleObj name="CS ChemDraw Drawing" r:id="rId12" imgW="1422805" imgH="1224979" progId="ChemDraw.Document.6.0">
                   <p:embed/>
                   <p:pic>
                     <p:nvPicPr>
@@ -11592,7 +11593,7 @@
                       <p:nvPr/>
                     </p:nvPicPr>
                     <p:blipFill>
-                      <a:blip r:embed="rId14"/>
+                      <a:blip r:embed="rId13"/>
                       <a:stretch>
                         <a:fillRect/>
                       </a:stretch>
@@ -11641,12 +11642,12 @@
           <a:graphicData uri="http://schemas.openxmlformats.org/presentationml/2006/ole">
             <mc:AlternateContent xmlns:mc="http://schemas.openxmlformats.org/markup-compatibility/2006">
               <mc:Choice xmlns:v="urn:schemas-microsoft-com:vml" Requires="v">
-                <p:oleObj spid="_x0000_s2195" name="CS ChemDraw Drawing" r:id="rId15" imgW="2701603" imgH="1301091" progId="ChemDraw.Document.6.0">
+                <p:oleObj name="CS ChemDraw Drawing" r:id="rId14" imgW="2701603" imgH="1301091" progId="ChemDraw.Document.6.0">
                   <p:embed/>
                 </p:oleObj>
               </mc:Choice>
               <mc:Fallback>
-                <p:oleObj name="CS ChemDraw Drawing" r:id="rId15" imgW="2701603" imgH="1301091" progId="ChemDraw.Document.6.0">
+                <p:oleObj name="CS ChemDraw Drawing" r:id="rId14" imgW="2701603" imgH="1301091" progId="ChemDraw.Document.6.0">
                   <p:embed/>
                   <p:pic>
                     <p:nvPicPr>
@@ -11655,7 +11656,7 @@
                       <p:nvPr/>
                     </p:nvPicPr>
                     <p:blipFill>
-                      <a:blip r:embed="rId16"/>
+                      <a:blip r:embed="rId15"/>
                       <a:stretch>
                         <a:fillRect/>
                       </a:stretch>
@@ -11704,12 +11705,12 @@
           <a:graphicData uri="http://schemas.openxmlformats.org/presentationml/2006/ole">
             <mc:AlternateContent xmlns:mc="http://schemas.openxmlformats.org/markup-compatibility/2006">
               <mc:Choice xmlns:v="urn:schemas-microsoft-com:vml" Requires="v">
-                <p:oleObj spid="_x0000_s2196" name="CS ChemDraw Drawing" r:id="rId17" imgW="1235428" imgH="1205105" progId="ChemDraw.Document.6.0">
+                <p:oleObj name="CS ChemDraw Drawing" r:id="rId16" imgW="1235428" imgH="1205105" progId="ChemDraw.Document.6.0">
                   <p:embed/>
                 </p:oleObj>
               </mc:Choice>
               <mc:Fallback>
-                <p:oleObj name="CS ChemDraw Drawing" r:id="rId17" imgW="1235428" imgH="1205105" progId="ChemDraw.Document.6.0">
+                <p:oleObj name="CS ChemDraw Drawing" r:id="rId16" imgW="1235428" imgH="1205105" progId="ChemDraw.Document.6.0">
                   <p:embed/>
                   <p:pic>
                     <p:nvPicPr>
@@ -11718,7 +11719,7 @@
                       <p:nvPr/>
                     </p:nvPicPr>
                     <p:blipFill>
-                      <a:blip r:embed="rId18"/>
+                      <a:blip r:embed="rId17"/>
                       <a:stretch>
                         <a:fillRect/>
                       </a:stretch>
@@ -11767,12 +11768,12 @@
           <a:graphicData uri="http://schemas.openxmlformats.org/presentationml/2006/ole">
             <mc:AlternateContent xmlns:mc="http://schemas.openxmlformats.org/markup-compatibility/2006">
               <mc:Choice xmlns:v="urn:schemas-microsoft-com:vml" Requires="v">
-                <p:oleObj spid="_x0000_s2197" name="CS ChemDraw Drawing" r:id="rId19" imgW="2058625" imgH="1305742" progId="ChemDraw.Document.6.0">
+                <p:oleObj name="CS ChemDraw Drawing" r:id="rId18" imgW="2058625" imgH="1305742" progId="ChemDraw.Document.6.0">
                   <p:embed/>
                 </p:oleObj>
               </mc:Choice>
               <mc:Fallback>
-                <p:oleObj name="CS ChemDraw Drawing" r:id="rId19" imgW="2058625" imgH="1305742" progId="ChemDraw.Document.6.0">
+                <p:oleObj name="CS ChemDraw Drawing" r:id="rId18" imgW="2058625" imgH="1305742" progId="ChemDraw.Document.6.0">
                   <p:embed/>
                   <p:pic>
                     <p:nvPicPr>
@@ -11781,7 +11782,7 @@
                       <p:nvPr/>
                     </p:nvPicPr>
                     <p:blipFill>
-                      <a:blip r:embed="rId20"/>
+                      <a:blip r:embed="rId19"/>
                       <a:stretch>
                         <a:fillRect/>
                       </a:stretch>
@@ -11830,12 +11831,12 @@
           <a:graphicData uri="http://schemas.openxmlformats.org/presentationml/2006/ole">
             <mc:AlternateContent xmlns:mc="http://schemas.openxmlformats.org/markup-compatibility/2006">
               <mc:Choice xmlns:v="urn:schemas-microsoft-com:vml" Requires="v">
-                <p:oleObj spid="_x0000_s2198" name="CS ChemDraw Drawing" r:id="rId21" imgW="1880090" imgH="1233859" progId="ChemDraw.Document.6.0">
+                <p:oleObj name="CS ChemDraw Drawing" r:id="rId20" imgW="1880090" imgH="1233859" progId="ChemDraw.Document.6.0">
                   <p:embed/>
                 </p:oleObj>
               </mc:Choice>
               <mc:Fallback>
-                <p:oleObj name="CS ChemDraw Drawing" r:id="rId21" imgW="1880090" imgH="1233859" progId="ChemDraw.Document.6.0">
+                <p:oleObj name="CS ChemDraw Drawing" r:id="rId20" imgW="1880090" imgH="1233859" progId="ChemDraw.Document.6.0">
                   <p:embed/>
                   <p:pic>
                     <p:nvPicPr>
@@ -11844,7 +11845,7 @@
                       <p:nvPr/>
                     </p:nvPicPr>
                     <p:blipFill>
-                      <a:blip r:embed="rId22"/>
+                      <a:blip r:embed="rId21"/>
                       <a:stretch>
                         <a:fillRect/>
                       </a:stretch>
@@ -11893,12 +11894,12 @@
           <a:graphicData uri="http://schemas.openxmlformats.org/presentationml/2006/ole">
             <mc:AlternateContent xmlns:mc="http://schemas.openxmlformats.org/markup-compatibility/2006">
               <mc:Choice xmlns:v="urn:schemas-microsoft-com:vml" Requires="v">
-                <p:oleObj spid="_x0000_s2199" name="CS ChemDraw Drawing" r:id="rId23" imgW="1572286" imgH="1233859" progId="ChemDraw.Document.6.0">
+                <p:oleObj name="CS ChemDraw Drawing" r:id="rId22" imgW="1572286" imgH="1233859" progId="ChemDraw.Document.6.0">
                   <p:embed/>
                 </p:oleObj>
               </mc:Choice>
               <mc:Fallback>
-                <p:oleObj name="CS ChemDraw Drawing" r:id="rId23" imgW="1572286" imgH="1233859" progId="ChemDraw.Document.6.0">
+                <p:oleObj name="CS ChemDraw Drawing" r:id="rId22" imgW="1572286" imgH="1233859" progId="ChemDraw.Document.6.0">
                   <p:embed/>
                   <p:pic>
                     <p:nvPicPr>
@@ -11907,7 +11908,7 @@
                       <p:nvPr/>
                     </p:nvPicPr>
                     <p:blipFill>
-                      <a:blip r:embed="rId24"/>
+                      <a:blip r:embed="rId23"/>
                       <a:stretch>
                         <a:fillRect/>
                       </a:stretch>
@@ -12078,12 +12079,12 @@
           <a:graphicData uri="http://schemas.openxmlformats.org/presentationml/2006/ole">
             <mc:AlternateContent xmlns:mc="http://schemas.openxmlformats.org/markup-compatibility/2006">
               <mc:Choice xmlns:v="urn:schemas-microsoft-com:vml" Requires="v">
-                <p:oleObj spid="_x0000_s2200" name="CS ChemDraw Drawing" r:id="rId25" imgW="1535653" imgH="1272337" progId="ChemDraw.Document.6.0">
+                <p:oleObj name="CS ChemDraw Drawing" r:id="rId24" imgW="1535653" imgH="1272337" progId="ChemDraw.Document.6.0">
                   <p:embed/>
                 </p:oleObj>
               </mc:Choice>
               <mc:Fallback>
-                <p:oleObj name="CS ChemDraw Drawing" r:id="rId25" imgW="1535653" imgH="1272337" progId="ChemDraw.Document.6.0">
+                <p:oleObj name="CS ChemDraw Drawing" r:id="rId24" imgW="1535653" imgH="1272337" progId="ChemDraw.Document.6.0">
                   <p:embed/>
                   <p:pic>
                     <p:nvPicPr>
@@ -12092,7 +12093,7 @@
                       <p:nvPr/>
                     </p:nvPicPr>
                     <p:blipFill>
-                      <a:blip r:embed="rId26"/>
+                      <a:blip r:embed="rId25"/>
                       <a:stretch>
                         <a:fillRect/>
                       </a:stretch>
@@ -12141,12 +12142,12 @@
           <a:graphicData uri="http://schemas.openxmlformats.org/presentationml/2006/ole">
             <mc:AlternateContent xmlns:mc="http://schemas.openxmlformats.org/markup-compatibility/2006">
               <mc:Choice xmlns:v="urn:schemas-microsoft-com:vml" Requires="v">
-                <p:oleObj spid="_x0000_s2201" name="CS ChemDraw Drawing" r:id="rId27" imgW="2152945" imgH="1330267" progId="ChemDraw.Document.6.0">
+                <p:oleObj name="CS ChemDraw Drawing" r:id="rId26" imgW="2152945" imgH="1330267" progId="ChemDraw.Document.6.0">
                   <p:embed/>
                 </p:oleObj>
               </mc:Choice>
               <mc:Fallback>
-                <p:oleObj name="CS ChemDraw Drawing" r:id="rId27" imgW="2152945" imgH="1330267" progId="ChemDraw.Document.6.0">
+                <p:oleObj name="CS ChemDraw Drawing" r:id="rId26" imgW="2152945" imgH="1330267" progId="ChemDraw.Document.6.0">
                   <p:embed/>
                   <p:pic>
                     <p:nvPicPr>
@@ -12155,7 +12156,7 @@
                       <p:nvPr/>
                     </p:nvPicPr>
                     <p:blipFill>
-                      <a:blip r:embed="rId28"/>
+                      <a:blip r:embed="rId27"/>
                       <a:stretch>
                         <a:fillRect/>
                       </a:stretch>
@@ -12204,12 +12205,12 @@
           <a:graphicData uri="http://schemas.openxmlformats.org/presentationml/2006/ole">
             <mc:AlternateContent xmlns:mc="http://schemas.openxmlformats.org/markup-compatibility/2006">
               <mc:Choice xmlns:v="urn:schemas-microsoft-com:vml" Requires="v">
-                <p:oleObj spid="_x0000_s2202" name="CS ChemDraw Drawing" r:id="rId29" imgW="1704924" imgH="1362403" progId="ChemDraw.Document.6.0">
+                <p:oleObj name="CS ChemDraw Drawing" r:id="rId28" imgW="1704924" imgH="1362403" progId="ChemDraw.Document.6.0">
                   <p:embed/>
                 </p:oleObj>
               </mc:Choice>
               <mc:Fallback>
-                <p:oleObj name="CS ChemDraw Drawing" r:id="rId29" imgW="1704924" imgH="1362403" progId="ChemDraw.Document.6.0">
+                <p:oleObj name="CS ChemDraw Drawing" r:id="rId28" imgW="1704924" imgH="1362403" progId="ChemDraw.Document.6.0">
                   <p:embed/>
                   <p:pic>
                     <p:nvPicPr>
@@ -12218,7 +12219,7 @@
                       <p:nvPr/>
                     </p:nvPicPr>
                     <p:blipFill>
-                      <a:blip r:embed="rId30"/>
+                      <a:blip r:embed="rId29"/>
                       <a:stretch>
                         <a:fillRect/>
                       </a:stretch>
@@ -12267,12 +12268,12 @@
           <a:graphicData uri="http://schemas.openxmlformats.org/presentationml/2006/ole">
             <mc:AlternateContent xmlns:mc="http://schemas.openxmlformats.org/markup-compatibility/2006">
               <mc:Choice xmlns:v="urn:schemas-microsoft-com:vml" Requires="v">
-                <p:oleObj spid="_x0000_s2203" name="CS ChemDraw Drawing" r:id="rId31" imgW="1691450" imgH="1298131" progId="ChemDraw.Document.6.0">
+                <p:oleObj name="CS ChemDraw Drawing" r:id="rId30" imgW="1691450" imgH="1298131" progId="ChemDraw.Document.6.0">
                   <p:embed/>
                 </p:oleObj>
               </mc:Choice>
               <mc:Fallback>
-                <p:oleObj name="CS ChemDraw Drawing" r:id="rId31" imgW="1691450" imgH="1298131" progId="ChemDraw.Document.6.0">
+                <p:oleObj name="CS ChemDraw Drawing" r:id="rId30" imgW="1691450" imgH="1298131" progId="ChemDraw.Document.6.0">
                   <p:embed/>
                   <p:pic>
                     <p:nvPicPr>
@@ -12281,7 +12282,7 @@
                       <p:nvPr/>
                     </p:nvPicPr>
                     <p:blipFill>
-                      <a:blip r:embed="rId32"/>
+                      <a:blip r:embed="rId31"/>
                       <a:stretch>
                         <a:fillRect/>
                       </a:stretch>
@@ -12330,12 +12331,12 @@
           <a:graphicData uri="http://schemas.openxmlformats.org/presentationml/2006/ole">
             <mc:AlternateContent xmlns:mc="http://schemas.openxmlformats.org/markup-compatibility/2006">
               <mc:Choice xmlns:v="urn:schemas-microsoft-com:vml" Requires="v">
-                <p:oleObj spid="_x0000_s2204" name="CS ChemDraw Drawing" r:id="rId33" imgW="1787454" imgH="1128993" progId="ChemDraw.Document.6.0">
+                <p:oleObj name="CS ChemDraw Drawing" r:id="rId32" imgW="1787454" imgH="1128993" progId="ChemDraw.Document.6.0">
                   <p:embed/>
                 </p:oleObj>
               </mc:Choice>
               <mc:Fallback>
-                <p:oleObj name="CS ChemDraw Drawing" r:id="rId33" imgW="1787454" imgH="1128993" progId="ChemDraw.Document.6.0">
+                <p:oleObj name="CS ChemDraw Drawing" r:id="rId32" imgW="1787454" imgH="1128993" progId="ChemDraw.Document.6.0">
                   <p:embed/>
                   <p:pic>
                     <p:nvPicPr>
@@ -12344,7 +12345,7 @@
                       <p:nvPr/>
                     </p:nvPicPr>
                     <p:blipFill>
-                      <a:blip r:embed="rId34"/>
+                      <a:blip r:embed="rId33"/>
                       <a:stretch>
                         <a:fillRect/>
                       </a:stretch>
@@ -12393,12 +12394,12 @@
           <a:graphicData uri="http://schemas.openxmlformats.org/presentationml/2006/ole">
             <mc:AlternateContent xmlns:mc="http://schemas.openxmlformats.org/markup-compatibility/2006">
               <mc:Choice xmlns:v="urn:schemas-microsoft-com:vml" Requires="v">
-                <p:oleObj spid="_x0000_s2205" name="CS ChemDraw Drawing" r:id="rId35" imgW="891411" imgH="375908" progId="ChemDraw.Document.6.0">
+                <p:oleObj name="CS ChemDraw Drawing" r:id="rId34" imgW="891411" imgH="375908" progId="ChemDraw.Document.6.0">
                   <p:embed/>
                 </p:oleObj>
               </mc:Choice>
               <mc:Fallback>
-                <p:oleObj name="CS ChemDraw Drawing" r:id="rId35" imgW="891411" imgH="375908" progId="ChemDraw.Document.6.0">
+                <p:oleObj name="CS ChemDraw Drawing" r:id="rId34" imgW="891411" imgH="375908" progId="ChemDraw.Document.6.0">
                   <p:embed/>
                   <p:pic>
                     <p:nvPicPr>
@@ -12407,7 +12408,7 @@
                       <p:nvPr/>
                     </p:nvPicPr>
                     <p:blipFill>
-                      <a:blip r:embed="rId36"/>
+                      <a:blip r:embed="rId35"/>
                       <a:stretch>
                         <a:fillRect/>
                       </a:stretch>
@@ -12515,12 +12516,12 @@
           <a:graphicData uri="http://schemas.openxmlformats.org/presentationml/2006/ole">
             <mc:AlternateContent xmlns:mc="http://schemas.openxmlformats.org/markup-compatibility/2006">
               <mc:Choice xmlns:v="urn:schemas-microsoft-com:vml" Requires="v">
-                <p:oleObj spid="_x0000_s2206" name="CS ChemDraw Drawing" r:id="rId37" imgW="2349586" imgH="1078675" progId="ChemDraw.Document.6.0">
+                <p:oleObj name="CS ChemDraw Drawing" r:id="rId36" imgW="2349586" imgH="1078675" progId="ChemDraw.Document.6.0">
                   <p:embed/>
                 </p:oleObj>
               </mc:Choice>
               <mc:Fallback>
-                <p:oleObj name="CS ChemDraw Drawing" r:id="rId37" imgW="2349586" imgH="1078675" progId="ChemDraw.Document.6.0">
+                <p:oleObj name="CS ChemDraw Drawing" r:id="rId36" imgW="2349586" imgH="1078675" progId="ChemDraw.Document.6.0">
                   <p:embed/>
                   <p:pic>
                     <p:nvPicPr>
@@ -12529,7 +12530,7 @@
                       <p:nvPr/>
                     </p:nvPicPr>
                     <p:blipFill>
-                      <a:blip r:embed="rId38"/>
+                      <a:blip r:embed="rId37"/>
                       <a:stretch>
                         <a:fillRect/>
                       </a:stretch>
@@ -12578,12 +12579,12 @@
           <a:graphicData uri="http://schemas.openxmlformats.org/presentationml/2006/ole">
             <mc:AlternateContent xmlns:mc="http://schemas.openxmlformats.org/markup-compatibility/2006">
               <mc:Choice xmlns:v="urn:schemas-microsoft-com:vml" Requires="v">
-                <p:oleObj spid="_x0000_s2207" name="CS ChemDraw Drawing" r:id="rId39" imgW="1200479" imgH="1273606" progId="ChemDraw.Document.6.0">
+                <p:oleObj name="CS ChemDraw Drawing" r:id="rId38" imgW="1200479" imgH="1273606" progId="ChemDraw.Document.6.0">
                   <p:embed/>
                 </p:oleObj>
               </mc:Choice>
               <mc:Fallback>
-                <p:oleObj name="CS ChemDraw Drawing" r:id="rId39" imgW="1200479" imgH="1273606" progId="ChemDraw.Document.6.0">
+                <p:oleObj name="CS ChemDraw Drawing" r:id="rId38" imgW="1200479" imgH="1273606" progId="ChemDraw.Document.6.0">
                   <p:embed/>
                   <p:pic>
                     <p:nvPicPr>
@@ -12592,7 +12593,7 @@
                       <p:nvPr/>
                     </p:nvPicPr>
                     <p:blipFill>
-                      <a:blip r:embed="rId40"/>
+                      <a:blip r:embed="rId39"/>
                       <a:stretch>
                         <a:fillRect/>
                       </a:stretch>
@@ -12641,12 +12642,12 @@
           <a:graphicData uri="http://schemas.openxmlformats.org/presentationml/2006/ole">
             <mc:AlternateContent xmlns:mc="http://schemas.openxmlformats.org/markup-compatibility/2006">
               <mc:Choice xmlns:v="urn:schemas-microsoft-com:vml" Requires="v">
-                <p:oleObj spid="_x0000_s2208" name="CS ChemDraw Drawing" r:id="rId41" imgW="4484847" imgH="1418641" progId="ChemDraw.Document.6.0">
+                <p:oleObj name="CS ChemDraw Drawing" r:id="rId40" imgW="4484847" imgH="1418641" progId="ChemDraw.Document.6.0">
                   <p:embed/>
                 </p:oleObj>
               </mc:Choice>
               <mc:Fallback>
-                <p:oleObj name="CS ChemDraw Drawing" r:id="rId41" imgW="4484847" imgH="1418641" progId="ChemDraw.Document.6.0">
+                <p:oleObj name="CS ChemDraw Drawing" r:id="rId40" imgW="4484847" imgH="1418641" progId="ChemDraw.Document.6.0">
                   <p:embed/>
                   <p:pic>
                     <p:nvPicPr>
@@ -12655,7 +12656,7 @@
                       <p:nvPr/>
                     </p:nvPicPr>
                     <p:blipFill>
-                      <a:blip r:embed="rId42"/>
+                      <a:blip r:embed="rId41"/>
                       <a:stretch>
                         <a:fillRect/>
                       </a:stretch>
@@ -12763,12 +12764,12 @@
           <a:graphicData uri="http://schemas.openxmlformats.org/presentationml/2006/ole">
             <mc:AlternateContent xmlns:mc="http://schemas.openxmlformats.org/markup-compatibility/2006">
               <mc:Choice xmlns:v="urn:schemas-microsoft-com:vml" Requires="v">
-                <p:oleObj spid="_x0000_s2209" name="CS ChemDraw Drawing" r:id="rId43" imgW="1418594" imgH="1476148" progId="ChemDraw.Document.6.0">
+                <p:oleObj name="CS ChemDraw Drawing" r:id="rId42" imgW="1418594" imgH="1476148" progId="ChemDraw.Document.6.0">
                   <p:embed/>
                 </p:oleObj>
               </mc:Choice>
               <mc:Fallback>
-                <p:oleObj name="CS ChemDraw Drawing" r:id="rId43" imgW="1418594" imgH="1476148" progId="ChemDraw.Document.6.0">
+                <p:oleObj name="CS ChemDraw Drawing" r:id="rId42" imgW="1418594" imgH="1476148" progId="ChemDraw.Document.6.0">
                   <p:embed/>
                   <p:pic>
                     <p:nvPicPr>
@@ -12777,7 +12778,7 @@
                       <p:nvPr/>
                     </p:nvPicPr>
                     <p:blipFill>
-                      <a:blip r:embed="rId44"/>
+                      <a:blip r:embed="rId43"/>
                       <a:stretch>
                         <a:fillRect/>
                       </a:stretch>
@@ -12826,12 +12827,12 @@
           <a:graphicData uri="http://schemas.openxmlformats.org/presentationml/2006/ole">
             <mc:AlternateContent xmlns:mc="http://schemas.openxmlformats.org/markup-compatibility/2006">
               <mc:Choice xmlns:v="urn:schemas-microsoft-com:vml" Requires="v">
-                <p:oleObj spid="_x0000_s2210" name="CS ChemDraw Drawing" r:id="rId45" imgW="4181674" imgH="1446126" progId="ChemDraw.Document.6.0">
+                <p:oleObj name="CS ChemDraw Drawing" r:id="rId44" imgW="4181674" imgH="1446126" progId="ChemDraw.Document.6.0">
                   <p:embed/>
                 </p:oleObj>
               </mc:Choice>
               <mc:Fallback>
-                <p:oleObj name="CS ChemDraw Drawing" r:id="rId45" imgW="4181674" imgH="1446126" progId="ChemDraw.Document.6.0">
+                <p:oleObj name="CS ChemDraw Drawing" r:id="rId44" imgW="4181674" imgH="1446126" progId="ChemDraw.Document.6.0">
                   <p:embed/>
                   <p:pic>
                     <p:nvPicPr>
@@ -12840,7 +12841,7 @@
                       <p:nvPr/>
                     </p:nvPicPr>
                     <p:blipFill>
-                      <a:blip r:embed="rId46"/>
+                      <a:blip r:embed="rId45"/>
                       <a:stretch>
                         <a:fillRect/>
                       </a:stretch>
@@ -12948,12 +12949,12 @@
           <a:graphicData uri="http://schemas.openxmlformats.org/presentationml/2006/ole">
             <mc:AlternateContent xmlns:mc="http://schemas.openxmlformats.org/markup-compatibility/2006">
               <mc:Choice xmlns:v="urn:schemas-microsoft-com:vml" Requires="v">
-                <p:oleObj spid="_x0000_s2211" name="CS ChemDraw Drawing" r:id="rId47" imgW="1965568" imgH="1090937" progId="ChemDraw.Document.6.0">
+                <p:oleObj name="CS ChemDraw Drawing" r:id="rId46" imgW="1965568" imgH="1090937" progId="ChemDraw.Document.6.0">
                   <p:embed/>
                 </p:oleObj>
               </mc:Choice>
               <mc:Fallback>
-                <p:oleObj name="CS ChemDraw Drawing" r:id="rId47" imgW="1965568" imgH="1090937" progId="ChemDraw.Document.6.0">
+                <p:oleObj name="CS ChemDraw Drawing" r:id="rId46" imgW="1965568" imgH="1090937" progId="ChemDraw.Document.6.0">
                   <p:embed/>
                   <p:pic>
                     <p:nvPicPr>
@@ -12962,7 +12963,7 @@
                       <p:nvPr/>
                     </p:nvPicPr>
                     <p:blipFill>
-                      <a:blip r:embed="rId48"/>
+                      <a:blip r:embed="rId47"/>
                       <a:stretch>
                         <a:fillRect/>
                       </a:stretch>
@@ -13011,12 +13012,12 @@
           <a:graphicData uri="http://schemas.openxmlformats.org/presentationml/2006/ole">
             <mc:AlternateContent xmlns:mc="http://schemas.openxmlformats.org/markup-compatibility/2006">
               <mc:Choice xmlns:v="urn:schemas-microsoft-com:vml" Requires="v">
-                <p:oleObj spid="_x0000_s2212" name="CS ChemDraw Drawing" r:id="rId49" imgW="2095258" imgH="1453315" progId="ChemDraw.Document.6.0">
+                <p:oleObj name="CS ChemDraw Drawing" r:id="rId48" imgW="2095258" imgH="1453315" progId="ChemDraw.Document.6.0">
                   <p:embed/>
                 </p:oleObj>
               </mc:Choice>
               <mc:Fallback>
-                <p:oleObj name="CS ChemDraw Drawing" r:id="rId49" imgW="2095258" imgH="1453315" progId="ChemDraw.Document.6.0">
+                <p:oleObj name="CS ChemDraw Drawing" r:id="rId48" imgW="2095258" imgH="1453315" progId="ChemDraw.Document.6.0">
                   <p:embed/>
                   <p:pic>
                     <p:nvPicPr>
@@ -13025,7 +13026,7 @@
                       <p:nvPr/>
                     </p:nvPicPr>
                     <p:blipFill>
-                      <a:blip r:embed="rId50"/>
+                      <a:blip r:embed="rId49"/>
                       <a:stretch>
                         <a:fillRect/>
                       </a:stretch>
@@ -13074,12 +13075,12 @@
           <a:graphicData uri="http://schemas.openxmlformats.org/presentationml/2006/ole">
             <mc:AlternateContent xmlns:mc="http://schemas.openxmlformats.org/markup-compatibility/2006">
               <mc:Choice xmlns:v="urn:schemas-microsoft-com:vml" Requires="v">
-                <p:oleObj spid="_x0000_s2213" name="CS ChemDraw Drawing" r:id="rId51" imgW="1546600" imgH="1214408" progId="ChemDraw.Document.6.0">
+                <p:oleObj name="CS ChemDraw Drawing" r:id="rId50" imgW="1546600" imgH="1214408" progId="ChemDraw.Document.6.0">
                   <p:embed/>
                 </p:oleObj>
               </mc:Choice>
               <mc:Fallback>
-                <p:oleObj name="CS ChemDraw Drawing" r:id="rId51" imgW="1546600" imgH="1214408" progId="ChemDraw.Document.6.0">
+                <p:oleObj name="CS ChemDraw Drawing" r:id="rId50" imgW="1546600" imgH="1214408" progId="ChemDraw.Document.6.0">
                   <p:embed/>
                   <p:pic>
                     <p:nvPicPr>
@@ -13088,7 +13089,7 @@
                       <p:nvPr/>
                     </p:nvPicPr>
                     <p:blipFill>
-                      <a:blip r:embed="rId52"/>
+                      <a:blip r:embed="rId51"/>
                       <a:stretch>
                         <a:fillRect/>
                       </a:stretch>
@@ -13196,12 +13197,12 @@
           <a:graphicData uri="http://schemas.openxmlformats.org/presentationml/2006/ole">
             <mc:AlternateContent xmlns:mc="http://schemas.openxmlformats.org/markup-compatibility/2006">
               <mc:Choice xmlns:v="urn:schemas-microsoft-com:vml" Requires="v">
-                <p:oleObj spid="_x0000_s2214" name="CS ChemDraw Drawing" r:id="rId53" imgW="1996306" imgH="1191574" progId="ChemDraw.Document.6.0">
+                <p:oleObj name="CS ChemDraw Drawing" r:id="rId52" imgW="1996306" imgH="1191574" progId="ChemDraw.Document.6.0">
                   <p:embed/>
                 </p:oleObj>
               </mc:Choice>
               <mc:Fallback>
-                <p:oleObj name="CS ChemDraw Drawing" r:id="rId53" imgW="1996306" imgH="1191574" progId="ChemDraw.Document.6.0">
+                <p:oleObj name="CS ChemDraw Drawing" r:id="rId52" imgW="1996306" imgH="1191574" progId="ChemDraw.Document.6.0">
                   <p:embed/>
                   <p:pic>
                     <p:nvPicPr>
@@ -13210,7 +13211,7 @@
                       <p:nvPr/>
                     </p:nvPicPr>
                     <p:blipFill>
-                      <a:blip r:embed="rId54"/>
+                      <a:blip r:embed="rId53"/>
                       <a:stretch>
                         <a:fillRect/>
                       </a:stretch>
@@ -13643,71 +13644,6 @@
       </p:sp>
       <p:sp>
         <p:nvSpPr>
-          <p:cNvPr id="65" name="Google Shape;298;p9">
-            <a:extLst>
-              <a:ext uri="{FF2B5EF4-FFF2-40B4-BE49-F238E27FC236}">
-                <a16:creationId xmlns:a16="http://schemas.microsoft.com/office/drawing/2014/main" id="{AF874135-D2EF-4C7D-9758-7B0DBDF32768}"/>
-              </a:ext>
-            </a:extLst>
-          </p:cNvPr>
-          <p:cNvSpPr txBox="1"/>
-          <p:nvPr/>
-        </p:nvSpPr>
-        <p:spPr>
-          <a:xfrm>
-            <a:off x="14358864" y="5984097"/>
-            <a:ext cx="631425" cy="310717"/>
-          </a:xfrm>
-          <a:prstGeom prst="rect">
-            <a:avLst/>
-          </a:prstGeom>
-          <a:noFill/>
-          <a:ln>
-            <a:noFill/>
-          </a:ln>
-        </p:spPr>
-        <p:txBody>
-          <a:bodyPr spcFirstLastPara="1" wrap="square" lIns="94378" tIns="47176" rIns="94378" bIns="47176" anchor="t" anchorCtr="0">
-            <a:spAutoFit/>
-          </a:bodyPr>
-          <a:lstStyle/>
-          <a:p>
-            <a:pPr algn="ctr">
-              <a:buClr>
-                <a:srgbClr val="000000"/>
-              </a:buClr>
-              <a:buSzPts val="1200"/>
-            </a:pPr>
-            <a:r>
-              <a:rPr lang="pt-BR" sz="1400" b="1" dirty="0">
-                <a:solidFill>
-                  <a:schemeClr val="tx1">
-                    <a:lumMod val="85000"/>
-                    <a:lumOff val="15000"/>
-                  </a:schemeClr>
-                </a:solidFill>
-                <a:latin typeface="Avenir"/>
-                <a:sym typeface="Avenir"/>
-              </a:rPr>
-              <a:t>DICZ</a:t>
-            </a:r>
-            <a:endParaRPr sz="1600" dirty="0">
-              <a:solidFill>
-                <a:schemeClr val="tx1">
-                  <a:lumMod val="85000"/>
-                  <a:lumOff val="15000"/>
-                </a:schemeClr>
-              </a:solidFill>
-              <a:latin typeface="Arial"/>
-              <a:ea typeface="Arial"/>
-              <a:cs typeface="Arial"/>
-              <a:sym typeface="Arial"/>
-            </a:endParaRPr>
-          </a:p>
-        </p:txBody>
-      </p:sp>
-      <p:sp>
-        <p:nvSpPr>
           <p:cNvPr id="66" name="Google Shape;298;p9">
             <a:extLst>
               <a:ext uri="{FF2B5EF4-FFF2-40B4-BE49-F238E27FC236}">
@@ -13852,12 +13788,12 @@
           <a:graphicData uri="http://schemas.openxmlformats.org/presentationml/2006/ole">
             <mc:AlternateContent xmlns:mc="http://schemas.openxmlformats.org/markup-compatibility/2006">
               <mc:Choice xmlns:v="urn:schemas-microsoft-com:vml" Requires="v">
-                <p:oleObj spid="_x0000_s3110" name="CS ChemDraw Drawing" r:id="rId3" imgW="883411" imgH="1194111" progId="ChemDraw.Document.6.0">
+                <p:oleObj name="CS ChemDraw Drawing" r:id="rId2" imgW="883411" imgH="1194111" progId="ChemDraw.Document.6.0">
                   <p:embed/>
                 </p:oleObj>
               </mc:Choice>
               <mc:Fallback>
-                <p:oleObj name="CS ChemDraw Drawing" r:id="rId3" imgW="883411" imgH="1194111" progId="ChemDraw.Document.6.0">
+                <p:oleObj name="CS ChemDraw Drawing" r:id="rId2" imgW="883411" imgH="1194111" progId="ChemDraw.Document.6.0">
                   <p:embed/>
                   <p:pic>
                     <p:nvPicPr>
@@ -13866,7 +13802,7 @@
                       <p:nvPr/>
                     </p:nvPicPr>
                     <p:blipFill>
-                      <a:blip r:embed="rId4"/>
+                      <a:blip r:embed="rId3"/>
                       <a:stretch>
                         <a:fillRect/>
                       </a:stretch>
@@ -13915,12 +13851,12 @@
           <a:graphicData uri="http://schemas.openxmlformats.org/presentationml/2006/ole">
             <mc:AlternateContent xmlns:mc="http://schemas.openxmlformats.org/markup-compatibility/2006">
               <mc:Choice xmlns:v="urn:schemas-microsoft-com:vml" Requires="v">
-                <p:oleObj spid="_x0000_s3111" name="CS ChemDraw Drawing" r:id="rId5" imgW="1846825" imgH="1604270" progId="ChemDraw.Document.6.0">
+                <p:oleObj name="CS ChemDraw Drawing" r:id="rId4" imgW="1846825" imgH="1604270" progId="ChemDraw.Document.6.0">
                   <p:embed/>
                 </p:oleObj>
               </mc:Choice>
               <mc:Fallback>
-                <p:oleObj name="CS ChemDraw Drawing" r:id="rId5" imgW="1846825" imgH="1604270" progId="ChemDraw.Document.6.0">
+                <p:oleObj name="CS ChemDraw Drawing" r:id="rId4" imgW="1846825" imgH="1604270" progId="ChemDraw.Document.6.0">
                   <p:embed/>
                   <p:pic>
                     <p:nvPicPr>
@@ -13929,7 +13865,7 @@
                       <p:nvPr/>
                     </p:nvPicPr>
                     <p:blipFill>
-                      <a:blip r:embed="rId6"/>
+                      <a:blip r:embed="rId5"/>
                       <a:stretch>
                         <a:fillRect/>
                       </a:stretch>
@@ -14037,12 +13973,12 @@
           <a:graphicData uri="http://schemas.openxmlformats.org/presentationml/2006/ole">
             <mc:AlternateContent xmlns:mc="http://schemas.openxmlformats.org/markup-compatibility/2006">
               <mc:Choice xmlns:v="urn:schemas-microsoft-com:vml" Requires="v">
-                <p:oleObj spid="_x0000_s3112" name="CS ChemDraw Drawing" r:id="rId7" imgW="2212317" imgH="1920134" progId="ChemDraw.Document.6.0">
+                <p:oleObj name="CS ChemDraw Drawing" r:id="rId6" imgW="2212317" imgH="1920134" progId="ChemDraw.Document.6.0">
                   <p:embed/>
                 </p:oleObj>
               </mc:Choice>
               <mc:Fallback>
-                <p:oleObj name="CS ChemDraw Drawing" r:id="rId7" imgW="2212317" imgH="1920134" progId="ChemDraw.Document.6.0">
+                <p:oleObj name="CS ChemDraw Drawing" r:id="rId6" imgW="2212317" imgH="1920134" progId="ChemDraw.Document.6.0">
                   <p:embed/>
                   <p:pic>
                     <p:nvPicPr>
@@ -14051,7 +13987,7 @@
                       <p:nvPr/>
                     </p:nvPicPr>
                     <p:blipFill>
-                      <a:blip r:embed="rId8"/>
+                      <a:blip r:embed="rId7"/>
                       <a:stretch>
                         <a:fillRect/>
                       </a:stretch>
@@ -14159,12 +14095,12 @@
           <a:graphicData uri="http://schemas.openxmlformats.org/presentationml/2006/ole">
             <mc:AlternateContent xmlns:mc="http://schemas.openxmlformats.org/markup-compatibility/2006">
               <mc:Choice xmlns:v="urn:schemas-microsoft-com:vml" Requires="v">
-                <p:oleObj spid="_x0000_s3113" name="CS ChemDraw Drawing" r:id="rId9" imgW="2931930" imgH="2215702" progId="ChemDraw.Document.6.0">
+                <p:oleObj name="CS ChemDraw Drawing" r:id="rId8" imgW="2931930" imgH="2215702" progId="ChemDraw.Document.6.0">
                   <p:embed/>
                 </p:oleObj>
               </mc:Choice>
               <mc:Fallback>
-                <p:oleObj name="CS ChemDraw Drawing" r:id="rId9" imgW="2931930" imgH="2215702" progId="ChemDraw.Document.6.0">
+                <p:oleObj name="CS ChemDraw Drawing" r:id="rId8" imgW="2931930" imgH="2215702" progId="ChemDraw.Document.6.0">
                   <p:embed/>
                   <p:pic>
                     <p:nvPicPr>
@@ -14173,7 +14109,7 @@
                       <p:nvPr/>
                     </p:nvPicPr>
                     <p:blipFill>
-                      <a:blip r:embed="rId10"/>
+                      <a:blip r:embed="rId9"/>
                       <a:stretch>
                         <a:fillRect/>
                       </a:stretch>
@@ -14281,12 +14217,12 @@
           <a:graphicData uri="http://schemas.openxmlformats.org/presentationml/2006/ole">
             <mc:AlternateContent xmlns:mc="http://schemas.openxmlformats.org/markup-compatibility/2006">
               <mc:Choice xmlns:v="urn:schemas-microsoft-com:vml" Requires="v">
-                <p:oleObj spid="_x0000_s3114" name="CS ChemDraw Drawing" r:id="rId11" imgW="3273420" imgH="2233884" progId="ChemDraw.Document.6.0">
+                <p:oleObj name="CS ChemDraw Drawing" r:id="rId10" imgW="3273420" imgH="2233884" progId="ChemDraw.Document.6.0">
                   <p:embed/>
                 </p:oleObj>
               </mc:Choice>
               <mc:Fallback>
-                <p:oleObj name="CS ChemDraw Drawing" r:id="rId11" imgW="3273420" imgH="2233884" progId="ChemDraw.Document.6.0">
+                <p:oleObj name="CS ChemDraw Drawing" r:id="rId10" imgW="3273420" imgH="2233884" progId="ChemDraw.Document.6.0">
                   <p:embed/>
                   <p:pic>
                     <p:nvPicPr>
@@ -14295,7 +14231,7 @@
                       <p:nvPr/>
                     </p:nvPicPr>
                     <p:blipFill>
-                      <a:blip r:embed="rId12"/>
+                      <a:blip r:embed="rId11"/>
                       <a:stretch>
                         <a:fillRect/>
                       </a:stretch>
@@ -14403,12 +14339,12 @@
           <a:graphicData uri="http://schemas.openxmlformats.org/presentationml/2006/ole">
             <mc:AlternateContent xmlns:mc="http://schemas.openxmlformats.org/markup-compatibility/2006">
               <mc:Choice xmlns:v="urn:schemas-microsoft-com:vml" Requires="v">
-                <p:oleObj spid="_x0000_s3115" name="CS ChemDraw Drawing" r:id="rId13" imgW="2427064" imgH="2221622" progId="ChemDraw.Document.6.0">
+                <p:oleObj name="CS ChemDraw Drawing" r:id="rId12" imgW="2427064" imgH="2221622" progId="ChemDraw.Document.6.0">
                   <p:embed/>
                 </p:oleObj>
               </mc:Choice>
               <mc:Fallback>
-                <p:oleObj name="CS ChemDraw Drawing" r:id="rId13" imgW="2427064" imgH="2221622" progId="ChemDraw.Document.6.0">
+                <p:oleObj name="CS ChemDraw Drawing" r:id="rId12" imgW="2427064" imgH="2221622" progId="ChemDraw.Document.6.0">
                   <p:embed/>
                   <p:pic>
                     <p:nvPicPr>
@@ -14417,7 +14353,7 @@
                       <p:nvPr/>
                     </p:nvPicPr>
                     <p:blipFill>
-                      <a:blip r:embed="rId14"/>
+                      <a:blip r:embed="rId13"/>
                       <a:stretch>
                         <a:fillRect/>
                       </a:stretch>
@@ -14525,12 +14461,12 @@
           <a:graphicData uri="http://schemas.openxmlformats.org/presentationml/2006/ole">
             <mc:AlternateContent xmlns:mc="http://schemas.openxmlformats.org/markup-compatibility/2006">
               <mc:Choice xmlns:v="urn:schemas-microsoft-com:vml" Requires="v">
-                <p:oleObj spid="_x0000_s3116" name="CS ChemDraw Drawing" r:id="rId15" imgW="1835877" imgH="2299425" progId="ChemDraw.Document.6.0">
+                <p:oleObj name="CS ChemDraw Drawing" r:id="rId14" imgW="1835877" imgH="2299425" progId="ChemDraw.Document.6.0">
                   <p:embed/>
                 </p:oleObj>
               </mc:Choice>
               <mc:Fallback>
-                <p:oleObj name="CS ChemDraw Drawing" r:id="rId15" imgW="1835877" imgH="2299425" progId="ChemDraw.Document.6.0">
+                <p:oleObj name="CS ChemDraw Drawing" r:id="rId14" imgW="1835877" imgH="2299425" progId="ChemDraw.Document.6.0">
                   <p:embed/>
                   <p:pic>
                     <p:nvPicPr>
@@ -14539,7 +14475,7 @@
                       <p:nvPr/>
                     </p:nvPicPr>
                     <p:blipFill>
-                      <a:blip r:embed="rId16"/>
+                      <a:blip r:embed="rId15"/>
                       <a:stretch>
                         <a:fillRect/>
                       </a:stretch>
@@ -14647,12 +14583,12 @@
           <a:graphicData uri="http://schemas.openxmlformats.org/presentationml/2006/ole">
             <mc:AlternateContent xmlns:mc="http://schemas.openxmlformats.org/markup-compatibility/2006">
               <mc:Choice xmlns:v="urn:schemas-microsoft-com:vml" Requires="v">
-                <p:oleObj spid="_x0000_s3117" name="CS ChemDraw Drawing" r:id="rId17" imgW="1514599" imgH="1897301" progId="ChemDraw.Document.6.0">
+                <p:oleObj name="CS ChemDraw Drawing" r:id="rId16" imgW="1514599" imgH="1897301" progId="ChemDraw.Document.6.0">
                   <p:embed/>
                 </p:oleObj>
               </mc:Choice>
               <mc:Fallback>
-                <p:oleObj name="CS ChemDraw Drawing" r:id="rId17" imgW="1514599" imgH="1897301" progId="ChemDraw.Document.6.0">
+                <p:oleObj name="CS ChemDraw Drawing" r:id="rId16" imgW="1514599" imgH="1897301" progId="ChemDraw.Document.6.0">
                   <p:embed/>
                   <p:pic>
                     <p:nvPicPr>
@@ -14661,7 +14597,7 @@
                       <p:nvPr/>
                     </p:nvPicPr>
                     <p:blipFill>
-                      <a:blip r:embed="rId18"/>
+                      <a:blip r:embed="rId17"/>
                       <a:stretch>
                         <a:fillRect/>
                       </a:stretch>
@@ -14710,12 +14646,12 @@
           <a:graphicData uri="http://schemas.openxmlformats.org/presentationml/2006/ole">
             <mc:AlternateContent xmlns:mc="http://schemas.openxmlformats.org/markup-compatibility/2006">
               <mc:Choice xmlns:v="urn:schemas-microsoft-com:vml" Requires="v">
-                <p:oleObj spid="_x0000_s3118" name="CS ChemDraw Drawing" r:id="rId19" imgW="1238796" imgH="1814846" progId="ChemDraw.Document.6.0">
+                <p:oleObj name="CS ChemDraw Drawing" r:id="rId18" imgW="1238796" imgH="1814846" progId="ChemDraw.Document.6.0">
                   <p:embed/>
                 </p:oleObj>
               </mc:Choice>
               <mc:Fallback>
-                <p:oleObj name="CS ChemDraw Drawing" r:id="rId19" imgW="1238796" imgH="1814846" progId="ChemDraw.Document.6.0">
+                <p:oleObj name="CS ChemDraw Drawing" r:id="rId18" imgW="1238796" imgH="1814846" progId="ChemDraw.Document.6.0">
                   <p:embed/>
                   <p:pic>
                     <p:nvPicPr>
@@ -14724,7 +14660,7 @@
                       <p:nvPr/>
                     </p:nvPicPr>
                     <p:blipFill>
-                      <a:blip r:embed="rId20"/>
+                      <a:blip r:embed="rId19"/>
                       <a:stretch>
                         <a:fillRect/>
                       </a:stretch>
@@ -14773,12 +14709,12 @@
           <a:graphicData uri="http://schemas.openxmlformats.org/presentationml/2006/ole">
             <mc:AlternateContent xmlns:mc="http://schemas.openxmlformats.org/markup-compatibility/2006">
               <mc:Choice xmlns:v="urn:schemas-microsoft-com:vml" Requires="v">
-                <p:oleObj spid="_x0000_s3119" name="CS ChemDraw Drawing" r:id="rId21" imgW="2073784" imgH="2541715" progId="ChemDraw.Document.6.0">
+                <p:oleObj name="CS ChemDraw Drawing" r:id="rId20" imgW="2073784" imgH="2541715" progId="ChemDraw.Document.6.0">
                   <p:embed/>
                 </p:oleObj>
               </mc:Choice>
               <mc:Fallback>
-                <p:oleObj name="CS ChemDraw Drawing" r:id="rId21" imgW="2073784" imgH="2541715" progId="ChemDraw.Document.6.0">
+                <p:oleObj name="CS ChemDraw Drawing" r:id="rId20" imgW="2073784" imgH="2541715" progId="ChemDraw.Document.6.0">
                   <p:embed/>
                   <p:pic>
                     <p:nvPicPr>
@@ -14787,7 +14723,7 @@
                       <p:nvPr/>
                     </p:nvPicPr>
                     <p:blipFill>
-                      <a:blip r:embed="rId22"/>
+                      <a:blip r:embed="rId21"/>
                       <a:stretch>
                         <a:fillRect/>
                       </a:stretch>
@@ -14836,12 +14772,12 @@
           <a:graphicData uri="http://schemas.openxmlformats.org/presentationml/2006/ole">
             <mc:AlternateContent xmlns:mc="http://schemas.openxmlformats.org/markup-compatibility/2006">
               <mc:Choice xmlns:v="urn:schemas-microsoft-com:vml" Requires="v">
-                <p:oleObj spid="_x0000_s3120" name="CS ChemDraw Drawing" r:id="rId23" imgW="1829982" imgH="2394142" progId="ChemDraw.Document.6.0">
+                <p:oleObj name="CS ChemDraw Drawing" r:id="rId22" imgW="1829982" imgH="2394142" progId="ChemDraw.Document.6.0">
                   <p:embed/>
                 </p:oleObj>
               </mc:Choice>
               <mc:Fallback>
-                <p:oleObj name="CS ChemDraw Drawing" r:id="rId23" imgW="1829982" imgH="2394142" progId="ChemDraw.Document.6.0">
+                <p:oleObj name="CS ChemDraw Drawing" r:id="rId22" imgW="1829982" imgH="2394142" progId="ChemDraw.Document.6.0">
                   <p:embed/>
                   <p:pic>
                     <p:nvPicPr>
@@ -14850,7 +14786,7 @@
                       <p:nvPr/>
                     </p:nvPicPr>
                     <p:blipFill>
-                      <a:blip r:embed="rId24"/>
+                      <a:blip r:embed="rId23"/>
                       <a:stretch>
                         <a:fillRect/>
                       </a:stretch>
@@ -14899,12 +14835,12 @@
           <a:graphicData uri="http://schemas.openxmlformats.org/presentationml/2006/ole">
             <mc:AlternateContent xmlns:mc="http://schemas.openxmlformats.org/markup-compatibility/2006">
               <mc:Choice xmlns:v="urn:schemas-microsoft-com:vml" Requires="v">
-                <p:oleObj spid="_x0000_s3121" name="CS ChemDraw Drawing" r:id="rId25" imgW="1840509" imgH="2366657" progId="ChemDraw.Document.6.0">
+                <p:oleObj name="CS ChemDraw Drawing" r:id="rId24" imgW="1840509" imgH="2366657" progId="ChemDraw.Document.6.0">
                   <p:embed/>
                 </p:oleObj>
               </mc:Choice>
               <mc:Fallback>
-                <p:oleObj name="CS ChemDraw Drawing" r:id="rId25" imgW="1840509" imgH="2366657" progId="ChemDraw.Document.6.0">
+                <p:oleObj name="CS ChemDraw Drawing" r:id="rId24" imgW="1840509" imgH="2366657" progId="ChemDraw.Document.6.0">
                   <p:embed/>
                   <p:pic>
                     <p:nvPicPr>
@@ -14913,7 +14849,7 @@
                       <p:nvPr/>
                     </p:nvPicPr>
                     <p:blipFill>
-                      <a:blip r:embed="rId26"/>
+                      <a:blip r:embed="rId25"/>
                       <a:stretch>
                         <a:fillRect/>
                       </a:stretch>
@@ -14938,6 +14874,928 @@
     <p:extLst>
       <p:ext uri="{BB962C8B-B14F-4D97-AF65-F5344CB8AC3E}">
         <p14:creationId xmlns:p14="http://schemas.microsoft.com/office/powerpoint/2010/main" val="3979848679"/>
+      </p:ext>
+    </p:extLst>
+  </p:cSld>
+  <p:clrMapOvr>
+    <a:masterClrMapping/>
+  </p:clrMapOvr>
+</p:sld>
+</file>
+
+<file path=ppt/slides/slide5.xml><?xml version="1.0" encoding="utf-8"?>
+<p:sld xmlns:a="http://schemas.openxmlformats.org/drawingml/2006/main" xmlns:r="http://schemas.openxmlformats.org/officeDocument/2006/relationships" xmlns:p="http://schemas.openxmlformats.org/presentationml/2006/main">
+  <p:cSld>
+    <p:spTree>
+      <p:nvGrpSpPr>
+        <p:cNvPr id="1" name=""/>
+        <p:cNvGrpSpPr/>
+        <p:nvPr/>
+      </p:nvGrpSpPr>
+      <p:grpSpPr>
+        <a:xfrm>
+          <a:off x="0" y="0"/>
+          <a:ext cx="0" cy="0"/>
+          <a:chOff x="0" y="0"/>
+          <a:chExt cx="0" cy="0"/>
+        </a:xfrm>
+      </p:grpSpPr>
+      <p:sp>
+        <p:nvSpPr>
+          <p:cNvPr id="5" name="Retângulo: Cantos Arredondados 4">
+            <a:extLst>
+              <a:ext uri="{FF2B5EF4-FFF2-40B4-BE49-F238E27FC236}">
+                <a16:creationId xmlns:a16="http://schemas.microsoft.com/office/drawing/2014/main" id="{90E86114-E759-48F3-9652-76E5F3AA3658}"/>
+              </a:ext>
+            </a:extLst>
+          </p:cNvPr>
+          <p:cNvSpPr>
+            <a:spLocks noGrp="1" noRot="1" noMove="1" noResize="1" noEditPoints="1" noAdjustHandles="1" noChangeArrowheads="1" noChangeShapeType="1"/>
+          </p:cNvSpPr>
+          <p:nvPr/>
+        </p:nvSpPr>
+        <p:spPr>
+          <a:xfrm>
+            <a:off x="87031" y="51597"/>
+            <a:ext cx="11346423" cy="10982129"/>
+          </a:xfrm>
+          <a:prstGeom prst="roundRect">
+            <a:avLst>
+              <a:gd name="adj" fmla="val 1159"/>
+            </a:avLst>
+          </a:prstGeom>
+          <a:solidFill>
+            <a:schemeClr val="bg1">
+              <a:lumMod val="95000"/>
+            </a:schemeClr>
+          </a:solidFill>
+          <a:ln w="28575">
+            <a:solidFill>
+              <a:schemeClr val="tx1">
+                <a:lumMod val="75000"/>
+                <a:lumOff val="25000"/>
+              </a:schemeClr>
+            </a:solidFill>
+          </a:ln>
+        </p:spPr>
+        <p:style>
+          <a:lnRef idx="2">
+            <a:schemeClr val="accent1">
+              <a:shade val="50000"/>
+            </a:schemeClr>
+          </a:lnRef>
+          <a:fillRef idx="1">
+            <a:schemeClr val="accent1"/>
+          </a:fillRef>
+          <a:effectRef idx="0">
+            <a:schemeClr val="accent1"/>
+          </a:effectRef>
+          <a:fontRef idx="minor">
+            <a:schemeClr val="lt1"/>
+          </a:fontRef>
+        </p:style>
+        <p:txBody>
+          <a:bodyPr rtlCol="0" anchor="ctr"/>
+          <a:lstStyle/>
+          <a:p>
+            <a:pPr algn="ctr"/>
+            <a:endParaRPr lang="pt-BR" sz="1893" u="sng" dirty="0"/>
+          </a:p>
+        </p:txBody>
+      </p:sp>
+      <p:graphicFrame>
+        <p:nvGraphicFramePr>
+          <p:cNvPr id="10" name="Objeto 9">
+            <a:extLst>
+              <a:ext uri="{FF2B5EF4-FFF2-40B4-BE49-F238E27FC236}">
+                <a16:creationId xmlns:a16="http://schemas.microsoft.com/office/drawing/2014/main" id="{486CE447-ABED-B1F9-8350-B5A1008EE352}"/>
+              </a:ext>
+            </a:extLst>
+          </p:cNvPr>
+          <p:cNvGraphicFramePr>
+            <a:graphicFrameLocks noChangeAspect="1"/>
+          </p:cNvGraphicFramePr>
+          <p:nvPr>
+            <p:extLst>
+              <p:ext uri="{D42A27DB-BD31-4B8C-83A1-F6EECF244321}">
+                <p14:modId xmlns:p14="http://schemas.microsoft.com/office/powerpoint/2010/main" val="3659042774"/>
+              </p:ext>
+            </p:extLst>
+          </p:nvPr>
+        </p:nvGraphicFramePr>
+        <p:xfrm>
+          <a:off x="7821109" y="946301"/>
+          <a:ext cx="2185987" cy="2105631"/>
+        </p:xfrm>
+        <a:graphic>
+          <a:graphicData uri="http://schemas.openxmlformats.org/presentationml/2006/ole">
+            <mc:AlternateContent xmlns:mc="http://schemas.openxmlformats.org/markup-compatibility/2006">
+              <mc:Choice xmlns:v="urn:schemas-microsoft-com:vml" Requires="v">
+                <p:oleObj name="CS ChemDraw Drawing" r:id="rId2" imgW="2521980" imgH="2427425" progId="ChemDraw.Document.6.0">
+                  <p:embed/>
+                </p:oleObj>
+              </mc:Choice>
+              <mc:Fallback>
+                <p:oleObj name="CS ChemDraw Drawing" r:id="rId2" imgW="2521980" imgH="2427425" progId="ChemDraw.Document.6.0">
+                  <p:embed/>
+                  <p:pic>
+                    <p:nvPicPr>
+                      <p:cNvPr id="41" name="Objeto 40">
+                        <a:extLst>
+                          <a:ext uri="{FF2B5EF4-FFF2-40B4-BE49-F238E27FC236}">
+                            <a16:creationId xmlns:a16="http://schemas.microsoft.com/office/drawing/2014/main" id="{4B1D7B2C-0356-4C6E-866C-20932904D366}"/>
+                          </a:ext>
+                        </a:extLst>
+                      </p:cNvPr>
+                      <p:cNvPicPr/>
+                      <p:nvPr/>
+                    </p:nvPicPr>
+                    <p:blipFill>
+                      <a:blip r:embed="rId3"/>
+                      <a:stretch>
+                        <a:fillRect/>
+                      </a:stretch>
+                    </p:blipFill>
+                    <p:spPr>
+                      <a:xfrm>
+                        <a:off x="7821109" y="946301"/>
+                        <a:ext cx="2185987" cy="2105631"/>
+                      </a:xfrm>
+                      <a:prstGeom prst="rect">
+                        <a:avLst/>
+                      </a:prstGeom>
+                    </p:spPr>
+                  </p:pic>
+                </p:oleObj>
+              </mc:Fallback>
+            </mc:AlternateContent>
+          </a:graphicData>
+        </a:graphic>
+      </p:graphicFrame>
+      <p:graphicFrame>
+        <p:nvGraphicFramePr>
+          <p:cNvPr id="17" name="Objeto 16">
+            <a:extLst>
+              <a:ext uri="{FF2B5EF4-FFF2-40B4-BE49-F238E27FC236}">
+                <a16:creationId xmlns:a16="http://schemas.microsoft.com/office/drawing/2014/main" id="{BE7BCA88-51B5-7DB4-6859-A7366FF03C75}"/>
+              </a:ext>
+            </a:extLst>
+          </p:cNvPr>
+          <p:cNvGraphicFramePr>
+            <a:graphicFrameLocks noChangeAspect="1"/>
+          </p:cNvGraphicFramePr>
+          <p:nvPr>
+            <p:extLst>
+              <p:ext uri="{D42A27DB-BD31-4B8C-83A1-F6EECF244321}">
+                <p14:modId xmlns:p14="http://schemas.microsoft.com/office/powerpoint/2010/main" val="1249621383"/>
+              </p:ext>
+            </p:extLst>
+          </p:nvPr>
+        </p:nvGraphicFramePr>
+        <p:xfrm>
+          <a:off x="843643" y="1339850"/>
+          <a:ext cx="774700" cy="1365250"/>
+        </p:xfrm>
+        <a:graphic>
+          <a:graphicData uri="http://schemas.openxmlformats.org/presentationml/2006/ole">
+            <mc:AlternateContent xmlns:mc="http://schemas.openxmlformats.org/markup-compatibility/2006">
+              <mc:Choice xmlns:v="urn:schemas-microsoft-com:vml" Requires="v">
+                <p:oleObj name="CS ChemDraw Drawing" r:id="rId4" imgW="775227" imgH="1365331" progId="ChemDraw.Document.6.0">
+                  <p:embed/>
+                </p:oleObj>
+              </mc:Choice>
+              <mc:Fallback>
+                <p:oleObj name="CS ChemDraw Drawing" r:id="rId4" imgW="775227" imgH="1365331" progId="ChemDraw.Document.6.0">
+                  <p:embed/>
+                  <p:pic>
+                    <p:nvPicPr>
+                      <p:cNvPr id="0" name=""/>
+                      <p:cNvPicPr/>
+                      <p:nvPr/>
+                    </p:nvPicPr>
+                    <p:blipFill>
+                      <a:blip r:embed="rId5"/>
+                      <a:stretch>
+                        <a:fillRect/>
+                      </a:stretch>
+                    </p:blipFill>
+                    <p:spPr>
+                      <a:xfrm>
+                        <a:off x="843643" y="1339850"/>
+                        <a:ext cx="774700" cy="1365250"/>
+                      </a:xfrm>
+                      <a:prstGeom prst="rect">
+                        <a:avLst/>
+                      </a:prstGeom>
+                    </p:spPr>
+                  </p:pic>
+                </p:oleObj>
+              </mc:Fallback>
+            </mc:AlternateContent>
+          </a:graphicData>
+        </a:graphic>
+      </p:graphicFrame>
+      <p:graphicFrame>
+        <p:nvGraphicFramePr>
+          <p:cNvPr id="18" name="Objeto 17">
+            <a:extLst>
+              <a:ext uri="{FF2B5EF4-FFF2-40B4-BE49-F238E27FC236}">
+                <a16:creationId xmlns:a16="http://schemas.microsoft.com/office/drawing/2014/main" id="{7EEE5EF1-AB1B-107C-DDB4-291CDB15BD77}"/>
+              </a:ext>
+            </a:extLst>
+          </p:cNvPr>
+          <p:cNvGraphicFramePr>
+            <a:graphicFrameLocks noChangeAspect="1"/>
+          </p:cNvGraphicFramePr>
+          <p:nvPr>
+            <p:extLst>
+              <p:ext uri="{D42A27DB-BD31-4B8C-83A1-F6EECF244321}">
+                <p14:modId xmlns:p14="http://schemas.microsoft.com/office/powerpoint/2010/main" val="1271275081"/>
+              </p:ext>
+            </p:extLst>
+          </p:nvPr>
+        </p:nvGraphicFramePr>
+        <p:xfrm>
+          <a:off x="2393702" y="1166132"/>
+          <a:ext cx="1647825" cy="2235200"/>
+        </p:xfrm>
+        <a:graphic>
+          <a:graphicData uri="http://schemas.openxmlformats.org/presentationml/2006/ole">
+            <mc:AlternateContent xmlns:mc="http://schemas.openxmlformats.org/markup-compatibility/2006">
+              <mc:Choice xmlns:v="urn:schemas-microsoft-com:vml" Requires="v">
+                <p:oleObj name="CS ChemDraw Drawing" r:id="rId6" imgW="1648604" imgH="2235503" progId="ChemDraw.Document.6.0">
+                  <p:embed/>
+                </p:oleObj>
+              </mc:Choice>
+              <mc:Fallback>
+                <p:oleObj name="CS ChemDraw Drawing" r:id="rId6" imgW="1648604" imgH="2235503" progId="ChemDraw.Document.6.0">
+                  <p:embed/>
+                  <p:pic>
+                    <p:nvPicPr>
+                      <p:cNvPr id="0" name=""/>
+                      <p:cNvPicPr/>
+                      <p:nvPr/>
+                    </p:nvPicPr>
+                    <p:blipFill>
+                      <a:blip r:embed="rId7"/>
+                      <a:stretch>
+                        <a:fillRect/>
+                      </a:stretch>
+                    </p:blipFill>
+                    <p:spPr>
+                      <a:xfrm>
+                        <a:off x="2393702" y="1166132"/>
+                        <a:ext cx="1647825" cy="2235200"/>
+                      </a:xfrm>
+                      <a:prstGeom prst="rect">
+                        <a:avLst/>
+                      </a:prstGeom>
+                    </p:spPr>
+                  </p:pic>
+                </p:oleObj>
+              </mc:Fallback>
+            </mc:AlternateContent>
+          </a:graphicData>
+        </a:graphic>
+      </p:graphicFrame>
+      <p:graphicFrame>
+        <p:nvGraphicFramePr>
+          <p:cNvPr id="19" name="Objeto 18">
+            <a:extLst>
+              <a:ext uri="{FF2B5EF4-FFF2-40B4-BE49-F238E27FC236}">
+                <a16:creationId xmlns:a16="http://schemas.microsoft.com/office/drawing/2014/main" id="{13BE817E-A33D-720D-FE79-B9C3EB9EBF94}"/>
+              </a:ext>
+            </a:extLst>
+          </p:cNvPr>
+          <p:cNvGraphicFramePr>
+            <a:graphicFrameLocks noChangeAspect="1"/>
+          </p:cNvGraphicFramePr>
+          <p:nvPr>
+            <p:extLst>
+              <p:ext uri="{D42A27DB-BD31-4B8C-83A1-F6EECF244321}">
+                <p14:modId xmlns:p14="http://schemas.microsoft.com/office/powerpoint/2010/main" val="2351987580"/>
+              </p:ext>
+            </p:extLst>
+          </p:nvPr>
+        </p:nvGraphicFramePr>
+        <p:xfrm>
+          <a:off x="4458510" y="1048657"/>
+          <a:ext cx="2185987" cy="2470150"/>
+        </p:xfrm>
+        <a:graphic>
+          <a:graphicData uri="http://schemas.openxmlformats.org/presentationml/2006/ole">
+            <mc:AlternateContent xmlns:mc="http://schemas.openxmlformats.org/markup-compatibility/2006">
+              <mc:Choice xmlns:v="urn:schemas-microsoft-com:vml" Requires="v">
+                <p:oleObj name="CS ChemDraw Drawing" r:id="rId8" imgW="2186509" imgH="2470032" progId="ChemDraw.Document.6.0">
+                  <p:embed/>
+                </p:oleObj>
+              </mc:Choice>
+              <mc:Fallback>
+                <p:oleObj name="CS ChemDraw Drawing" r:id="rId8" imgW="2186509" imgH="2470032" progId="ChemDraw.Document.6.0">
+                  <p:embed/>
+                  <p:pic>
+                    <p:nvPicPr>
+                      <p:cNvPr id="0" name=""/>
+                      <p:cNvPicPr/>
+                      <p:nvPr/>
+                    </p:nvPicPr>
+                    <p:blipFill>
+                      <a:blip r:embed="rId9"/>
+                      <a:stretch>
+                        <a:fillRect/>
+                      </a:stretch>
+                    </p:blipFill>
+                    <p:spPr>
+                      <a:xfrm>
+                        <a:off x="4458510" y="1048657"/>
+                        <a:ext cx="2185987" cy="2470150"/>
+                      </a:xfrm>
+                      <a:prstGeom prst="rect">
+                        <a:avLst/>
+                      </a:prstGeom>
+                    </p:spPr>
+                  </p:pic>
+                </p:oleObj>
+              </mc:Fallback>
+            </mc:AlternateContent>
+          </a:graphicData>
+        </a:graphic>
+      </p:graphicFrame>
+      <p:graphicFrame>
+        <p:nvGraphicFramePr>
+          <p:cNvPr id="21" name="Objeto 20">
+            <a:extLst>
+              <a:ext uri="{FF2B5EF4-FFF2-40B4-BE49-F238E27FC236}">
+                <a16:creationId xmlns:a16="http://schemas.microsoft.com/office/drawing/2014/main" id="{B38E84D9-E90B-333A-5F79-24051C68D335}"/>
+              </a:ext>
+            </a:extLst>
+          </p:cNvPr>
+          <p:cNvGraphicFramePr>
+            <a:graphicFrameLocks noChangeAspect="1"/>
+          </p:cNvGraphicFramePr>
+          <p:nvPr>
+            <p:extLst>
+              <p:ext uri="{D42A27DB-BD31-4B8C-83A1-F6EECF244321}">
+                <p14:modId xmlns:p14="http://schemas.microsoft.com/office/powerpoint/2010/main" val="301782824"/>
+              </p:ext>
+            </p:extLst>
+          </p:nvPr>
+        </p:nvGraphicFramePr>
+        <p:xfrm>
+          <a:off x="553083" y="3534920"/>
+          <a:ext cx="1201737" cy="2151062"/>
+        </p:xfrm>
+        <a:graphic>
+          <a:graphicData uri="http://schemas.openxmlformats.org/presentationml/2006/ole">
+            <mc:AlternateContent xmlns:mc="http://schemas.openxmlformats.org/markup-compatibility/2006">
+              <mc:Choice xmlns:v="urn:schemas-microsoft-com:vml" Requires="v">
+                <p:oleObj name="CS ChemDraw Drawing" r:id="rId10" imgW="1202331" imgH="2151442" progId="ChemDraw.Document.6.0">
+                  <p:embed/>
+                </p:oleObj>
+              </mc:Choice>
+              <mc:Fallback>
+                <p:oleObj name="CS ChemDraw Drawing" r:id="rId10" imgW="1202331" imgH="2151442" progId="ChemDraw.Document.6.0">
+                  <p:embed/>
+                  <p:pic>
+                    <p:nvPicPr>
+                      <p:cNvPr id="0" name=""/>
+                      <p:cNvPicPr/>
+                      <p:nvPr/>
+                    </p:nvPicPr>
+                    <p:blipFill>
+                      <a:blip r:embed="rId11"/>
+                      <a:stretch>
+                        <a:fillRect/>
+                      </a:stretch>
+                    </p:blipFill>
+                    <p:spPr>
+                      <a:xfrm>
+                        <a:off x="553083" y="3534920"/>
+                        <a:ext cx="1201737" cy="2151062"/>
+                      </a:xfrm>
+                      <a:prstGeom prst="rect">
+                        <a:avLst/>
+                      </a:prstGeom>
+                    </p:spPr>
+                  </p:pic>
+                </p:oleObj>
+              </mc:Fallback>
+            </mc:AlternateContent>
+          </a:graphicData>
+        </a:graphic>
+      </p:graphicFrame>
+      <p:sp>
+        <p:nvSpPr>
+          <p:cNvPr id="7" name="CaixaDeTexto 6">
+            <a:extLst>
+              <a:ext uri="{FF2B5EF4-FFF2-40B4-BE49-F238E27FC236}">
+                <a16:creationId xmlns:a16="http://schemas.microsoft.com/office/drawing/2014/main" id="{873057E6-C705-49AB-B737-335D3A936A56}"/>
+              </a:ext>
+            </a:extLst>
+          </p:cNvPr>
+          <p:cNvSpPr txBox="1"/>
+          <p:nvPr/>
+        </p:nvSpPr>
+        <p:spPr>
+          <a:xfrm>
+            <a:off x="199856" y="126399"/>
+            <a:ext cx="4083618" cy="383631"/>
+          </a:xfrm>
+          <a:prstGeom prst="rect">
+            <a:avLst/>
+          </a:prstGeom>
+          <a:noFill/>
+        </p:spPr>
+        <p:txBody>
+          <a:bodyPr wrap="none" rtlCol="0">
+            <a:spAutoFit/>
+          </a:bodyPr>
+          <a:lstStyle/>
+          <a:p>
+            <a:r>
+              <a:rPr lang="pt-BR" sz="1893" dirty="0" err="1">
+                <a:solidFill>
+                  <a:schemeClr val="tx1">
+                    <a:lumMod val="85000"/>
+                    <a:lumOff val="15000"/>
+                  </a:schemeClr>
+                </a:solidFill>
+                <a:latin typeface="Avenir Next LT Pro Demi" panose="020B0704020202020204" pitchFamily="34" charset="0"/>
+                <a:cs typeface="Aharoni" panose="02010803020104030203" pitchFamily="2" charset="-79"/>
+              </a:rPr>
+              <a:t>Tetrapodal</a:t>
+            </a:r>
+            <a:r>
+              <a:rPr lang="pt-BR" sz="1893" dirty="0">
+                <a:solidFill>
+                  <a:schemeClr val="tx1">
+                    <a:lumMod val="85000"/>
+                    <a:lumOff val="15000"/>
+                  </a:schemeClr>
+                </a:solidFill>
+                <a:latin typeface="Avenir Next LT Pro Demi" panose="020B0704020202020204" pitchFamily="34" charset="0"/>
+                <a:cs typeface="Aharoni" panose="02010803020104030203" pitchFamily="2" charset="-79"/>
+              </a:rPr>
+              <a:t> 2D Building </a:t>
+            </a:r>
+            <a:r>
+              <a:rPr lang="pt-BR" sz="1893" dirty="0" err="1">
+                <a:solidFill>
+                  <a:schemeClr val="tx1">
+                    <a:lumMod val="85000"/>
+                    <a:lumOff val="15000"/>
+                  </a:schemeClr>
+                </a:solidFill>
+                <a:latin typeface="Avenir Next LT Pro Demi" panose="020B0704020202020204" pitchFamily="34" charset="0"/>
+                <a:cs typeface="Aharoni" panose="02010803020104030203" pitchFamily="2" charset="-79"/>
+              </a:rPr>
+              <a:t>blocks</a:t>
+            </a:r>
+            <a:r>
+              <a:rPr lang="pt-BR" sz="1893" dirty="0">
+                <a:solidFill>
+                  <a:schemeClr val="tx1">
+                    <a:lumMod val="85000"/>
+                    <a:lumOff val="15000"/>
+                  </a:schemeClr>
+                </a:solidFill>
+                <a:latin typeface="Avenir Next LT Pro Demi" panose="020B0704020202020204" pitchFamily="34" charset="0"/>
+                <a:cs typeface="Aharoni" panose="02010803020104030203" pitchFamily="2" charset="-79"/>
+              </a:rPr>
+              <a:t> (C4)</a:t>
+            </a:r>
+          </a:p>
+        </p:txBody>
+      </p:sp>
+      <p:sp>
+        <p:nvSpPr>
+          <p:cNvPr id="12" name="Google Shape;298;p9">
+            <a:extLst>
+              <a:ext uri="{FF2B5EF4-FFF2-40B4-BE49-F238E27FC236}">
+                <a16:creationId xmlns:a16="http://schemas.microsoft.com/office/drawing/2014/main" id="{32DD3DB6-CB44-E0E5-6CB4-0C3326F0120F}"/>
+              </a:ext>
+            </a:extLst>
+          </p:cNvPr>
+          <p:cNvSpPr txBox="1"/>
+          <p:nvPr/>
+        </p:nvSpPr>
+        <p:spPr>
+          <a:xfrm>
+            <a:off x="2876652" y="2896574"/>
+            <a:ext cx="631426" cy="310717"/>
+          </a:xfrm>
+          <a:prstGeom prst="rect">
+            <a:avLst/>
+          </a:prstGeom>
+          <a:noFill/>
+          <a:ln>
+            <a:noFill/>
+          </a:ln>
+        </p:spPr>
+        <p:txBody>
+          <a:bodyPr spcFirstLastPara="1" wrap="square" lIns="94378" tIns="47176" rIns="94378" bIns="47176" anchor="t" anchorCtr="0">
+            <a:spAutoFit/>
+          </a:bodyPr>
+          <a:lstStyle/>
+          <a:p>
+            <a:pPr algn="ctr">
+              <a:buClr>
+                <a:srgbClr val="000000"/>
+              </a:buClr>
+              <a:buSzPts val="1200"/>
+            </a:pPr>
+            <a:r>
+              <a:rPr lang="pt-BR" sz="1400" b="1" dirty="0">
+                <a:solidFill>
+                  <a:srgbClr val="00B050"/>
+                </a:solidFill>
+                <a:latin typeface="Avenir"/>
+                <a:sym typeface="Avenir"/>
+              </a:rPr>
+              <a:t>PORP</a:t>
+            </a:r>
+            <a:endParaRPr sz="1600" dirty="0">
+              <a:solidFill>
+                <a:srgbClr val="00B050"/>
+              </a:solidFill>
+              <a:latin typeface="Arial"/>
+              <a:ea typeface="Arial"/>
+              <a:cs typeface="Arial"/>
+              <a:sym typeface="Arial"/>
+            </a:endParaRPr>
+          </a:p>
+        </p:txBody>
+      </p:sp>
+      <p:sp>
+        <p:nvSpPr>
+          <p:cNvPr id="13" name="Google Shape;298;p9">
+            <a:extLst>
+              <a:ext uri="{FF2B5EF4-FFF2-40B4-BE49-F238E27FC236}">
+                <a16:creationId xmlns:a16="http://schemas.microsoft.com/office/drawing/2014/main" id="{FE6D4824-7805-139B-1896-07980D7DA3C5}"/>
+              </a:ext>
+            </a:extLst>
+          </p:cNvPr>
+          <p:cNvSpPr txBox="1"/>
+          <p:nvPr/>
+        </p:nvSpPr>
+        <p:spPr>
+          <a:xfrm>
+            <a:off x="5253752" y="2904805"/>
+            <a:ext cx="631426" cy="310717"/>
+          </a:xfrm>
+          <a:prstGeom prst="rect">
+            <a:avLst/>
+          </a:prstGeom>
+          <a:noFill/>
+          <a:ln>
+            <a:noFill/>
+          </a:ln>
+        </p:spPr>
+        <p:txBody>
+          <a:bodyPr spcFirstLastPara="1" wrap="square" lIns="94378" tIns="47176" rIns="94378" bIns="47176" anchor="t" anchorCtr="0">
+            <a:spAutoFit/>
+          </a:bodyPr>
+          <a:lstStyle/>
+          <a:p>
+            <a:pPr algn="ctr">
+              <a:buClr>
+                <a:srgbClr val="000000"/>
+              </a:buClr>
+              <a:buSzPts val="1200"/>
+            </a:pPr>
+            <a:r>
+              <a:rPr lang="pt-BR" sz="1400" b="1" dirty="0">
+                <a:solidFill>
+                  <a:srgbClr val="00B050"/>
+                </a:solidFill>
+                <a:latin typeface="Avenir"/>
+                <a:sym typeface="Avenir"/>
+              </a:rPr>
+              <a:t>PHPR</a:t>
+            </a:r>
+            <a:endParaRPr sz="1600" dirty="0">
+              <a:solidFill>
+                <a:srgbClr val="00B050"/>
+              </a:solidFill>
+              <a:latin typeface="Arial"/>
+              <a:ea typeface="Arial"/>
+              <a:cs typeface="Arial"/>
+              <a:sym typeface="Arial"/>
+            </a:endParaRPr>
+          </a:p>
+        </p:txBody>
+      </p:sp>
+      <p:sp>
+        <p:nvSpPr>
+          <p:cNvPr id="14" name="Google Shape;298;p9">
+            <a:extLst>
+              <a:ext uri="{FF2B5EF4-FFF2-40B4-BE49-F238E27FC236}">
+                <a16:creationId xmlns:a16="http://schemas.microsoft.com/office/drawing/2014/main" id="{2C496953-AD46-738E-14BC-B53F6F0416BD}"/>
+              </a:ext>
+            </a:extLst>
+          </p:cNvPr>
+          <p:cNvSpPr txBox="1"/>
+          <p:nvPr/>
+        </p:nvSpPr>
+        <p:spPr>
+          <a:xfrm>
+            <a:off x="814992" y="5063219"/>
+            <a:ext cx="631426" cy="310717"/>
+          </a:xfrm>
+          <a:prstGeom prst="rect">
+            <a:avLst/>
+          </a:prstGeom>
+          <a:noFill/>
+          <a:ln>
+            <a:noFill/>
+          </a:ln>
+        </p:spPr>
+        <p:txBody>
+          <a:bodyPr spcFirstLastPara="1" wrap="square" lIns="94378" tIns="47176" rIns="94378" bIns="47176" anchor="t" anchorCtr="0">
+            <a:spAutoFit/>
+          </a:bodyPr>
+          <a:lstStyle/>
+          <a:p>
+            <a:pPr algn="ctr">
+              <a:buClr>
+                <a:srgbClr val="000000"/>
+              </a:buClr>
+              <a:buSzPts val="1200"/>
+            </a:pPr>
+            <a:r>
+              <a:rPr lang="pt-BR" sz="1400" b="1" dirty="0">
+                <a:solidFill>
+                  <a:srgbClr val="00B050"/>
+                </a:solidFill>
+                <a:latin typeface="Avenir"/>
+                <a:sym typeface="Avenir"/>
+              </a:rPr>
+              <a:t>PYRN</a:t>
+            </a:r>
+            <a:endParaRPr sz="1600" dirty="0">
+              <a:solidFill>
+                <a:srgbClr val="00B050"/>
+              </a:solidFill>
+              <a:latin typeface="Arial"/>
+              <a:ea typeface="Arial"/>
+              <a:cs typeface="Arial"/>
+              <a:sym typeface="Arial"/>
+            </a:endParaRPr>
+          </a:p>
+        </p:txBody>
+      </p:sp>
+      <p:sp>
+        <p:nvSpPr>
+          <p:cNvPr id="15" name="Google Shape;298;p9">
+            <a:extLst>
+              <a:ext uri="{FF2B5EF4-FFF2-40B4-BE49-F238E27FC236}">
+                <a16:creationId xmlns:a16="http://schemas.microsoft.com/office/drawing/2014/main" id="{2CBB8D8E-76DB-CD9B-575D-D3AEA7DD0860}"/>
+              </a:ext>
+            </a:extLst>
+          </p:cNvPr>
+          <p:cNvSpPr txBox="1"/>
+          <p:nvPr/>
+        </p:nvSpPr>
+        <p:spPr>
+          <a:xfrm>
+            <a:off x="8527110" y="2594029"/>
+            <a:ext cx="631426" cy="310717"/>
+          </a:xfrm>
+          <a:prstGeom prst="rect">
+            <a:avLst/>
+          </a:prstGeom>
+          <a:noFill/>
+          <a:ln>
+            <a:noFill/>
+          </a:ln>
+        </p:spPr>
+        <p:txBody>
+          <a:bodyPr spcFirstLastPara="1" wrap="square" lIns="94378" tIns="47176" rIns="94378" bIns="47176" anchor="t" anchorCtr="0">
+            <a:spAutoFit/>
+          </a:bodyPr>
+          <a:lstStyle/>
+          <a:p>
+            <a:pPr algn="ctr">
+              <a:buClr>
+                <a:srgbClr val="000000"/>
+              </a:buClr>
+              <a:buSzPts val="1200"/>
+            </a:pPr>
+            <a:r>
+              <a:rPr lang="pt-BR" sz="1400" b="1" dirty="0">
+                <a:solidFill>
+                  <a:srgbClr val="00B050"/>
+                </a:solidFill>
+                <a:latin typeface="Avenir"/>
+                <a:sym typeface="Avenir"/>
+              </a:rPr>
+              <a:t>TPPY</a:t>
+            </a:r>
+            <a:endParaRPr sz="1600" dirty="0">
+              <a:solidFill>
+                <a:srgbClr val="00B050"/>
+              </a:solidFill>
+              <a:latin typeface="Arial"/>
+              <a:ea typeface="Arial"/>
+              <a:cs typeface="Arial"/>
+              <a:sym typeface="Arial"/>
+            </a:endParaRPr>
+          </a:p>
+        </p:txBody>
+      </p:sp>
+      <p:sp>
+        <p:nvSpPr>
+          <p:cNvPr id="16" name="Google Shape;298;p9">
+            <a:extLst>
+              <a:ext uri="{FF2B5EF4-FFF2-40B4-BE49-F238E27FC236}">
+                <a16:creationId xmlns:a16="http://schemas.microsoft.com/office/drawing/2014/main" id="{78E0BA36-A590-A127-F79B-91F8E28E1DEB}"/>
+              </a:ext>
+            </a:extLst>
+          </p:cNvPr>
+          <p:cNvSpPr txBox="1"/>
+          <p:nvPr/>
+        </p:nvSpPr>
+        <p:spPr>
+          <a:xfrm>
+            <a:off x="891706" y="2705100"/>
+            <a:ext cx="631426" cy="310717"/>
+          </a:xfrm>
+          <a:prstGeom prst="rect">
+            <a:avLst/>
+          </a:prstGeom>
+          <a:noFill/>
+          <a:ln>
+            <a:noFill/>
+          </a:ln>
+        </p:spPr>
+        <p:txBody>
+          <a:bodyPr spcFirstLastPara="1" wrap="square" lIns="94378" tIns="47176" rIns="94378" bIns="47176" anchor="t" anchorCtr="0">
+            <a:spAutoFit/>
+          </a:bodyPr>
+          <a:lstStyle/>
+          <a:p>
+            <a:pPr algn="ctr">
+              <a:buClr>
+                <a:srgbClr val="000000"/>
+              </a:buClr>
+              <a:buSzPts val="1200"/>
+            </a:pPr>
+            <a:r>
+              <a:rPr lang="pt-BR" sz="1400" b="1" dirty="0">
+                <a:solidFill>
+                  <a:srgbClr val="00B050"/>
+                </a:solidFill>
+                <a:latin typeface="Avenir"/>
+                <a:sym typeface="Avenir"/>
+              </a:rPr>
+              <a:t>BENZ</a:t>
+            </a:r>
+            <a:endParaRPr sz="1600" dirty="0">
+              <a:solidFill>
+                <a:srgbClr val="00B050"/>
+              </a:solidFill>
+              <a:latin typeface="Arial"/>
+              <a:ea typeface="Arial"/>
+              <a:cs typeface="Arial"/>
+              <a:sym typeface="Arial"/>
+            </a:endParaRPr>
+          </a:p>
+        </p:txBody>
+      </p:sp>
+      <p:graphicFrame>
+        <p:nvGraphicFramePr>
+          <p:cNvPr id="22" name="Objeto 21">
+            <a:extLst>
+              <a:ext uri="{FF2B5EF4-FFF2-40B4-BE49-F238E27FC236}">
+                <a16:creationId xmlns:a16="http://schemas.microsoft.com/office/drawing/2014/main" id="{3A632131-91DE-DDAB-86F8-C9F70B9BFAF6}"/>
+              </a:ext>
+            </a:extLst>
+          </p:cNvPr>
+          <p:cNvGraphicFramePr>
+            <a:graphicFrameLocks noChangeAspect="1"/>
+          </p:cNvGraphicFramePr>
+          <p:nvPr>
+            <p:extLst>
+              <p:ext uri="{D42A27DB-BD31-4B8C-83A1-F6EECF244321}">
+                <p14:modId xmlns:p14="http://schemas.microsoft.com/office/powerpoint/2010/main" val="3374840310"/>
+              </p:ext>
+            </p:extLst>
+          </p:nvPr>
+        </p:nvGraphicFramePr>
+        <p:xfrm>
+          <a:off x="2987675" y="3557588"/>
+          <a:ext cx="1612900" cy="2279650"/>
+        </p:xfrm>
+        <a:graphic>
+          <a:graphicData uri="http://schemas.openxmlformats.org/presentationml/2006/ole">
+            <mc:AlternateContent xmlns:mc="http://schemas.openxmlformats.org/markup-compatibility/2006">
+              <mc:Choice xmlns:v="urn:schemas-microsoft-com:vml" Requires="v">
+                <p:oleObj name="CS ChemDraw Drawing" r:id="rId12" imgW="1612181" imgH="2279261" progId="ChemDraw.Document.6.0">
+                  <p:embed/>
+                </p:oleObj>
+              </mc:Choice>
+              <mc:Fallback>
+                <p:oleObj name="CS ChemDraw Drawing" r:id="rId12" imgW="1612181" imgH="2279261" progId="ChemDraw.Document.6.0">
+                  <p:embed/>
+                  <p:pic>
+                    <p:nvPicPr>
+                      <p:cNvPr id="21" name="Objeto 20">
+                        <a:extLst>
+                          <a:ext uri="{FF2B5EF4-FFF2-40B4-BE49-F238E27FC236}">
+                            <a16:creationId xmlns:a16="http://schemas.microsoft.com/office/drawing/2014/main" id="{B38E84D9-E90B-333A-5F79-24051C68D335}"/>
+                          </a:ext>
+                        </a:extLst>
+                      </p:cNvPr>
+                      <p:cNvPicPr/>
+                      <p:nvPr/>
+                    </p:nvPicPr>
+                    <p:blipFill>
+                      <a:blip r:embed="rId13"/>
+                      <a:stretch>
+                        <a:fillRect/>
+                      </a:stretch>
+                    </p:blipFill>
+                    <p:spPr>
+                      <a:xfrm>
+                        <a:off x="2987675" y="3557588"/>
+                        <a:ext cx="1612900" cy="2279650"/>
+                      </a:xfrm>
+                      <a:prstGeom prst="rect">
+                        <a:avLst/>
+                      </a:prstGeom>
+                    </p:spPr>
+                  </p:pic>
+                </p:oleObj>
+              </mc:Fallback>
+            </mc:AlternateContent>
+          </a:graphicData>
+        </a:graphic>
+      </p:graphicFrame>
+      <p:sp>
+        <p:nvSpPr>
+          <p:cNvPr id="23" name="Google Shape;298;p9">
+            <a:extLst>
+              <a:ext uri="{FF2B5EF4-FFF2-40B4-BE49-F238E27FC236}">
+                <a16:creationId xmlns:a16="http://schemas.microsoft.com/office/drawing/2014/main" id="{E4C8FEC3-A78B-D599-6A2F-2257505435BE}"/>
+              </a:ext>
+            </a:extLst>
+          </p:cNvPr>
+          <p:cNvSpPr txBox="1"/>
+          <p:nvPr/>
+        </p:nvSpPr>
+        <p:spPr>
+          <a:xfrm>
+            <a:off x="3478412" y="5131774"/>
+            <a:ext cx="631426" cy="310717"/>
+          </a:xfrm>
+          <a:prstGeom prst="rect">
+            <a:avLst/>
+          </a:prstGeom>
+          <a:noFill/>
+          <a:ln>
+            <a:noFill/>
+          </a:ln>
+        </p:spPr>
+        <p:txBody>
+          <a:bodyPr spcFirstLastPara="1" wrap="square" lIns="94378" tIns="47176" rIns="94378" bIns="47176" anchor="t" anchorCtr="0">
+            <a:spAutoFit/>
+          </a:bodyPr>
+          <a:lstStyle/>
+          <a:p>
+            <a:pPr algn="ctr">
+              <a:buClr>
+                <a:srgbClr val="000000"/>
+              </a:buClr>
+              <a:buSzPts val="1200"/>
+            </a:pPr>
+            <a:r>
+              <a:rPr lang="pt-BR" sz="1400" b="1" dirty="0">
+                <a:solidFill>
+                  <a:srgbClr val="00B050"/>
+                </a:solidFill>
+                <a:latin typeface="Avenir"/>
+                <a:ea typeface="Arial"/>
+                <a:cs typeface="Arial"/>
+                <a:sym typeface="Avenir"/>
+              </a:rPr>
+              <a:t>TPET</a:t>
+            </a:r>
+            <a:endParaRPr sz="1600" dirty="0">
+              <a:solidFill>
+                <a:srgbClr val="00B050"/>
+              </a:solidFill>
+              <a:latin typeface="Arial"/>
+              <a:ea typeface="Arial"/>
+              <a:cs typeface="Arial"/>
+              <a:sym typeface="Arial"/>
+            </a:endParaRPr>
+          </a:p>
+        </p:txBody>
+      </p:sp>
+    </p:spTree>
+    <p:extLst>
+      <p:ext uri="{BB962C8B-B14F-4D97-AF65-F5344CB8AC3E}">
+        <p14:creationId xmlns:p14="http://schemas.microsoft.com/office/powerpoint/2010/main" val="1463927436"/>
       </p:ext>
     </p:extLst>
   </p:cSld>

</xml_diff>

<commit_message>
Add 4IDT and 3IDT building blocks
</commit_message>
<xml_diff>
--- a/docs/Blocos_de_constru.pptx
+++ b/docs/Blocos_de_constru.pptx
@@ -122,7 +122,7 @@
   <pc:docChgLst>
     <pc:chgData name="Felipe Lopes de Oliveira" userId="7927722fe4027b30" providerId="LiveId" clId="{988CB3FB-85FE-4B18-8889-744054AB9037}"/>
     <pc:docChg chg="undo custSel addSld modSld">
-      <pc:chgData name="Felipe Lopes de Oliveira" userId="7927722fe4027b30" providerId="LiveId" clId="{988CB3FB-85FE-4B18-8889-744054AB9037}" dt="2023-03-04T16:51:29.727" v="1019" actId="5736"/>
+      <pc:chgData name="Felipe Lopes de Oliveira" userId="7927722fe4027b30" providerId="LiveId" clId="{988CB3FB-85FE-4B18-8889-744054AB9037}" dt="2023-03-05T15:39:33.443" v="1597" actId="5736"/>
       <pc:docMkLst>
         <pc:docMk/>
       </pc:docMkLst>
@@ -141,14 +141,14 @@
           </ac:spMkLst>
         </pc:spChg>
       </pc:sldChg>
-      <pc:sldChg chg="modSp">
-        <pc:chgData name="Felipe Lopes de Oliveira" userId="7927722fe4027b30" providerId="LiveId" clId="{988CB3FB-85FE-4B18-8889-744054AB9037}" dt="2023-03-04T16:50:34.042" v="1015" actId="5736"/>
+      <pc:sldChg chg="addSp delSp modSp mod">
+        <pc:chgData name="Felipe Lopes de Oliveira" userId="7927722fe4027b30" providerId="LiveId" clId="{988CB3FB-85FE-4B18-8889-744054AB9037}" dt="2023-03-05T15:39:33.443" v="1597" actId="5736"/>
         <pc:sldMkLst>
           <pc:docMk/>
           <pc:sldMk cId="1480784656" sldId="257"/>
         </pc:sldMkLst>
         <pc:spChg chg="mod">
-          <ac:chgData name="Felipe Lopes de Oliveira" userId="7927722fe4027b30" providerId="LiveId" clId="{988CB3FB-85FE-4B18-8889-744054AB9037}" dt="2023-03-04T16:50:34.042" v="1015" actId="5736"/>
+          <ac:chgData name="Felipe Lopes de Oliveira" userId="7927722fe4027b30" providerId="LiveId" clId="{988CB3FB-85FE-4B18-8889-744054AB9037}" dt="2023-03-05T15:39:33.443" v="1597" actId="5736"/>
           <ac:spMkLst>
             <pc:docMk/>
             <pc:sldMk cId="1480784656" sldId="257"/>
@@ -156,7 +156,7 @@
           </ac:spMkLst>
         </pc:spChg>
         <pc:spChg chg="mod">
-          <ac:chgData name="Felipe Lopes de Oliveira" userId="7927722fe4027b30" providerId="LiveId" clId="{988CB3FB-85FE-4B18-8889-744054AB9037}" dt="2023-03-04T16:50:34.042" v="1015" actId="5736"/>
+          <ac:chgData name="Felipe Lopes de Oliveira" userId="7927722fe4027b30" providerId="LiveId" clId="{988CB3FB-85FE-4B18-8889-744054AB9037}" dt="2023-03-05T15:39:33.443" v="1597" actId="5736"/>
           <ac:spMkLst>
             <pc:docMk/>
             <pc:sldMk cId="1480784656" sldId="257"/>
@@ -164,7 +164,7 @@
           </ac:spMkLst>
         </pc:spChg>
         <pc:spChg chg="mod">
-          <ac:chgData name="Felipe Lopes de Oliveira" userId="7927722fe4027b30" providerId="LiveId" clId="{988CB3FB-85FE-4B18-8889-744054AB9037}" dt="2023-03-04T16:50:34.042" v="1015" actId="5736"/>
+          <ac:chgData name="Felipe Lopes de Oliveira" userId="7927722fe4027b30" providerId="LiveId" clId="{988CB3FB-85FE-4B18-8889-744054AB9037}" dt="2023-03-05T15:39:33.443" v="1597" actId="5736"/>
           <ac:spMkLst>
             <pc:docMk/>
             <pc:sldMk cId="1480784656" sldId="257"/>
@@ -172,7 +172,7 @@
           </ac:spMkLst>
         </pc:spChg>
         <pc:spChg chg="mod">
-          <ac:chgData name="Felipe Lopes de Oliveira" userId="7927722fe4027b30" providerId="LiveId" clId="{988CB3FB-85FE-4B18-8889-744054AB9037}" dt="2023-03-04T16:50:34.042" v="1015" actId="5736"/>
+          <ac:chgData name="Felipe Lopes de Oliveira" userId="7927722fe4027b30" providerId="LiveId" clId="{988CB3FB-85FE-4B18-8889-744054AB9037}" dt="2023-03-05T15:39:33.443" v="1597" actId="5736"/>
           <ac:spMkLst>
             <pc:docMk/>
             <pc:sldMk cId="1480784656" sldId="257"/>
@@ -180,7 +180,7 @@
           </ac:spMkLst>
         </pc:spChg>
         <pc:spChg chg="mod">
-          <ac:chgData name="Felipe Lopes de Oliveira" userId="7927722fe4027b30" providerId="LiveId" clId="{988CB3FB-85FE-4B18-8889-744054AB9037}" dt="2023-03-04T16:50:34.042" v="1015" actId="5736"/>
+          <ac:chgData name="Felipe Lopes de Oliveira" userId="7927722fe4027b30" providerId="LiveId" clId="{988CB3FB-85FE-4B18-8889-744054AB9037}" dt="2023-03-05T15:39:33.443" v="1597" actId="5736"/>
           <ac:spMkLst>
             <pc:docMk/>
             <pc:sldMk cId="1480784656" sldId="257"/>
@@ -188,7 +188,7 @@
           </ac:spMkLst>
         </pc:spChg>
         <pc:spChg chg="mod">
-          <ac:chgData name="Felipe Lopes de Oliveira" userId="7927722fe4027b30" providerId="LiveId" clId="{988CB3FB-85FE-4B18-8889-744054AB9037}" dt="2023-03-04T16:50:34.042" v="1015" actId="5736"/>
+          <ac:chgData name="Felipe Lopes de Oliveira" userId="7927722fe4027b30" providerId="LiveId" clId="{988CB3FB-85FE-4B18-8889-744054AB9037}" dt="2023-03-05T15:39:33.443" v="1597" actId="5736"/>
           <ac:spMkLst>
             <pc:docMk/>
             <pc:sldMk cId="1480784656" sldId="257"/>
@@ -196,7 +196,7 @@
           </ac:spMkLst>
         </pc:spChg>
         <pc:spChg chg="mod">
-          <ac:chgData name="Felipe Lopes de Oliveira" userId="7927722fe4027b30" providerId="LiveId" clId="{988CB3FB-85FE-4B18-8889-744054AB9037}" dt="2023-03-04T16:50:34.042" v="1015" actId="5736"/>
+          <ac:chgData name="Felipe Lopes de Oliveira" userId="7927722fe4027b30" providerId="LiveId" clId="{988CB3FB-85FE-4B18-8889-744054AB9037}" dt="2023-03-05T15:39:33.443" v="1597" actId="5736"/>
           <ac:spMkLst>
             <pc:docMk/>
             <pc:sldMk cId="1480784656" sldId="257"/>
@@ -204,7 +204,7 @@
           </ac:spMkLst>
         </pc:spChg>
         <pc:spChg chg="mod">
-          <ac:chgData name="Felipe Lopes de Oliveira" userId="7927722fe4027b30" providerId="LiveId" clId="{988CB3FB-85FE-4B18-8889-744054AB9037}" dt="2023-03-04T16:50:34.042" v="1015" actId="5736"/>
+          <ac:chgData name="Felipe Lopes de Oliveira" userId="7927722fe4027b30" providerId="LiveId" clId="{988CB3FB-85FE-4B18-8889-744054AB9037}" dt="2023-03-05T15:39:33.443" v="1597" actId="5736"/>
           <ac:spMkLst>
             <pc:docMk/>
             <pc:sldMk cId="1480784656" sldId="257"/>
@@ -212,7 +212,7 @@
           </ac:spMkLst>
         </pc:spChg>
         <pc:spChg chg="mod">
-          <ac:chgData name="Felipe Lopes de Oliveira" userId="7927722fe4027b30" providerId="LiveId" clId="{988CB3FB-85FE-4B18-8889-744054AB9037}" dt="2023-03-04T16:50:34.042" v="1015" actId="5736"/>
+          <ac:chgData name="Felipe Lopes de Oliveira" userId="7927722fe4027b30" providerId="LiveId" clId="{988CB3FB-85FE-4B18-8889-744054AB9037}" dt="2023-03-05T15:39:33.443" v="1597" actId="5736"/>
           <ac:spMkLst>
             <pc:docMk/>
             <pc:sldMk cId="1480784656" sldId="257"/>
@@ -220,7 +220,7 @@
           </ac:spMkLst>
         </pc:spChg>
         <pc:spChg chg="mod">
-          <ac:chgData name="Felipe Lopes de Oliveira" userId="7927722fe4027b30" providerId="LiveId" clId="{988CB3FB-85FE-4B18-8889-744054AB9037}" dt="2023-03-04T16:50:34.042" v="1015" actId="5736"/>
+          <ac:chgData name="Felipe Lopes de Oliveira" userId="7927722fe4027b30" providerId="LiveId" clId="{988CB3FB-85FE-4B18-8889-744054AB9037}" dt="2023-03-05T15:39:33.443" v="1597" actId="5736"/>
           <ac:spMkLst>
             <pc:docMk/>
             <pc:sldMk cId="1480784656" sldId="257"/>
@@ -228,7 +228,7 @@
           </ac:spMkLst>
         </pc:spChg>
         <pc:spChg chg="mod">
-          <ac:chgData name="Felipe Lopes de Oliveira" userId="7927722fe4027b30" providerId="LiveId" clId="{988CB3FB-85FE-4B18-8889-744054AB9037}" dt="2023-03-04T16:50:34.042" v="1015" actId="5736"/>
+          <ac:chgData name="Felipe Lopes de Oliveira" userId="7927722fe4027b30" providerId="LiveId" clId="{988CB3FB-85FE-4B18-8889-744054AB9037}" dt="2023-03-05T15:39:33.443" v="1597" actId="5736"/>
           <ac:spMkLst>
             <pc:docMk/>
             <pc:sldMk cId="1480784656" sldId="257"/>
@@ -236,7 +236,7 @@
           </ac:spMkLst>
         </pc:spChg>
         <pc:spChg chg="mod">
-          <ac:chgData name="Felipe Lopes de Oliveira" userId="7927722fe4027b30" providerId="LiveId" clId="{988CB3FB-85FE-4B18-8889-744054AB9037}" dt="2023-03-04T16:50:34.042" v="1015" actId="5736"/>
+          <ac:chgData name="Felipe Lopes de Oliveira" userId="7927722fe4027b30" providerId="LiveId" clId="{988CB3FB-85FE-4B18-8889-744054AB9037}" dt="2023-03-05T15:39:33.443" v="1597" actId="5736"/>
           <ac:spMkLst>
             <pc:docMk/>
             <pc:sldMk cId="1480784656" sldId="257"/>
@@ -244,7 +244,7 @@
           </ac:spMkLst>
         </pc:spChg>
         <pc:spChg chg="mod">
-          <ac:chgData name="Felipe Lopes de Oliveira" userId="7927722fe4027b30" providerId="LiveId" clId="{988CB3FB-85FE-4B18-8889-744054AB9037}" dt="2023-03-04T16:50:34.042" v="1015" actId="5736"/>
+          <ac:chgData name="Felipe Lopes de Oliveira" userId="7927722fe4027b30" providerId="LiveId" clId="{988CB3FB-85FE-4B18-8889-744054AB9037}" dt="2023-03-05T15:39:33.443" v="1597" actId="5736"/>
           <ac:spMkLst>
             <pc:docMk/>
             <pc:sldMk cId="1480784656" sldId="257"/>
@@ -252,7 +252,7 @@
           </ac:spMkLst>
         </pc:spChg>
         <pc:spChg chg="mod">
-          <ac:chgData name="Felipe Lopes de Oliveira" userId="7927722fe4027b30" providerId="LiveId" clId="{988CB3FB-85FE-4B18-8889-744054AB9037}" dt="2023-03-04T16:50:34.042" v="1015" actId="5736"/>
+          <ac:chgData name="Felipe Lopes de Oliveira" userId="7927722fe4027b30" providerId="LiveId" clId="{988CB3FB-85FE-4B18-8889-744054AB9037}" dt="2023-03-05T15:39:33.443" v="1597" actId="5736"/>
           <ac:spMkLst>
             <pc:docMk/>
             <pc:sldMk cId="1480784656" sldId="257"/>
@@ -260,7 +260,7 @@
           </ac:spMkLst>
         </pc:spChg>
         <pc:spChg chg="mod">
-          <ac:chgData name="Felipe Lopes de Oliveira" userId="7927722fe4027b30" providerId="LiveId" clId="{988CB3FB-85FE-4B18-8889-744054AB9037}" dt="2023-03-04T16:50:34.042" v="1015" actId="5736"/>
+          <ac:chgData name="Felipe Lopes de Oliveira" userId="7927722fe4027b30" providerId="LiveId" clId="{988CB3FB-85FE-4B18-8889-744054AB9037}" dt="2023-03-05T15:39:33.443" v="1597" actId="5736"/>
           <ac:spMkLst>
             <pc:docMk/>
             <pc:sldMk cId="1480784656" sldId="257"/>
@@ -268,7 +268,7 @@
           </ac:spMkLst>
         </pc:spChg>
         <pc:spChg chg="mod">
-          <ac:chgData name="Felipe Lopes de Oliveira" userId="7927722fe4027b30" providerId="LiveId" clId="{988CB3FB-85FE-4B18-8889-744054AB9037}" dt="2023-03-04T16:50:34.042" v="1015" actId="5736"/>
+          <ac:chgData name="Felipe Lopes de Oliveira" userId="7927722fe4027b30" providerId="LiveId" clId="{988CB3FB-85FE-4B18-8889-744054AB9037}" dt="2023-03-05T15:39:33.443" v="1597" actId="5736"/>
           <ac:spMkLst>
             <pc:docMk/>
             <pc:sldMk cId="1480784656" sldId="257"/>
@@ -276,7 +276,7 @@
           </ac:spMkLst>
         </pc:spChg>
         <pc:spChg chg="mod">
-          <ac:chgData name="Felipe Lopes de Oliveira" userId="7927722fe4027b30" providerId="LiveId" clId="{988CB3FB-85FE-4B18-8889-744054AB9037}" dt="2023-03-04T16:50:34.042" v="1015" actId="5736"/>
+          <ac:chgData name="Felipe Lopes de Oliveira" userId="7927722fe4027b30" providerId="LiveId" clId="{988CB3FB-85FE-4B18-8889-744054AB9037}" dt="2023-03-05T15:39:33.443" v="1597" actId="5736"/>
           <ac:spMkLst>
             <pc:docMk/>
             <pc:sldMk cId="1480784656" sldId="257"/>
@@ -284,7 +284,7 @@
           </ac:spMkLst>
         </pc:spChg>
         <pc:spChg chg="mod">
-          <ac:chgData name="Felipe Lopes de Oliveira" userId="7927722fe4027b30" providerId="LiveId" clId="{988CB3FB-85FE-4B18-8889-744054AB9037}" dt="2023-03-04T16:50:34.042" v="1015" actId="5736"/>
+          <ac:chgData name="Felipe Lopes de Oliveira" userId="7927722fe4027b30" providerId="LiveId" clId="{988CB3FB-85FE-4B18-8889-744054AB9037}" dt="2023-03-05T15:39:33.443" v="1597" actId="5736"/>
           <ac:spMkLst>
             <pc:docMk/>
             <pc:sldMk cId="1480784656" sldId="257"/>
@@ -292,7 +292,7 @@
           </ac:spMkLst>
         </pc:spChg>
         <pc:spChg chg="mod">
-          <ac:chgData name="Felipe Lopes de Oliveira" userId="7927722fe4027b30" providerId="LiveId" clId="{988CB3FB-85FE-4B18-8889-744054AB9037}" dt="2023-03-04T16:50:34.042" v="1015" actId="5736"/>
+          <ac:chgData name="Felipe Lopes de Oliveira" userId="7927722fe4027b30" providerId="LiveId" clId="{988CB3FB-85FE-4B18-8889-744054AB9037}" dt="2023-03-05T15:39:33.443" v="1597" actId="5736"/>
           <ac:spMkLst>
             <pc:docMk/>
             <pc:sldMk cId="1480784656" sldId="257"/>
@@ -300,7 +300,7 @@
           </ac:spMkLst>
         </pc:spChg>
         <pc:spChg chg="mod">
-          <ac:chgData name="Felipe Lopes de Oliveira" userId="7927722fe4027b30" providerId="LiveId" clId="{988CB3FB-85FE-4B18-8889-744054AB9037}" dt="2023-03-04T16:50:34.042" v="1015" actId="5736"/>
+          <ac:chgData name="Felipe Lopes de Oliveira" userId="7927722fe4027b30" providerId="LiveId" clId="{988CB3FB-85FE-4B18-8889-744054AB9037}" dt="2023-03-05T15:39:33.443" v="1597" actId="5736"/>
           <ac:spMkLst>
             <pc:docMk/>
             <pc:sldMk cId="1480784656" sldId="257"/>
@@ -308,7 +308,7 @@
           </ac:spMkLst>
         </pc:spChg>
         <pc:spChg chg="mod">
-          <ac:chgData name="Felipe Lopes de Oliveira" userId="7927722fe4027b30" providerId="LiveId" clId="{988CB3FB-85FE-4B18-8889-744054AB9037}" dt="2023-03-04T16:50:34.042" v="1015" actId="5736"/>
+          <ac:chgData name="Felipe Lopes de Oliveira" userId="7927722fe4027b30" providerId="LiveId" clId="{988CB3FB-85FE-4B18-8889-744054AB9037}" dt="2023-03-05T15:39:33.443" v="1597" actId="5736"/>
           <ac:spMkLst>
             <pc:docMk/>
             <pc:sldMk cId="1480784656" sldId="257"/>
@@ -316,7 +316,7 @@
           </ac:spMkLst>
         </pc:spChg>
         <pc:spChg chg="mod">
-          <ac:chgData name="Felipe Lopes de Oliveira" userId="7927722fe4027b30" providerId="LiveId" clId="{988CB3FB-85FE-4B18-8889-744054AB9037}" dt="2023-03-04T16:50:34.042" v="1015" actId="5736"/>
+          <ac:chgData name="Felipe Lopes de Oliveira" userId="7927722fe4027b30" providerId="LiveId" clId="{988CB3FB-85FE-4B18-8889-744054AB9037}" dt="2023-03-05T15:39:33.443" v="1597" actId="5736"/>
           <ac:spMkLst>
             <pc:docMk/>
             <pc:sldMk cId="1480784656" sldId="257"/>
@@ -324,7 +324,7 @@
           </ac:spMkLst>
         </pc:spChg>
         <pc:spChg chg="mod">
-          <ac:chgData name="Felipe Lopes de Oliveira" userId="7927722fe4027b30" providerId="LiveId" clId="{988CB3FB-85FE-4B18-8889-744054AB9037}" dt="2023-03-04T16:50:34.042" v="1015" actId="5736"/>
+          <ac:chgData name="Felipe Lopes de Oliveira" userId="7927722fe4027b30" providerId="LiveId" clId="{988CB3FB-85FE-4B18-8889-744054AB9037}" dt="2023-03-05T15:39:33.443" v="1597" actId="5736"/>
           <ac:spMkLst>
             <pc:docMk/>
             <pc:sldMk cId="1480784656" sldId="257"/>
@@ -332,15 +332,63 @@
           </ac:spMkLst>
         </pc:spChg>
         <pc:spChg chg="mod">
-          <ac:chgData name="Felipe Lopes de Oliveira" userId="7927722fe4027b30" providerId="LiveId" clId="{988CB3FB-85FE-4B18-8889-744054AB9037}" dt="2023-03-04T16:50:34.042" v="1015" actId="5736"/>
+          <ac:chgData name="Felipe Lopes de Oliveira" userId="7927722fe4027b30" providerId="LiveId" clId="{988CB3FB-85FE-4B18-8889-744054AB9037}" dt="2023-03-05T15:39:33.443" v="1597" actId="5736"/>
           <ac:spMkLst>
             <pc:docMk/>
             <pc:sldMk cId="1480784656" sldId="257"/>
             <ac:spMk id="27" creationId="{967979D8-CE29-4BDC-A629-0B2C53554F0D}"/>
           </ac:spMkLst>
         </pc:spChg>
+        <pc:spChg chg="add mod">
+          <ac:chgData name="Felipe Lopes de Oliveira" userId="7927722fe4027b30" providerId="LiveId" clId="{988CB3FB-85FE-4B18-8889-744054AB9037}" dt="2023-03-05T15:07:28.244" v="1092" actId="571"/>
+          <ac:spMkLst>
+            <pc:docMk/>
+            <pc:sldMk cId="1480784656" sldId="257"/>
+            <ac:spMk id="28" creationId="{58EF8D73-7EAA-0A36-B30A-BB9A00897DC2}"/>
+          </ac:spMkLst>
+        </pc:spChg>
+        <pc:spChg chg="add mod">
+          <ac:chgData name="Felipe Lopes de Oliveira" userId="7927722fe4027b30" providerId="LiveId" clId="{988CB3FB-85FE-4B18-8889-744054AB9037}" dt="2023-03-05T15:39:33.443" v="1597" actId="5736"/>
+          <ac:spMkLst>
+            <pc:docMk/>
+            <pc:sldMk cId="1480784656" sldId="257"/>
+            <ac:spMk id="29" creationId="{C564F456-CD91-4B9D-9C21-B45930092CC3}"/>
+          </ac:spMkLst>
+        </pc:spChg>
+        <pc:spChg chg="add del mod">
+          <ac:chgData name="Felipe Lopes de Oliveira" userId="7927722fe4027b30" providerId="LiveId" clId="{988CB3FB-85FE-4B18-8889-744054AB9037}" dt="2023-03-05T15:11:46.420" v="1294" actId="478"/>
+          <ac:spMkLst>
+            <pc:docMk/>
+            <pc:sldMk cId="1480784656" sldId="257"/>
+            <ac:spMk id="31" creationId="{38F127F7-3D0A-50AE-E278-1FD905142F83}"/>
+          </ac:spMkLst>
+        </pc:spChg>
+        <pc:spChg chg="add del mod">
+          <ac:chgData name="Felipe Lopes de Oliveira" userId="7927722fe4027b30" providerId="LiveId" clId="{988CB3FB-85FE-4B18-8889-744054AB9037}" dt="2023-03-05T15:20:44.498" v="1585" actId="478"/>
+          <ac:spMkLst>
+            <pc:docMk/>
+            <pc:sldMk cId="1480784656" sldId="257"/>
+            <ac:spMk id="33" creationId="{946111B3-F4A8-5182-6CB1-E7CC58E3C554}"/>
+          </ac:spMkLst>
+        </pc:spChg>
+        <pc:spChg chg="add mod">
+          <ac:chgData name="Felipe Lopes de Oliveira" userId="7927722fe4027b30" providerId="LiveId" clId="{988CB3FB-85FE-4B18-8889-744054AB9037}" dt="2023-03-05T15:39:33.443" v="1597" actId="5736"/>
+          <ac:spMkLst>
+            <pc:docMk/>
+            <pc:sldMk cId="1480784656" sldId="257"/>
+            <ac:spMk id="36" creationId="{5ACE21A8-62E3-4DFA-B49F-C18BB0857009}"/>
+          </ac:spMkLst>
+        </pc:spChg>
+        <pc:spChg chg="add del mod">
+          <ac:chgData name="Felipe Lopes de Oliveira" userId="7927722fe4027b30" providerId="LiveId" clId="{988CB3FB-85FE-4B18-8889-744054AB9037}" dt="2023-03-05T15:20:47.001" v="1587" actId="478"/>
+          <ac:spMkLst>
+            <pc:docMk/>
+            <pc:sldMk cId="1480784656" sldId="257"/>
+            <ac:spMk id="37" creationId="{7A9A4685-6B69-36B6-57A3-30399970BA84}"/>
+          </ac:spMkLst>
+        </pc:spChg>
         <pc:spChg chg="mod">
-          <ac:chgData name="Felipe Lopes de Oliveira" userId="7927722fe4027b30" providerId="LiveId" clId="{988CB3FB-85FE-4B18-8889-744054AB9037}" dt="2023-03-04T16:50:34.042" v="1015" actId="5736"/>
+          <ac:chgData name="Felipe Lopes de Oliveira" userId="7927722fe4027b30" providerId="LiveId" clId="{988CB3FB-85FE-4B18-8889-744054AB9037}" dt="2023-03-05T15:39:33.443" v="1597" actId="5736"/>
           <ac:spMkLst>
             <pc:docMk/>
             <pc:sldMk cId="1480784656" sldId="257"/>
@@ -348,7 +396,7 @@
           </ac:spMkLst>
         </pc:spChg>
         <pc:spChg chg="mod">
-          <ac:chgData name="Felipe Lopes de Oliveira" userId="7927722fe4027b30" providerId="LiveId" clId="{988CB3FB-85FE-4B18-8889-744054AB9037}" dt="2023-03-04T16:50:34.042" v="1015" actId="5736"/>
+          <ac:chgData name="Felipe Lopes de Oliveira" userId="7927722fe4027b30" providerId="LiveId" clId="{988CB3FB-85FE-4B18-8889-744054AB9037}" dt="2023-03-05T15:39:33.443" v="1597" actId="5736"/>
           <ac:spMkLst>
             <pc:docMk/>
             <pc:sldMk cId="1480784656" sldId="257"/>
@@ -356,7 +404,7 @@
           </ac:spMkLst>
         </pc:spChg>
         <pc:spChg chg="mod">
-          <ac:chgData name="Felipe Lopes de Oliveira" userId="7927722fe4027b30" providerId="LiveId" clId="{988CB3FB-85FE-4B18-8889-744054AB9037}" dt="2023-03-04T16:50:34.042" v="1015" actId="5736"/>
+          <ac:chgData name="Felipe Lopes de Oliveira" userId="7927722fe4027b30" providerId="LiveId" clId="{988CB3FB-85FE-4B18-8889-744054AB9037}" dt="2023-03-05T15:39:33.443" v="1597" actId="5736"/>
           <ac:spMkLst>
             <pc:docMk/>
             <pc:sldMk cId="1480784656" sldId="257"/>
@@ -364,7 +412,7 @@
           </ac:spMkLst>
         </pc:spChg>
         <pc:spChg chg="mod">
-          <ac:chgData name="Felipe Lopes de Oliveira" userId="7927722fe4027b30" providerId="LiveId" clId="{988CB3FB-85FE-4B18-8889-744054AB9037}" dt="2023-03-04T16:50:34.042" v="1015" actId="5736"/>
+          <ac:chgData name="Felipe Lopes de Oliveira" userId="7927722fe4027b30" providerId="LiveId" clId="{988CB3FB-85FE-4B18-8889-744054AB9037}" dt="2023-03-05T15:39:33.443" v="1597" actId="5736"/>
           <ac:spMkLst>
             <pc:docMk/>
             <pc:sldMk cId="1480784656" sldId="257"/>
@@ -372,7 +420,7 @@
           </ac:spMkLst>
         </pc:spChg>
         <pc:spChg chg="mod">
-          <ac:chgData name="Felipe Lopes de Oliveira" userId="7927722fe4027b30" providerId="LiveId" clId="{988CB3FB-85FE-4B18-8889-744054AB9037}" dt="2023-03-04T16:50:34.042" v="1015" actId="5736"/>
+          <ac:chgData name="Felipe Lopes de Oliveira" userId="7927722fe4027b30" providerId="LiveId" clId="{988CB3FB-85FE-4B18-8889-744054AB9037}" dt="2023-03-05T15:39:33.443" v="1597" actId="5736"/>
           <ac:spMkLst>
             <pc:docMk/>
             <pc:sldMk cId="1480784656" sldId="257"/>
@@ -380,7 +428,7 @@
           </ac:spMkLst>
         </pc:spChg>
         <pc:spChg chg="mod">
-          <ac:chgData name="Felipe Lopes de Oliveira" userId="7927722fe4027b30" providerId="LiveId" clId="{988CB3FB-85FE-4B18-8889-744054AB9037}" dt="2023-03-04T16:50:34.042" v="1015" actId="5736"/>
+          <ac:chgData name="Felipe Lopes de Oliveira" userId="7927722fe4027b30" providerId="LiveId" clId="{988CB3FB-85FE-4B18-8889-744054AB9037}" dt="2023-03-05T15:39:33.443" v="1597" actId="5736"/>
           <ac:spMkLst>
             <pc:docMk/>
             <pc:sldMk cId="1480784656" sldId="257"/>
@@ -388,7 +436,7 @@
           </ac:spMkLst>
         </pc:spChg>
         <pc:graphicFrameChg chg="mod">
-          <ac:chgData name="Felipe Lopes de Oliveira" userId="7927722fe4027b30" providerId="LiveId" clId="{988CB3FB-85FE-4B18-8889-744054AB9037}" dt="2023-03-04T16:50:34.042" v="1015" actId="5736"/>
+          <ac:chgData name="Felipe Lopes de Oliveira" userId="7927722fe4027b30" providerId="LiveId" clId="{988CB3FB-85FE-4B18-8889-744054AB9037}" dt="2023-03-05T15:39:33.443" v="1597" actId="5736"/>
           <ac:graphicFrameMkLst>
             <pc:docMk/>
             <pc:sldMk cId="1480784656" sldId="257"/>
@@ -396,15 +444,55 @@
           </ac:graphicFrameMkLst>
         </pc:graphicFrameChg>
         <pc:graphicFrameChg chg="mod">
-          <ac:chgData name="Felipe Lopes de Oliveira" userId="7927722fe4027b30" providerId="LiveId" clId="{988CB3FB-85FE-4B18-8889-744054AB9037}" dt="2023-03-04T16:50:34.042" v="1015" actId="5736"/>
+          <ac:chgData name="Felipe Lopes de Oliveira" userId="7927722fe4027b30" providerId="LiveId" clId="{988CB3FB-85FE-4B18-8889-744054AB9037}" dt="2023-03-05T15:39:33.443" v="1597" actId="5736"/>
           <ac:graphicFrameMkLst>
             <pc:docMk/>
             <pc:sldMk cId="1480784656" sldId="257"/>
             <ac:graphicFrameMk id="4" creationId="{3F70143E-5256-37C3-08C9-0E28E08A6DA3}"/>
           </ac:graphicFrameMkLst>
         </pc:graphicFrameChg>
+        <pc:graphicFrameChg chg="add mod">
+          <ac:chgData name="Felipe Lopes de Oliveira" userId="7927722fe4027b30" providerId="LiveId" clId="{988CB3FB-85FE-4B18-8889-744054AB9037}" dt="2023-03-05T15:39:33.443" v="1597" actId="5736"/>
+          <ac:graphicFrameMkLst>
+            <pc:docMk/>
+            <pc:sldMk cId="1480784656" sldId="257"/>
+            <ac:graphicFrameMk id="30" creationId="{39C4941F-48FF-076E-7407-1AD92AB3B841}"/>
+          </ac:graphicFrameMkLst>
+        </pc:graphicFrameChg>
+        <pc:graphicFrameChg chg="add del mod">
+          <ac:chgData name="Felipe Lopes de Oliveira" userId="7927722fe4027b30" providerId="LiveId" clId="{988CB3FB-85FE-4B18-8889-744054AB9037}" dt="2023-03-05T15:11:45.225" v="1293" actId="478"/>
+          <ac:graphicFrameMkLst>
+            <pc:docMk/>
+            <pc:sldMk cId="1480784656" sldId="257"/>
+            <ac:graphicFrameMk id="32" creationId="{606F46B7-C028-D736-9741-BBD7FC8051B3}"/>
+          </ac:graphicFrameMkLst>
+        </pc:graphicFrameChg>
+        <pc:graphicFrameChg chg="add del mod">
+          <ac:chgData name="Felipe Lopes de Oliveira" userId="7927722fe4027b30" providerId="LiveId" clId="{988CB3FB-85FE-4B18-8889-744054AB9037}" dt="2023-03-05T15:20:43.362" v="1584" actId="478"/>
+          <ac:graphicFrameMkLst>
+            <pc:docMk/>
+            <pc:sldMk cId="1480784656" sldId="257"/>
+            <ac:graphicFrameMk id="34" creationId="{535ADE4D-EBD3-87E5-E621-B17F32369989}"/>
+          </ac:graphicFrameMkLst>
+        </pc:graphicFrameChg>
+        <pc:graphicFrameChg chg="add mod">
+          <ac:chgData name="Felipe Lopes de Oliveira" userId="7927722fe4027b30" providerId="LiveId" clId="{988CB3FB-85FE-4B18-8889-744054AB9037}" dt="2023-03-05T15:39:33.443" v="1597" actId="5736"/>
+          <ac:graphicFrameMkLst>
+            <pc:docMk/>
+            <pc:sldMk cId="1480784656" sldId="257"/>
+            <ac:graphicFrameMk id="35" creationId="{04F8035D-8463-ACE7-2119-276CD44AD7EE}"/>
+          </ac:graphicFrameMkLst>
+        </pc:graphicFrameChg>
+        <pc:graphicFrameChg chg="add del mod">
+          <ac:chgData name="Felipe Lopes de Oliveira" userId="7927722fe4027b30" providerId="LiveId" clId="{988CB3FB-85FE-4B18-8889-744054AB9037}" dt="2023-03-05T15:20:45.609" v="1586" actId="478"/>
+          <ac:graphicFrameMkLst>
+            <pc:docMk/>
+            <pc:sldMk cId="1480784656" sldId="257"/>
+            <ac:graphicFrameMk id="38" creationId="{496CA154-5A1A-4572-F54B-D18C21995F98}"/>
+          </ac:graphicFrameMkLst>
+        </pc:graphicFrameChg>
         <pc:graphicFrameChg chg="mod">
-          <ac:chgData name="Felipe Lopes de Oliveira" userId="7927722fe4027b30" providerId="LiveId" clId="{988CB3FB-85FE-4B18-8889-744054AB9037}" dt="2023-03-04T16:50:34.042" v="1015" actId="5736"/>
+          <ac:chgData name="Felipe Lopes de Oliveira" userId="7927722fe4027b30" providerId="LiveId" clId="{988CB3FB-85FE-4B18-8889-744054AB9037}" dt="2023-03-05T15:39:33.443" v="1597" actId="5736"/>
           <ac:graphicFrameMkLst>
             <pc:docMk/>
             <pc:sldMk cId="1480784656" sldId="257"/>
@@ -412,7 +500,7 @@
           </ac:graphicFrameMkLst>
         </pc:graphicFrameChg>
         <pc:graphicFrameChg chg="mod">
-          <ac:chgData name="Felipe Lopes de Oliveira" userId="7927722fe4027b30" providerId="LiveId" clId="{988CB3FB-85FE-4B18-8889-744054AB9037}" dt="2023-03-04T16:50:34.042" v="1015" actId="5736"/>
+          <ac:chgData name="Felipe Lopes de Oliveira" userId="7927722fe4027b30" providerId="LiveId" clId="{988CB3FB-85FE-4B18-8889-744054AB9037}" dt="2023-03-05T15:39:33.443" v="1597" actId="5736"/>
           <ac:graphicFrameMkLst>
             <pc:docMk/>
             <pc:sldMk cId="1480784656" sldId="257"/>
@@ -420,7 +508,7 @@
           </ac:graphicFrameMkLst>
         </pc:graphicFrameChg>
         <pc:graphicFrameChg chg="mod">
-          <ac:chgData name="Felipe Lopes de Oliveira" userId="7927722fe4027b30" providerId="LiveId" clId="{988CB3FB-85FE-4B18-8889-744054AB9037}" dt="2023-03-04T16:50:34.042" v="1015" actId="5736"/>
+          <ac:chgData name="Felipe Lopes de Oliveira" userId="7927722fe4027b30" providerId="LiveId" clId="{988CB3FB-85FE-4B18-8889-744054AB9037}" dt="2023-03-05T15:39:33.443" v="1597" actId="5736"/>
           <ac:graphicFrameMkLst>
             <pc:docMk/>
             <pc:sldMk cId="1480784656" sldId="257"/>
@@ -428,7 +516,7 @@
           </ac:graphicFrameMkLst>
         </pc:graphicFrameChg>
         <pc:graphicFrameChg chg="mod">
-          <ac:chgData name="Felipe Lopes de Oliveira" userId="7927722fe4027b30" providerId="LiveId" clId="{988CB3FB-85FE-4B18-8889-744054AB9037}" dt="2023-03-04T16:50:34.042" v="1015" actId="5736"/>
+          <ac:chgData name="Felipe Lopes de Oliveira" userId="7927722fe4027b30" providerId="LiveId" clId="{988CB3FB-85FE-4B18-8889-744054AB9037}" dt="2023-03-05T15:39:33.443" v="1597" actId="5736"/>
           <ac:graphicFrameMkLst>
             <pc:docMk/>
             <pc:sldMk cId="1480784656" sldId="257"/>
@@ -436,7 +524,7 @@
           </ac:graphicFrameMkLst>
         </pc:graphicFrameChg>
         <pc:graphicFrameChg chg="mod">
-          <ac:chgData name="Felipe Lopes de Oliveira" userId="7927722fe4027b30" providerId="LiveId" clId="{988CB3FB-85FE-4B18-8889-744054AB9037}" dt="2023-03-04T16:50:34.042" v="1015" actId="5736"/>
+          <ac:chgData name="Felipe Lopes de Oliveira" userId="7927722fe4027b30" providerId="LiveId" clId="{988CB3FB-85FE-4B18-8889-744054AB9037}" dt="2023-03-05T15:39:33.443" v="1597" actId="5736"/>
           <ac:graphicFrameMkLst>
             <pc:docMk/>
             <pc:sldMk cId="1480784656" sldId="257"/>
@@ -444,7 +532,7 @@
           </ac:graphicFrameMkLst>
         </pc:graphicFrameChg>
         <pc:graphicFrameChg chg="mod">
-          <ac:chgData name="Felipe Lopes de Oliveira" userId="7927722fe4027b30" providerId="LiveId" clId="{988CB3FB-85FE-4B18-8889-744054AB9037}" dt="2023-03-04T16:50:34.042" v="1015" actId="5736"/>
+          <ac:chgData name="Felipe Lopes de Oliveira" userId="7927722fe4027b30" providerId="LiveId" clId="{988CB3FB-85FE-4B18-8889-744054AB9037}" dt="2023-03-05T15:39:33.443" v="1597" actId="5736"/>
           <ac:graphicFrameMkLst>
             <pc:docMk/>
             <pc:sldMk cId="1480784656" sldId="257"/>
@@ -452,7 +540,7 @@
           </ac:graphicFrameMkLst>
         </pc:graphicFrameChg>
         <pc:graphicFrameChg chg="mod">
-          <ac:chgData name="Felipe Lopes de Oliveira" userId="7927722fe4027b30" providerId="LiveId" clId="{988CB3FB-85FE-4B18-8889-744054AB9037}" dt="2023-03-04T16:50:34.042" v="1015" actId="5736"/>
+          <ac:chgData name="Felipe Lopes de Oliveira" userId="7927722fe4027b30" providerId="LiveId" clId="{988CB3FB-85FE-4B18-8889-744054AB9037}" dt="2023-03-05T15:39:33.443" v="1597" actId="5736"/>
           <ac:graphicFrameMkLst>
             <pc:docMk/>
             <pc:sldMk cId="1480784656" sldId="257"/>
@@ -460,7 +548,7 @@
           </ac:graphicFrameMkLst>
         </pc:graphicFrameChg>
         <pc:graphicFrameChg chg="mod">
-          <ac:chgData name="Felipe Lopes de Oliveira" userId="7927722fe4027b30" providerId="LiveId" clId="{988CB3FB-85FE-4B18-8889-744054AB9037}" dt="2023-03-04T16:50:34.042" v="1015" actId="5736"/>
+          <ac:chgData name="Felipe Lopes de Oliveira" userId="7927722fe4027b30" providerId="LiveId" clId="{988CB3FB-85FE-4B18-8889-744054AB9037}" dt="2023-03-05T15:39:33.443" v="1597" actId="5736"/>
           <ac:graphicFrameMkLst>
             <pc:docMk/>
             <pc:sldMk cId="1480784656" sldId="257"/>
@@ -468,7 +556,7 @@
           </ac:graphicFrameMkLst>
         </pc:graphicFrameChg>
         <pc:graphicFrameChg chg="mod">
-          <ac:chgData name="Felipe Lopes de Oliveira" userId="7927722fe4027b30" providerId="LiveId" clId="{988CB3FB-85FE-4B18-8889-744054AB9037}" dt="2023-03-04T16:50:34.042" v="1015" actId="5736"/>
+          <ac:chgData name="Felipe Lopes de Oliveira" userId="7927722fe4027b30" providerId="LiveId" clId="{988CB3FB-85FE-4B18-8889-744054AB9037}" dt="2023-03-05T15:39:33.443" v="1597" actId="5736"/>
           <ac:graphicFrameMkLst>
             <pc:docMk/>
             <pc:sldMk cId="1480784656" sldId="257"/>
@@ -476,7 +564,7 @@
           </ac:graphicFrameMkLst>
         </pc:graphicFrameChg>
         <pc:graphicFrameChg chg="mod">
-          <ac:chgData name="Felipe Lopes de Oliveira" userId="7927722fe4027b30" providerId="LiveId" clId="{988CB3FB-85FE-4B18-8889-744054AB9037}" dt="2023-03-04T16:50:34.042" v="1015" actId="5736"/>
+          <ac:chgData name="Felipe Lopes de Oliveira" userId="7927722fe4027b30" providerId="LiveId" clId="{988CB3FB-85FE-4B18-8889-744054AB9037}" dt="2023-03-05T15:39:33.443" v="1597" actId="5736"/>
           <ac:graphicFrameMkLst>
             <pc:docMk/>
             <pc:sldMk cId="1480784656" sldId="257"/>
@@ -484,7 +572,7 @@
           </ac:graphicFrameMkLst>
         </pc:graphicFrameChg>
         <pc:graphicFrameChg chg="mod">
-          <ac:chgData name="Felipe Lopes de Oliveira" userId="7927722fe4027b30" providerId="LiveId" clId="{988CB3FB-85FE-4B18-8889-744054AB9037}" dt="2023-03-04T16:50:34.042" v="1015" actId="5736"/>
+          <ac:chgData name="Felipe Lopes de Oliveira" userId="7927722fe4027b30" providerId="LiveId" clId="{988CB3FB-85FE-4B18-8889-744054AB9037}" dt="2023-03-05T15:39:33.443" v="1597" actId="5736"/>
           <ac:graphicFrameMkLst>
             <pc:docMk/>
             <pc:sldMk cId="1480784656" sldId="257"/>
@@ -492,7 +580,7 @@
           </ac:graphicFrameMkLst>
         </pc:graphicFrameChg>
         <pc:graphicFrameChg chg="mod">
-          <ac:chgData name="Felipe Lopes de Oliveira" userId="7927722fe4027b30" providerId="LiveId" clId="{988CB3FB-85FE-4B18-8889-744054AB9037}" dt="2023-03-04T16:50:34.042" v="1015" actId="5736"/>
+          <ac:chgData name="Felipe Lopes de Oliveira" userId="7927722fe4027b30" providerId="LiveId" clId="{988CB3FB-85FE-4B18-8889-744054AB9037}" dt="2023-03-05T15:39:33.443" v="1597" actId="5736"/>
           <ac:graphicFrameMkLst>
             <pc:docMk/>
             <pc:sldMk cId="1480784656" sldId="257"/>
@@ -500,7 +588,7 @@
           </ac:graphicFrameMkLst>
         </pc:graphicFrameChg>
         <pc:graphicFrameChg chg="mod">
-          <ac:chgData name="Felipe Lopes de Oliveira" userId="7927722fe4027b30" providerId="LiveId" clId="{988CB3FB-85FE-4B18-8889-744054AB9037}" dt="2023-03-04T16:50:34.042" v="1015" actId="5736"/>
+          <ac:chgData name="Felipe Lopes de Oliveira" userId="7927722fe4027b30" providerId="LiveId" clId="{988CB3FB-85FE-4B18-8889-744054AB9037}" dt="2023-03-05T15:39:33.443" v="1597" actId="5736"/>
           <ac:graphicFrameMkLst>
             <pc:docMk/>
             <pc:sldMk cId="1480784656" sldId="257"/>
@@ -508,7 +596,7 @@
           </ac:graphicFrameMkLst>
         </pc:graphicFrameChg>
         <pc:graphicFrameChg chg="mod">
-          <ac:chgData name="Felipe Lopes de Oliveira" userId="7927722fe4027b30" providerId="LiveId" clId="{988CB3FB-85FE-4B18-8889-744054AB9037}" dt="2023-03-04T16:50:34.042" v="1015" actId="5736"/>
+          <ac:chgData name="Felipe Lopes de Oliveira" userId="7927722fe4027b30" providerId="LiveId" clId="{988CB3FB-85FE-4B18-8889-744054AB9037}" dt="2023-03-05T15:39:33.443" v="1597" actId="5736"/>
           <ac:graphicFrameMkLst>
             <pc:docMk/>
             <pc:sldMk cId="1480784656" sldId="257"/>
@@ -516,7 +604,7 @@
           </ac:graphicFrameMkLst>
         </pc:graphicFrameChg>
         <pc:graphicFrameChg chg="mod">
-          <ac:chgData name="Felipe Lopes de Oliveira" userId="7927722fe4027b30" providerId="LiveId" clId="{988CB3FB-85FE-4B18-8889-744054AB9037}" dt="2023-03-04T16:50:34.042" v="1015" actId="5736"/>
+          <ac:chgData name="Felipe Lopes de Oliveira" userId="7927722fe4027b30" providerId="LiveId" clId="{988CB3FB-85FE-4B18-8889-744054AB9037}" dt="2023-03-05T15:39:33.443" v="1597" actId="5736"/>
           <ac:graphicFrameMkLst>
             <pc:docMk/>
             <pc:sldMk cId="1480784656" sldId="257"/>
@@ -524,7 +612,7 @@
           </ac:graphicFrameMkLst>
         </pc:graphicFrameChg>
         <pc:graphicFrameChg chg="mod">
-          <ac:chgData name="Felipe Lopes de Oliveira" userId="7927722fe4027b30" providerId="LiveId" clId="{988CB3FB-85FE-4B18-8889-744054AB9037}" dt="2023-03-04T16:50:34.042" v="1015" actId="5736"/>
+          <ac:chgData name="Felipe Lopes de Oliveira" userId="7927722fe4027b30" providerId="LiveId" clId="{988CB3FB-85FE-4B18-8889-744054AB9037}" dt="2023-03-05T15:39:33.443" v="1597" actId="5736"/>
           <ac:graphicFrameMkLst>
             <pc:docMk/>
             <pc:sldMk cId="1480784656" sldId="257"/>
@@ -532,7 +620,7 @@
           </ac:graphicFrameMkLst>
         </pc:graphicFrameChg>
         <pc:graphicFrameChg chg="mod">
-          <ac:chgData name="Felipe Lopes de Oliveira" userId="7927722fe4027b30" providerId="LiveId" clId="{988CB3FB-85FE-4B18-8889-744054AB9037}" dt="2023-03-04T16:50:34.042" v="1015" actId="5736"/>
+          <ac:chgData name="Felipe Lopes de Oliveira" userId="7927722fe4027b30" providerId="LiveId" clId="{988CB3FB-85FE-4B18-8889-744054AB9037}" dt="2023-03-05T15:39:33.443" v="1597" actId="5736"/>
           <ac:graphicFrameMkLst>
             <pc:docMk/>
             <pc:sldMk cId="1480784656" sldId="257"/>
@@ -540,7 +628,7 @@
           </ac:graphicFrameMkLst>
         </pc:graphicFrameChg>
         <pc:graphicFrameChg chg="mod">
-          <ac:chgData name="Felipe Lopes de Oliveira" userId="7927722fe4027b30" providerId="LiveId" clId="{988CB3FB-85FE-4B18-8889-744054AB9037}" dt="2023-03-04T16:50:34.042" v="1015" actId="5736"/>
+          <ac:chgData name="Felipe Lopes de Oliveira" userId="7927722fe4027b30" providerId="LiveId" clId="{988CB3FB-85FE-4B18-8889-744054AB9037}" dt="2023-03-05T15:39:33.443" v="1597" actId="5736"/>
           <ac:graphicFrameMkLst>
             <pc:docMk/>
             <pc:sldMk cId="1480784656" sldId="257"/>
@@ -548,7 +636,7 @@
           </ac:graphicFrameMkLst>
         </pc:graphicFrameChg>
         <pc:graphicFrameChg chg="mod">
-          <ac:chgData name="Felipe Lopes de Oliveira" userId="7927722fe4027b30" providerId="LiveId" clId="{988CB3FB-85FE-4B18-8889-744054AB9037}" dt="2023-03-04T16:50:34.042" v="1015" actId="5736"/>
+          <ac:chgData name="Felipe Lopes de Oliveira" userId="7927722fe4027b30" providerId="LiveId" clId="{988CB3FB-85FE-4B18-8889-744054AB9037}" dt="2023-03-05T15:39:33.443" v="1597" actId="5736"/>
           <ac:graphicFrameMkLst>
             <pc:docMk/>
             <pc:sldMk cId="1480784656" sldId="257"/>
@@ -556,7 +644,7 @@
           </ac:graphicFrameMkLst>
         </pc:graphicFrameChg>
         <pc:graphicFrameChg chg="mod">
-          <ac:chgData name="Felipe Lopes de Oliveira" userId="7927722fe4027b30" providerId="LiveId" clId="{988CB3FB-85FE-4B18-8889-744054AB9037}" dt="2023-03-04T16:50:34.042" v="1015" actId="5736"/>
+          <ac:chgData name="Felipe Lopes de Oliveira" userId="7927722fe4027b30" providerId="LiveId" clId="{988CB3FB-85FE-4B18-8889-744054AB9037}" dt="2023-03-05T15:39:33.443" v="1597" actId="5736"/>
           <ac:graphicFrameMkLst>
             <pc:docMk/>
             <pc:sldMk cId="1480784656" sldId="257"/>
@@ -564,7 +652,7 @@
           </ac:graphicFrameMkLst>
         </pc:graphicFrameChg>
         <pc:graphicFrameChg chg="mod">
-          <ac:chgData name="Felipe Lopes de Oliveira" userId="7927722fe4027b30" providerId="LiveId" clId="{988CB3FB-85FE-4B18-8889-744054AB9037}" dt="2023-03-04T16:50:34.042" v="1015" actId="5736"/>
+          <ac:chgData name="Felipe Lopes de Oliveira" userId="7927722fe4027b30" providerId="LiveId" clId="{988CB3FB-85FE-4B18-8889-744054AB9037}" dt="2023-03-05T15:39:33.443" v="1597" actId="5736"/>
           <ac:graphicFrameMkLst>
             <pc:docMk/>
             <pc:sldMk cId="1480784656" sldId="257"/>
@@ -572,7 +660,7 @@
           </ac:graphicFrameMkLst>
         </pc:graphicFrameChg>
         <pc:graphicFrameChg chg="mod">
-          <ac:chgData name="Felipe Lopes de Oliveira" userId="7927722fe4027b30" providerId="LiveId" clId="{988CB3FB-85FE-4B18-8889-744054AB9037}" dt="2023-03-04T16:50:34.042" v="1015" actId="5736"/>
+          <ac:chgData name="Felipe Lopes de Oliveira" userId="7927722fe4027b30" providerId="LiveId" clId="{988CB3FB-85FE-4B18-8889-744054AB9037}" dt="2023-03-05T15:39:33.443" v="1597" actId="5736"/>
           <ac:graphicFrameMkLst>
             <pc:docMk/>
             <pc:sldMk cId="1480784656" sldId="257"/>
@@ -580,7 +668,7 @@
           </ac:graphicFrameMkLst>
         </pc:graphicFrameChg>
         <pc:graphicFrameChg chg="mod">
-          <ac:chgData name="Felipe Lopes de Oliveira" userId="7927722fe4027b30" providerId="LiveId" clId="{988CB3FB-85FE-4B18-8889-744054AB9037}" dt="2023-03-04T16:50:34.042" v="1015" actId="5736"/>
+          <ac:chgData name="Felipe Lopes de Oliveira" userId="7927722fe4027b30" providerId="LiveId" clId="{988CB3FB-85FE-4B18-8889-744054AB9037}" dt="2023-03-05T15:39:33.443" v="1597" actId="5736"/>
           <ac:graphicFrameMkLst>
             <pc:docMk/>
             <pc:sldMk cId="1480784656" sldId="257"/>
@@ -588,7 +676,7 @@
           </ac:graphicFrameMkLst>
         </pc:graphicFrameChg>
         <pc:graphicFrameChg chg="mod">
-          <ac:chgData name="Felipe Lopes de Oliveira" userId="7927722fe4027b30" providerId="LiveId" clId="{988CB3FB-85FE-4B18-8889-744054AB9037}" dt="2023-03-04T16:50:34.042" v="1015" actId="5736"/>
+          <ac:chgData name="Felipe Lopes de Oliveira" userId="7927722fe4027b30" providerId="LiveId" clId="{988CB3FB-85FE-4B18-8889-744054AB9037}" dt="2023-03-05T15:39:33.443" v="1597" actId="5736"/>
           <ac:graphicFrameMkLst>
             <pc:docMk/>
             <pc:sldMk cId="1480784656" sldId="257"/>
@@ -596,7 +684,7 @@
           </ac:graphicFrameMkLst>
         </pc:graphicFrameChg>
         <pc:graphicFrameChg chg="mod">
-          <ac:chgData name="Felipe Lopes de Oliveira" userId="7927722fe4027b30" providerId="LiveId" clId="{988CB3FB-85FE-4B18-8889-744054AB9037}" dt="2023-03-04T16:50:34.042" v="1015" actId="5736"/>
+          <ac:chgData name="Felipe Lopes de Oliveira" userId="7927722fe4027b30" providerId="LiveId" clId="{988CB3FB-85FE-4B18-8889-744054AB9037}" dt="2023-03-05T15:39:33.443" v="1597" actId="5736"/>
           <ac:graphicFrameMkLst>
             <pc:docMk/>
             <pc:sldMk cId="1480784656" sldId="257"/>
@@ -604,7 +692,7 @@
           </ac:graphicFrameMkLst>
         </pc:graphicFrameChg>
         <pc:graphicFrameChg chg="mod">
-          <ac:chgData name="Felipe Lopes de Oliveira" userId="7927722fe4027b30" providerId="LiveId" clId="{988CB3FB-85FE-4B18-8889-744054AB9037}" dt="2023-03-04T16:50:34.042" v="1015" actId="5736"/>
+          <ac:chgData name="Felipe Lopes de Oliveira" userId="7927722fe4027b30" providerId="LiveId" clId="{988CB3FB-85FE-4B18-8889-744054AB9037}" dt="2023-03-05T15:39:33.443" v="1597" actId="5736"/>
           <ac:graphicFrameMkLst>
             <pc:docMk/>
             <pc:sldMk cId="1480784656" sldId="257"/>
@@ -1888,7 +1976,7 @@
           <a:p>
             <a:fld id="{DBC44DCA-8DCD-44D5-A529-810413827672}" type="datetimeFigureOut">
               <a:rPr lang="pt-BR" smtClean="0"/>
-              <a:t>04/03/2023</a:t>
+              <a:t>05/03/2023</a:t>
             </a:fld>
             <a:endParaRPr lang="pt-BR"/>
           </a:p>
@@ -2058,7 +2146,7 @@
           <a:p>
             <a:fld id="{DBC44DCA-8DCD-44D5-A529-810413827672}" type="datetimeFigureOut">
               <a:rPr lang="pt-BR" smtClean="0"/>
-              <a:t>04/03/2023</a:t>
+              <a:t>05/03/2023</a:t>
             </a:fld>
             <a:endParaRPr lang="pt-BR"/>
           </a:p>
@@ -2238,7 +2326,7 @@
           <a:p>
             <a:fld id="{DBC44DCA-8DCD-44D5-A529-810413827672}" type="datetimeFigureOut">
               <a:rPr lang="pt-BR" smtClean="0"/>
-              <a:t>04/03/2023</a:t>
+              <a:t>05/03/2023</a:t>
             </a:fld>
             <a:endParaRPr lang="pt-BR"/>
           </a:p>
@@ -2408,7 +2496,7 @@
           <a:p>
             <a:fld id="{DBC44DCA-8DCD-44D5-A529-810413827672}" type="datetimeFigureOut">
               <a:rPr lang="pt-BR" smtClean="0"/>
-              <a:t>04/03/2023</a:t>
+              <a:t>05/03/2023</a:t>
             </a:fld>
             <a:endParaRPr lang="pt-BR"/>
           </a:p>
@@ -2652,7 +2740,7 @@
           <a:p>
             <a:fld id="{DBC44DCA-8DCD-44D5-A529-810413827672}" type="datetimeFigureOut">
               <a:rPr lang="pt-BR" smtClean="0"/>
-              <a:t>04/03/2023</a:t>
+              <a:t>05/03/2023</a:t>
             </a:fld>
             <a:endParaRPr lang="pt-BR"/>
           </a:p>
@@ -2884,7 +2972,7 @@
           <a:p>
             <a:fld id="{DBC44DCA-8DCD-44D5-A529-810413827672}" type="datetimeFigureOut">
               <a:rPr lang="pt-BR" smtClean="0"/>
-              <a:t>04/03/2023</a:t>
+              <a:t>05/03/2023</a:t>
             </a:fld>
             <a:endParaRPr lang="pt-BR"/>
           </a:p>
@@ -3251,7 +3339,7 @@
           <a:p>
             <a:fld id="{DBC44DCA-8DCD-44D5-A529-810413827672}" type="datetimeFigureOut">
               <a:rPr lang="pt-BR" smtClean="0"/>
-              <a:t>04/03/2023</a:t>
+              <a:t>05/03/2023</a:t>
             </a:fld>
             <a:endParaRPr lang="pt-BR"/>
           </a:p>
@@ -3369,7 +3457,7 @@
           <a:p>
             <a:fld id="{DBC44DCA-8DCD-44D5-A529-810413827672}" type="datetimeFigureOut">
               <a:rPr lang="pt-BR" smtClean="0"/>
-              <a:t>04/03/2023</a:t>
+              <a:t>05/03/2023</a:t>
             </a:fld>
             <a:endParaRPr lang="pt-BR"/>
           </a:p>
@@ -3464,7 +3552,7 @@
           <a:p>
             <a:fld id="{DBC44DCA-8DCD-44D5-A529-810413827672}" type="datetimeFigureOut">
               <a:rPr lang="pt-BR" smtClean="0"/>
-              <a:t>04/03/2023</a:t>
+              <a:t>05/03/2023</a:t>
             </a:fld>
             <a:endParaRPr lang="pt-BR"/>
           </a:p>
@@ -3741,7 +3829,7 @@
           <a:p>
             <a:fld id="{DBC44DCA-8DCD-44D5-A529-810413827672}" type="datetimeFigureOut">
               <a:rPr lang="pt-BR" smtClean="0"/>
-              <a:t>04/03/2023</a:t>
+              <a:t>05/03/2023</a:t>
             </a:fld>
             <a:endParaRPr lang="pt-BR"/>
           </a:p>
@@ -3998,7 +4086,7 @@
           <a:p>
             <a:fld id="{DBC44DCA-8DCD-44D5-A529-810413827672}" type="datetimeFigureOut">
               <a:rPr lang="pt-BR" smtClean="0"/>
-              <a:t>04/03/2023</a:t>
+              <a:t>05/03/2023</a:t>
             </a:fld>
             <a:endParaRPr lang="pt-BR"/>
           </a:p>
@@ -4211,7 +4299,7 @@
           <a:p>
             <a:fld id="{DBC44DCA-8DCD-44D5-A529-810413827672}" type="datetimeFigureOut">
               <a:rPr lang="pt-BR" smtClean="0"/>
-              <a:t>04/03/2023</a:t>
+              <a:t>05/03/2023</a:t>
             </a:fld>
             <a:endParaRPr lang="pt-BR"/>
           </a:p>
@@ -13324,7 +13412,9 @@
               </a:ext>
             </a:extLst>
           </p:cNvPr>
-          <p:cNvSpPr/>
+          <p:cNvSpPr>
+            <a:spLocks noGrp="1" noRot="1" noMove="1" noResize="1" noEditPoints="1" noAdjustHandles="1" noChangeArrowheads="1" noChangeShapeType="1"/>
+          </p:cNvSpPr>
           <p:nvPr/>
         </p:nvSpPr>
         <p:spPr>
@@ -13372,7 +13462,7 @@
           <a:lstStyle/>
           <a:p>
             <a:pPr algn="ctr"/>
-            <a:endParaRPr lang="pt-BR" sz="1893"/>
+            <a:endParaRPr lang="pt-BR" sz="1893" u="sng" dirty="0"/>
           </a:p>
         </p:txBody>
       </p:sp>
@@ -13532,7 +13622,7 @@
         </p:nvSpPr>
         <p:spPr>
           <a:xfrm>
-            <a:off x="3222749" y="7355912"/>
+            <a:off x="2865245" y="7355912"/>
             <a:ext cx="631426" cy="310717"/>
           </a:xfrm>
           <a:prstGeom prst="rect">
@@ -13774,7 +13864,7 @@
         </p:nvSpPr>
         <p:spPr>
           <a:xfrm>
-            <a:off x="10218021" y="9403248"/>
+            <a:off x="10247554" y="5593021"/>
             <a:ext cx="631426" cy="310717"/>
           </a:xfrm>
           <a:prstGeom prst="rect">
@@ -13892,7 +13982,7 @@
         </p:nvSpPr>
         <p:spPr>
           <a:xfrm>
-            <a:off x="8575143" y="9403248"/>
+            <a:off x="4754027" y="7315202"/>
             <a:ext cx="631426" cy="310717"/>
           </a:xfrm>
           <a:prstGeom prst="rect">
@@ -14433,7 +14523,7 @@
         </p:nvSpPr>
         <p:spPr>
           <a:xfrm>
-            <a:off x="1103803" y="7273643"/>
+            <a:off x="923521" y="7278835"/>
             <a:ext cx="631426" cy="310717"/>
           </a:xfrm>
           <a:prstGeom prst="rect">
@@ -14492,7 +14582,7 @@
         </p:nvSpPr>
         <p:spPr>
           <a:xfrm>
-            <a:off x="2207315" y="9403248"/>
+            <a:off x="2265170" y="9279371"/>
             <a:ext cx="631426" cy="310717"/>
           </a:xfrm>
           <a:prstGeom prst="rect">
@@ -14672,7 +14762,7 @@
           <p:nvPr>
             <p:extLst>
               <p:ext uri="{D42A27DB-BD31-4B8C-83A1-F6EECF244321}">
-                <p14:modId xmlns:p14="http://schemas.microsoft.com/office/powerpoint/2010/main" val="2065526992"/>
+                <p14:modId xmlns:p14="http://schemas.microsoft.com/office/powerpoint/2010/main" val="2780011154"/>
               </p:ext>
             </p:extLst>
           </p:nvPr>
@@ -14741,7 +14831,7 @@
           <p:nvPr>
             <p:extLst>
               <p:ext uri="{D42A27DB-BD31-4B8C-83A1-F6EECF244321}">
-                <p14:modId xmlns:p14="http://schemas.microsoft.com/office/powerpoint/2010/main" val="450677055"/>
+                <p14:modId xmlns:p14="http://schemas.microsoft.com/office/powerpoint/2010/main" val="4128172031"/>
               </p:ext>
             </p:extLst>
           </p:nvPr>
@@ -14810,7 +14900,7 @@
           <p:nvPr>
             <p:extLst>
               <p:ext uri="{D42A27DB-BD31-4B8C-83A1-F6EECF244321}">
-                <p14:modId xmlns:p14="http://schemas.microsoft.com/office/powerpoint/2010/main" val="1282368682"/>
+                <p14:modId xmlns:p14="http://schemas.microsoft.com/office/powerpoint/2010/main" val="1353492895"/>
               </p:ext>
             </p:extLst>
           </p:nvPr>
@@ -14879,7 +14969,7 @@
           <p:nvPr>
             <p:extLst>
               <p:ext uri="{D42A27DB-BD31-4B8C-83A1-F6EECF244321}">
-                <p14:modId xmlns:p14="http://schemas.microsoft.com/office/powerpoint/2010/main" val="1315362304"/>
+                <p14:modId xmlns:p14="http://schemas.microsoft.com/office/powerpoint/2010/main" val="3311433094"/>
               </p:ext>
             </p:extLst>
           </p:nvPr>
@@ -14948,7 +15038,7 @@
           <p:nvPr>
             <p:extLst>
               <p:ext uri="{D42A27DB-BD31-4B8C-83A1-F6EECF244321}">
-                <p14:modId xmlns:p14="http://schemas.microsoft.com/office/powerpoint/2010/main" val="2360908934"/>
+                <p14:modId xmlns:p14="http://schemas.microsoft.com/office/powerpoint/2010/main" val="975363099"/>
               </p:ext>
             </p:extLst>
           </p:nvPr>
@@ -15017,7 +15107,7 @@
           <p:nvPr>
             <p:extLst>
               <p:ext uri="{D42A27DB-BD31-4B8C-83A1-F6EECF244321}">
-                <p14:modId xmlns:p14="http://schemas.microsoft.com/office/powerpoint/2010/main" val="907944662"/>
+                <p14:modId xmlns:p14="http://schemas.microsoft.com/office/powerpoint/2010/main" val="2159097979"/>
               </p:ext>
             </p:extLst>
           </p:nvPr>
@@ -15086,7 +15176,7 @@
           <p:nvPr>
             <p:extLst>
               <p:ext uri="{D42A27DB-BD31-4B8C-83A1-F6EECF244321}">
-                <p14:modId xmlns:p14="http://schemas.microsoft.com/office/powerpoint/2010/main" val="2707594247"/>
+                <p14:modId xmlns:p14="http://schemas.microsoft.com/office/powerpoint/2010/main" val="1952306663"/>
               </p:ext>
             </p:extLst>
           </p:nvPr>
@@ -15155,7 +15245,7 @@
           <p:nvPr>
             <p:extLst>
               <p:ext uri="{D42A27DB-BD31-4B8C-83A1-F6EECF244321}">
-                <p14:modId xmlns:p14="http://schemas.microsoft.com/office/powerpoint/2010/main" val="1089281295"/>
+                <p14:modId xmlns:p14="http://schemas.microsoft.com/office/powerpoint/2010/main" val="2411554531"/>
               </p:ext>
             </p:extLst>
           </p:nvPr>
@@ -15224,7 +15314,7 @@
           <p:nvPr>
             <p:extLst>
               <p:ext uri="{D42A27DB-BD31-4B8C-83A1-F6EECF244321}">
-                <p14:modId xmlns:p14="http://schemas.microsoft.com/office/powerpoint/2010/main" val="1994720777"/>
+                <p14:modId xmlns:p14="http://schemas.microsoft.com/office/powerpoint/2010/main" val="205462678"/>
               </p:ext>
             </p:extLst>
           </p:nvPr>
@@ -15293,7 +15383,7 @@
           <p:nvPr>
             <p:extLst>
               <p:ext uri="{D42A27DB-BD31-4B8C-83A1-F6EECF244321}">
-                <p14:modId xmlns:p14="http://schemas.microsoft.com/office/powerpoint/2010/main" val="4166962470"/>
+                <p14:modId xmlns:p14="http://schemas.microsoft.com/office/powerpoint/2010/main" val="3306555153"/>
               </p:ext>
             </p:extLst>
           </p:nvPr>
@@ -15362,7 +15452,7 @@
           <p:nvPr>
             <p:extLst>
               <p:ext uri="{D42A27DB-BD31-4B8C-83A1-F6EECF244321}">
-                <p14:modId xmlns:p14="http://schemas.microsoft.com/office/powerpoint/2010/main" val="32634121"/>
+                <p14:modId xmlns:p14="http://schemas.microsoft.com/office/powerpoint/2010/main" val="2645720185"/>
               </p:ext>
             </p:extLst>
           </p:nvPr>
@@ -15553,7 +15643,7 @@
           <p:nvPr>
             <p:extLst>
               <p:ext uri="{D42A27DB-BD31-4B8C-83A1-F6EECF244321}">
-                <p14:modId xmlns:p14="http://schemas.microsoft.com/office/powerpoint/2010/main" val="3878456793"/>
+                <p14:modId xmlns:p14="http://schemas.microsoft.com/office/powerpoint/2010/main" val="3336729559"/>
               </p:ext>
             </p:extLst>
           </p:nvPr>
@@ -15622,7 +15712,7 @@
           <p:nvPr>
             <p:extLst>
               <p:ext uri="{D42A27DB-BD31-4B8C-83A1-F6EECF244321}">
-                <p14:modId xmlns:p14="http://schemas.microsoft.com/office/powerpoint/2010/main" val="3142826776"/>
+                <p14:modId xmlns:p14="http://schemas.microsoft.com/office/powerpoint/2010/main" val="3805378128"/>
               </p:ext>
             </p:extLst>
           </p:nvPr>
@@ -15691,7 +15781,7 @@
           <p:nvPr>
             <p:extLst>
               <p:ext uri="{D42A27DB-BD31-4B8C-83A1-F6EECF244321}">
-                <p14:modId xmlns:p14="http://schemas.microsoft.com/office/powerpoint/2010/main" val="89712112"/>
+                <p14:modId xmlns:p14="http://schemas.microsoft.com/office/powerpoint/2010/main" val="877189896"/>
               </p:ext>
             </p:extLst>
           </p:nvPr>
@@ -15760,7 +15850,7 @@
           <p:nvPr>
             <p:extLst>
               <p:ext uri="{D42A27DB-BD31-4B8C-83A1-F6EECF244321}">
-                <p14:modId xmlns:p14="http://schemas.microsoft.com/office/powerpoint/2010/main" val="1782895052"/>
+                <p14:modId xmlns:p14="http://schemas.microsoft.com/office/powerpoint/2010/main" val="3487502287"/>
               </p:ext>
             </p:extLst>
           </p:nvPr>
@@ -15829,7 +15919,7 @@
           <p:nvPr>
             <p:extLst>
               <p:ext uri="{D42A27DB-BD31-4B8C-83A1-F6EECF244321}">
-                <p14:modId xmlns:p14="http://schemas.microsoft.com/office/powerpoint/2010/main" val="1400419698"/>
+                <p14:modId xmlns:p14="http://schemas.microsoft.com/office/powerpoint/2010/main" val="1825233770"/>
               </p:ext>
             </p:extLst>
           </p:nvPr>
@@ -15898,13 +15988,13 @@
           <p:nvPr>
             <p:extLst>
               <p:ext uri="{D42A27DB-BD31-4B8C-83A1-F6EECF244321}">
-                <p14:modId xmlns:p14="http://schemas.microsoft.com/office/powerpoint/2010/main" val="902893343"/>
+                <p14:modId xmlns:p14="http://schemas.microsoft.com/office/powerpoint/2010/main" val="3523646049"/>
               </p:ext>
             </p:extLst>
           </p:nvPr>
         </p:nvGraphicFramePr>
         <p:xfrm>
-          <a:off x="8838007" y="4973237"/>
+          <a:off x="8724428" y="4728255"/>
           <a:ext cx="892175" cy="376238"/>
         </p:xfrm>
         <a:graphic>
@@ -15938,7 +16028,7 @@
                     </p:blipFill>
                     <p:spPr>
                       <a:xfrm>
-                        <a:off x="8838007" y="4973237"/>
+                        <a:off x="8724428" y="4728255"/>
                         <a:ext cx="892175" cy="376238"/>
                       </a:xfrm>
                       <a:prstGeom prst="rect">
@@ -15966,7 +16056,7 @@
         </p:nvSpPr>
         <p:spPr>
           <a:xfrm>
-            <a:off x="8919409" y="5622525"/>
+            <a:off x="8805830" y="5377543"/>
             <a:ext cx="631426" cy="310717"/>
           </a:xfrm>
           <a:prstGeom prst="rect">
@@ -16026,13 +16116,13 @@
           <p:nvPr>
             <p:extLst>
               <p:ext uri="{D42A27DB-BD31-4B8C-83A1-F6EECF244321}">
-                <p14:modId xmlns:p14="http://schemas.microsoft.com/office/powerpoint/2010/main" val="1307161658"/>
+                <p14:modId xmlns:p14="http://schemas.microsoft.com/office/powerpoint/2010/main" val="1452776677"/>
               </p:ext>
             </p:extLst>
           </p:nvPr>
         </p:nvGraphicFramePr>
         <p:xfrm>
-          <a:off x="339489" y="6191250"/>
+          <a:off x="159207" y="6196442"/>
           <a:ext cx="2349500" cy="1077912"/>
         </p:xfrm>
         <a:graphic>
@@ -16066,7 +16156,7 @@
                     </p:blipFill>
                     <p:spPr>
                       <a:xfrm>
-                        <a:off x="339489" y="6191250"/>
+                        <a:off x="159207" y="6196442"/>
                         <a:ext cx="2349500" cy="1077912"/>
                       </a:xfrm>
                       <a:prstGeom prst="rect">
@@ -16095,13 +16185,13 @@
           <p:nvPr>
             <p:extLst>
               <p:ext uri="{D42A27DB-BD31-4B8C-83A1-F6EECF244321}">
-                <p14:modId xmlns:p14="http://schemas.microsoft.com/office/powerpoint/2010/main" val="904957334"/>
+                <p14:modId xmlns:p14="http://schemas.microsoft.com/office/powerpoint/2010/main" val="925958175"/>
               </p:ext>
             </p:extLst>
           </p:nvPr>
         </p:nvGraphicFramePr>
         <p:xfrm>
-          <a:off x="2938387" y="6093619"/>
+          <a:off x="2580883" y="6093619"/>
           <a:ext cx="1200150" cy="1273175"/>
         </p:xfrm>
         <a:graphic>
@@ -16135,7 +16225,7 @@
                     </p:blipFill>
                     <p:spPr>
                       <a:xfrm>
-                        <a:off x="2938387" y="6093619"/>
+                        <a:off x="2580883" y="6093619"/>
                         <a:ext cx="1200150" cy="1273175"/>
                       </a:xfrm>
                       <a:prstGeom prst="rect">
@@ -16164,25 +16254,25 @@
           <p:nvPr>
             <p:extLst>
               <p:ext uri="{D42A27DB-BD31-4B8C-83A1-F6EECF244321}">
-                <p14:modId xmlns:p14="http://schemas.microsoft.com/office/powerpoint/2010/main" val="1567289240"/>
+                <p14:modId xmlns:p14="http://schemas.microsoft.com/office/powerpoint/2010/main" val="4260217256"/>
               </p:ext>
             </p:extLst>
           </p:nvPr>
         </p:nvGraphicFramePr>
         <p:xfrm>
-          <a:off x="6907840" y="6016851"/>
-          <a:ext cx="4484687" cy="1419225"/>
+          <a:off x="6300463" y="5957931"/>
+          <a:ext cx="2533650" cy="1566863"/>
         </p:xfrm>
         <a:graphic>
           <a:graphicData uri="http://schemas.openxmlformats.org/presentationml/2006/ole">
             <mc:AlternateContent xmlns:mc="http://schemas.openxmlformats.org/markup-compatibility/2006">
               <mc:Choice xmlns:v="urn:schemas-microsoft-com:vml" Requires="v">
-                <p:oleObj name="CS ChemDraw Drawing" r:id="rId40" imgW="4484847" imgH="1418641" progId="ChemDraw.Document.6.0">
+                <p:oleObj name="CS ChemDraw Drawing" r:id="rId40" imgW="2534249" imgH="1567616" progId="ChemDraw.Document.6.0">
                   <p:embed/>
                 </p:oleObj>
               </mc:Choice>
               <mc:Fallback>
-                <p:oleObj name="CS ChemDraw Drawing" r:id="rId40" imgW="4484847" imgH="1418641" progId="ChemDraw.Document.6.0">
+                <p:oleObj name="CS ChemDraw Drawing" r:id="rId40" imgW="2534249" imgH="1567616" progId="ChemDraw.Document.6.0">
                   <p:embed/>
                   <p:pic>
                     <p:nvPicPr>
@@ -16204,8 +16294,8 @@
                     </p:blipFill>
                     <p:spPr>
                       <a:xfrm>
-                        <a:off x="6907840" y="6016851"/>
-                        <a:ext cx="4484687" cy="1419225"/>
+                        <a:off x="6300463" y="5957931"/>
+                        <a:ext cx="2533650" cy="1566863"/>
                       </a:xfrm>
                       <a:prstGeom prst="rect">
                         <a:avLst/>
@@ -16232,7 +16322,7 @@
         </p:nvSpPr>
         <p:spPr>
           <a:xfrm>
-            <a:off x="8591203" y="7541799"/>
+            <a:off x="7009728" y="7556130"/>
             <a:ext cx="631426" cy="310717"/>
           </a:xfrm>
           <a:prstGeom prst="rect">
@@ -16292,7 +16382,7 @@
           <p:nvPr>
             <p:extLst>
               <p:ext uri="{D42A27DB-BD31-4B8C-83A1-F6EECF244321}">
-                <p14:modId xmlns:p14="http://schemas.microsoft.com/office/powerpoint/2010/main" val="4028932495"/>
+                <p14:modId xmlns:p14="http://schemas.microsoft.com/office/powerpoint/2010/main" val="1936296822"/>
               </p:ext>
             </p:extLst>
           </p:nvPr>
@@ -16361,25 +16451,25 @@
           <p:nvPr>
             <p:extLst>
               <p:ext uri="{D42A27DB-BD31-4B8C-83A1-F6EECF244321}">
-                <p14:modId xmlns:p14="http://schemas.microsoft.com/office/powerpoint/2010/main" val="3772427702"/>
+                <p14:modId xmlns:p14="http://schemas.microsoft.com/office/powerpoint/2010/main" val="290607452"/>
               </p:ext>
             </p:extLst>
           </p:nvPr>
         </p:nvGraphicFramePr>
         <p:xfrm>
-          <a:off x="3853139" y="7769776"/>
-          <a:ext cx="4181475" cy="1446212"/>
+          <a:off x="8881582" y="5782712"/>
+          <a:ext cx="2366963" cy="1595437"/>
         </p:xfrm>
         <a:graphic>
           <a:graphicData uri="http://schemas.openxmlformats.org/presentationml/2006/ole">
             <mc:AlternateContent xmlns:mc="http://schemas.openxmlformats.org/markup-compatibility/2006">
               <mc:Choice xmlns:v="urn:schemas-microsoft-com:vml" Requires="v">
-                <p:oleObj name="CS ChemDraw Drawing" r:id="rId44" imgW="4181674" imgH="1446126" progId="ChemDraw.Document.6.0">
+                <p:oleObj name="CS ChemDraw Drawing" r:id="rId44" imgW="2366705" imgH="1595253" progId="ChemDraw.Document.6.0">
                   <p:embed/>
                 </p:oleObj>
               </mc:Choice>
               <mc:Fallback>
-                <p:oleObj name="CS ChemDraw Drawing" r:id="rId44" imgW="4181674" imgH="1446126" progId="ChemDraw.Document.6.0">
+                <p:oleObj name="CS ChemDraw Drawing" r:id="rId44" imgW="2366705" imgH="1595253" progId="ChemDraw.Document.6.0">
                   <p:embed/>
                   <p:pic>
                     <p:nvPicPr>
@@ -16401,8 +16491,8 @@
                     </p:blipFill>
                     <p:spPr>
                       <a:xfrm>
-                        <a:off x="3853139" y="7769776"/>
-                        <a:ext cx="4181475" cy="1446212"/>
+                        <a:off x="8881582" y="5782712"/>
+                        <a:ext cx="2366963" cy="1595437"/>
                       </a:xfrm>
                       <a:prstGeom prst="rect">
                         <a:avLst/>
@@ -16429,7 +16519,7 @@
         </p:nvSpPr>
         <p:spPr>
           <a:xfrm>
-            <a:off x="5740942" y="9403248"/>
+            <a:off x="9863333" y="7491232"/>
             <a:ext cx="631426" cy="310717"/>
           </a:xfrm>
           <a:prstGeom prst="rect">
@@ -16489,13 +16579,13 @@
           <p:nvPr>
             <p:extLst>
               <p:ext uri="{D42A27DB-BD31-4B8C-83A1-F6EECF244321}">
-                <p14:modId xmlns:p14="http://schemas.microsoft.com/office/powerpoint/2010/main" val="917142895"/>
+                <p14:modId xmlns:p14="http://schemas.microsoft.com/office/powerpoint/2010/main" val="3196254933"/>
               </p:ext>
             </p:extLst>
           </p:nvPr>
         </p:nvGraphicFramePr>
         <p:xfrm>
-          <a:off x="7664687" y="7947576"/>
+          <a:off x="4029558" y="6141844"/>
           <a:ext cx="1965325" cy="1090612"/>
         </p:xfrm>
         <a:graphic>
@@ -16529,7 +16619,7 @@
                     </p:blipFill>
                     <p:spPr>
                       <a:xfrm>
-                        <a:off x="7664687" y="7947576"/>
+                        <a:off x="4029558" y="6141844"/>
                         <a:ext cx="1965325" cy="1090612"/>
                       </a:xfrm>
                       <a:prstGeom prst="rect">
@@ -16558,7 +16648,7 @@
           <p:nvPr>
             <p:extLst>
               <p:ext uri="{D42A27DB-BD31-4B8C-83A1-F6EECF244321}">
-                <p14:modId xmlns:p14="http://schemas.microsoft.com/office/powerpoint/2010/main" val="2565332406"/>
+                <p14:modId xmlns:p14="http://schemas.microsoft.com/office/powerpoint/2010/main" val="2056410047"/>
               </p:ext>
             </p:extLst>
           </p:nvPr>
@@ -16627,13 +16717,13 @@
           <p:nvPr>
             <p:extLst>
               <p:ext uri="{D42A27DB-BD31-4B8C-83A1-F6EECF244321}">
-                <p14:modId xmlns:p14="http://schemas.microsoft.com/office/powerpoint/2010/main" val="3802348397"/>
+                <p14:modId xmlns:p14="http://schemas.microsoft.com/office/powerpoint/2010/main" val="3624977403"/>
               </p:ext>
             </p:extLst>
           </p:nvPr>
         </p:nvGraphicFramePr>
         <p:xfrm>
-          <a:off x="9939989" y="7936555"/>
+          <a:off x="9810240" y="4365624"/>
           <a:ext cx="1546225" cy="1214438"/>
         </p:xfrm>
         <a:graphic>
@@ -16667,7 +16757,7 @@
                     </p:blipFill>
                     <p:spPr>
                       <a:xfrm>
-                        <a:off x="9939989" y="7936555"/>
+                        <a:off x="9810240" y="4365624"/>
                         <a:ext cx="1546225" cy="1214438"/>
                       </a:xfrm>
                       <a:prstGeom prst="rect">
@@ -16695,7 +16785,7 @@
         </p:nvSpPr>
         <p:spPr>
           <a:xfrm>
-            <a:off x="5121152" y="7384960"/>
+            <a:off x="4427167" y="9075472"/>
             <a:ext cx="631426" cy="310717"/>
           </a:xfrm>
           <a:prstGeom prst="rect">
@@ -16755,13 +16845,13 @@
           <p:nvPr>
             <p:extLst>
               <p:ext uri="{D42A27DB-BD31-4B8C-83A1-F6EECF244321}">
-                <p14:modId xmlns:p14="http://schemas.microsoft.com/office/powerpoint/2010/main" val="2533629616"/>
+                <p14:modId xmlns:p14="http://schemas.microsoft.com/office/powerpoint/2010/main" val="3038709702"/>
               </p:ext>
             </p:extLst>
           </p:nvPr>
         </p:nvGraphicFramePr>
         <p:xfrm>
-          <a:off x="4524651" y="6161413"/>
+          <a:off x="3830666" y="7851925"/>
           <a:ext cx="1997075" cy="1192212"/>
         </p:xfrm>
         <a:graphic>
@@ -16795,7 +16885,7 @@
                     </p:blipFill>
                     <p:spPr>
                       <a:xfrm>
-                        <a:off x="4524651" y="6161413"/>
+                        <a:off x="3830666" y="7851925"/>
                         <a:ext cx="1997075" cy="1192212"/>
                       </a:xfrm>
                       <a:prstGeom prst="rect">
@@ -16824,13 +16914,13 @@
           <p:nvPr>
             <p:extLst>
               <p:ext uri="{D42A27DB-BD31-4B8C-83A1-F6EECF244321}">
-                <p14:modId xmlns:p14="http://schemas.microsoft.com/office/powerpoint/2010/main" val="1947193211"/>
+                <p14:modId xmlns:p14="http://schemas.microsoft.com/office/powerpoint/2010/main" val="261117778"/>
               </p:ext>
             </p:extLst>
           </p:nvPr>
         </p:nvGraphicFramePr>
         <p:xfrm>
-          <a:off x="525463" y="9672638"/>
+          <a:off x="525463" y="9621838"/>
           <a:ext cx="1631950" cy="1403350"/>
         </p:xfrm>
         <a:graphic>
@@ -16864,7 +16954,7 @@
                     </p:blipFill>
                     <p:spPr>
                       <a:xfrm>
-                        <a:off x="525463" y="9672638"/>
+                        <a:off x="525463" y="9621838"/>
                         <a:ext cx="1631950" cy="1403350"/>
                       </a:xfrm>
                       <a:prstGeom prst="rect">
@@ -16892,7 +16982,7 @@
         </p:nvSpPr>
         <p:spPr>
           <a:xfrm>
-            <a:off x="2020851" y="10129189"/>
+            <a:off x="1046888" y="10563541"/>
             <a:ext cx="631426" cy="310717"/>
           </a:xfrm>
           <a:prstGeom prst="rect">
@@ -16954,25 +17044,25 @@
           <p:nvPr>
             <p:extLst>
               <p:ext uri="{D42A27DB-BD31-4B8C-83A1-F6EECF244321}">
-                <p14:modId xmlns:p14="http://schemas.microsoft.com/office/powerpoint/2010/main" val="341260966"/>
+                <p14:modId xmlns:p14="http://schemas.microsoft.com/office/powerpoint/2010/main" val="3094500091"/>
               </p:ext>
             </p:extLst>
           </p:nvPr>
         </p:nvGraphicFramePr>
         <p:xfrm>
-          <a:off x="2962275" y="9717088"/>
-          <a:ext cx="1935163" cy="1212850"/>
+          <a:off x="2470150" y="9590088"/>
+          <a:ext cx="1935163" cy="1422400"/>
         </p:xfrm>
         <a:graphic>
           <a:graphicData uri="http://schemas.openxmlformats.org/presentationml/2006/ole">
             <mc:AlternateContent xmlns:mc="http://schemas.openxmlformats.org/markup-compatibility/2006">
               <mc:Choice xmlns:v="urn:schemas-microsoft-com:vml" Requires="v">
-                <p:oleObj name="CS ChemDraw Drawing" r:id="rId56" imgW="1935001" imgH="1212561" progId="ChemDraw.Document.6.0">
+                <p:oleObj name="CS ChemDraw Drawing" r:id="rId56" imgW="1935001" imgH="1421756" progId="ChemDraw.Document.6.0">
                   <p:embed/>
                 </p:oleObj>
               </mc:Choice>
               <mc:Fallback>
-                <p:oleObj name="CS ChemDraw Drawing" r:id="rId56" imgW="1935001" imgH="1212561" progId="ChemDraw.Document.6.0">
+                <p:oleObj name="CS ChemDraw Drawing" r:id="rId56" imgW="1935001" imgH="1421756" progId="ChemDraw.Document.6.0">
                   <p:embed/>
                   <p:pic>
                     <p:nvPicPr>
@@ -16994,8 +17084,8 @@
                     </p:blipFill>
                     <p:spPr>
                       <a:xfrm>
-                        <a:off x="2962275" y="9717088"/>
-                        <a:ext cx="1935163" cy="1212850"/>
+                        <a:off x="2470150" y="9590088"/>
+                        <a:ext cx="1935163" cy="1422400"/>
                       </a:xfrm>
                       <a:prstGeom prst="rect">
                         <a:avLst/>
@@ -17022,7 +17112,7 @@
         </p:nvSpPr>
         <p:spPr>
           <a:xfrm>
-            <a:off x="4886986" y="10297410"/>
+            <a:off x="3122018" y="10544987"/>
             <a:ext cx="631426" cy="310717"/>
           </a:xfrm>
           <a:prstGeom prst="rect">
@@ -17056,6 +17146,266 @@
                 <a:sym typeface="Avenir"/>
               </a:rPr>
               <a:t>INFL</a:t>
+            </a:r>
+            <a:endParaRPr lang="pt-BR" sz="1600" dirty="0">
+              <a:solidFill>
+                <a:srgbClr val="00B050"/>
+              </a:solidFill>
+              <a:latin typeface="Arial"/>
+              <a:ea typeface="Arial"/>
+              <a:cs typeface="Arial"/>
+              <a:sym typeface="Arial"/>
+            </a:endParaRPr>
+          </a:p>
+        </p:txBody>
+      </p:sp>
+      <p:sp>
+        <p:nvSpPr>
+          <p:cNvPr id="29" name="Google Shape;298;p9">
+            <a:extLst>
+              <a:ext uri="{FF2B5EF4-FFF2-40B4-BE49-F238E27FC236}">
+                <a16:creationId xmlns:a16="http://schemas.microsoft.com/office/drawing/2014/main" id="{C564F456-CD91-4B9D-9C21-B45930092CC3}"/>
+              </a:ext>
+            </a:extLst>
+          </p:cNvPr>
+          <p:cNvSpPr txBox="1"/>
+          <p:nvPr/>
+        </p:nvSpPr>
+        <p:spPr>
+          <a:xfrm>
+            <a:off x="6753105" y="9635827"/>
+            <a:ext cx="631426" cy="310717"/>
+          </a:xfrm>
+          <a:prstGeom prst="rect">
+            <a:avLst/>
+          </a:prstGeom>
+          <a:noFill/>
+          <a:ln>
+            <a:noFill/>
+          </a:ln>
+        </p:spPr>
+        <p:txBody>
+          <a:bodyPr spcFirstLastPara="1" wrap="square" lIns="94378" tIns="47176" rIns="94378" bIns="47176" anchor="t" anchorCtr="0">
+            <a:spAutoFit/>
+          </a:bodyPr>
+          <a:lstStyle/>
+          <a:p>
+            <a:pPr algn="ctr">
+              <a:buClr>
+                <a:srgbClr val="000000"/>
+              </a:buClr>
+              <a:buSzPts val="1200"/>
+            </a:pPr>
+            <a:r>
+              <a:rPr lang="pt-BR" sz="1400" b="1" dirty="0">
+                <a:solidFill>
+                  <a:srgbClr val="00B050"/>
+                </a:solidFill>
+                <a:latin typeface="Avenir"/>
+                <a:ea typeface="Arial"/>
+                <a:cs typeface="Arial"/>
+                <a:sym typeface="Avenir"/>
+              </a:rPr>
+              <a:t>4IDT</a:t>
+            </a:r>
+            <a:endParaRPr lang="pt-BR" sz="1600" dirty="0">
+              <a:solidFill>
+                <a:srgbClr val="00B050"/>
+              </a:solidFill>
+              <a:latin typeface="Arial"/>
+              <a:ea typeface="Arial"/>
+              <a:cs typeface="Arial"/>
+              <a:sym typeface="Arial"/>
+            </a:endParaRPr>
+          </a:p>
+        </p:txBody>
+      </p:sp>
+      <p:graphicFrame>
+        <p:nvGraphicFramePr>
+          <p:cNvPr id="30" name="Objeto 29">
+            <a:extLst>
+              <a:ext uri="{FF2B5EF4-FFF2-40B4-BE49-F238E27FC236}">
+                <a16:creationId xmlns:a16="http://schemas.microsoft.com/office/drawing/2014/main" id="{39C4941F-48FF-076E-7407-1AD92AB3B841}"/>
+              </a:ext>
+            </a:extLst>
+          </p:cNvPr>
+          <p:cNvGraphicFramePr>
+            <a:graphicFrameLocks noChangeAspect="1"/>
+          </p:cNvGraphicFramePr>
+          <p:nvPr>
+            <p:extLst>
+              <p:ext uri="{D42A27DB-BD31-4B8C-83A1-F6EECF244321}">
+                <p14:modId xmlns:p14="http://schemas.microsoft.com/office/powerpoint/2010/main" val="481804114"/>
+              </p:ext>
+            </p:extLst>
+          </p:nvPr>
+        </p:nvGraphicFramePr>
+        <p:xfrm>
+          <a:off x="6229876" y="8024813"/>
+          <a:ext cx="1817687" cy="1597025"/>
+        </p:xfrm>
+        <a:graphic>
+          <a:graphicData uri="http://schemas.openxmlformats.org/presentationml/2006/ole">
+            <mc:AlternateContent xmlns:mc="http://schemas.openxmlformats.org/markup-compatibility/2006">
+              <mc:Choice xmlns:v="urn:schemas-microsoft-com:vml" Requires="v">
+                <p:oleObj name="CS ChemDraw Drawing" r:id="rId58" imgW="1817682" imgH="1596788" progId="ChemDraw.Document.6.0">
+                  <p:embed/>
+                </p:oleObj>
+              </mc:Choice>
+              <mc:Fallback>
+                <p:oleObj name="CS ChemDraw Drawing" r:id="rId58" imgW="1817682" imgH="1596788" progId="ChemDraw.Document.6.0">
+                  <p:embed/>
+                  <p:pic>
+                    <p:nvPicPr>
+                      <p:cNvPr id="30" name="Objeto 29">
+                        <a:extLst>
+                          <a:ext uri="{FF2B5EF4-FFF2-40B4-BE49-F238E27FC236}">
+                            <a16:creationId xmlns:a16="http://schemas.microsoft.com/office/drawing/2014/main" id="{39C4941F-48FF-076E-7407-1AD92AB3B841}"/>
+                          </a:ext>
+                        </a:extLst>
+                      </p:cNvPr>
+                      <p:cNvPicPr/>
+                      <p:nvPr/>
+                    </p:nvPicPr>
+                    <p:blipFill>
+                      <a:blip r:embed="rId59"/>
+                      <a:stretch>
+                        <a:fillRect/>
+                      </a:stretch>
+                    </p:blipFill>
+                    <p:spPr>
+                      <a:xfrm>
+                        <a:off x="6229876" y="8024813"/>
+                        <a:ext cx="1817687" cy="1597025"/>
+                      </a:xfrm>
+                      <a:prstGeom prst="rect">
+                        <a:avLst/>
+                      </a:prstGeom>
+                    </p:spPr>
+                  </p:pic>
+                </p:oleObj>
+              </mc:Fallback>
+            </mc:AlternateContent>
+          </a:graphicData>
+        </a:graphic>
+      </p:graphicFrame>
+      <p:graphicFrame>
+        <p:nvGraphicFramePr>
+          <p:cNvPr id="35" name="Objeto 34">
+            <a:extLst>
+              <a:ext uri="{FF2B5EF4-FFF2-40B4-BE49-F238E27FC236}">
+                <a16:creationId xmlns:a16="http://schemas.microsoft.com/office/drawing/2014/main" id="{04F8035D-8463-ACE7-2119-276CD44AD7EE}"/>
+              </a:ext>
+            </a:extLst>
+          </p:cNvPr>
+          <p:cNvGraphicFramePr>
+            <a:graphicFrameLocks noChangeAspect="1"/>
+          </p:cNvGraphicFramePr>
+          <p:nvPr>
+            <p:extLst>
+              <p:ext uri="{D42A27DB-BD31-4B8C-83A1-F6EECF244321}">
+                <p14:modId xmlns:p14="http://schemas.microsoft.com/office/powerpoint/2010/main" val="1520965472"/>
+              </p:ext>
+            </p:extLst>
+          </p:nvPr>
+        </p:nvGraphicFramePr>
+        <p:xfrm>
+          <a:off x="8534511" y="8016389"/>
+          <a:ext cx="1809750" cy="1493838"/>
+        </p:xfrm>
+        <a:graphic>
+          <a:graphicData uri="http://schemas.openxmlformats.org/presentationml/2006/ole">
+            <mc:AlternateContent xmlns:mc="http://schemas.openxmlformats.org/markup-compatibility/2006">
+              <mc:Choice xmlns:v="urn:schemas-microsoft-com:vml" Requires="v">
+                <p:oleObj name="CS ChemDraw Drawing" r:id="rId60" imgW="1810014" imgH="1493150" progId="ChemDraw.Document.6.0">
+                  <p:embed/>
+                </p:oleObj>
+              </mc:Choice>
+              <mc:Fallback>
+                <p:oleObj name="CS ChemDraw Drawing" r:id="rId60" imgW="1810014" imgH="1493150" progId="ChemDraw.Document.6.0">
+                  <p:embed/>
+                  <p:pic>
+                    <p:nvPicPr>
+                      <p:cNvPr id="35" name="Objeto 34">
+                        <a:extLst>
+                          <a:ext uri="{FF2B5EF4-FFF2-40B4-BE49-F238E27FC236}">
+                            <a16:creationId xmlns:a16="http://schemas.microsoft.com/office/drawing/2014/main" id="{04F8035D-8463-ACE7-2119-276CD44AD7EE}"/>
+                          </a:ext>
+                        </a:extLst>
+                      </p:cNvPr>
+                      <p:cNvPicPr/>
+                      <p:nvPr/>
+                    </p:nvPicPr>
+                    <p:blipFill>
+                      <a:blip r:embed="rId61"/>
+                      <a:stretch>
+                        <a:fillRect/>
+                      </a:stretch>
+                    </p:blipFill>
+                    <p:spPr>
+                      <a:xfrm>
+                        <a:off x="8534511" y="8016389"/>
+                        <a:ext cx="1809750" cy="1493838"/>
+                      </a:xfrm>
+                      <a:prstGeom prst="rect">
+                        <a:avLst/>
+                      </a:prstGeom>
+                    </p:spPr>
+                  </p:pic>
+                </p:oleObj>
+              </mc:Fallback>
+            </mc:AlternateContent>
+          </a:graphicData>
+        </a:graphic>
+      </p:graphicFrame>
+      <p:sp>
+        <p:nvSpPr>
+          <p:cNvPr id="36" name="Google Shape;298;p9">
+            <a:extLst>
+              <a:ext uri="{FF2B5EF4-FFF2-40B4-BE49-F238E27FC236}">
+                <a16:creationId xmlns:a16="http://schemas.microsoft.com/office/drawing/2014/main" id="{5ACE21A8-62E3-4DFA-B49F-C18BB0857009}"/>
+              </a:ext>
+            </a:extLst>
+          </p:cNvPr>
+          <p:cNvSpPr txBox="1"/>
+          <p:nvPr/>
+        </p:nvSpPr>
+        <p:spPr>
+          <a:xfrm>
+            <a:off x="9019805" y="9573705"/>
+            <a:ext cx="631426" cy="310717"/>
+          </a:xfrm>
+          <a:prstGeom prst="rect">
+            <a:avLst/>
+          </a:prstGeom>
+          <a:noFill/>
+          <a:ln>
+            <a:noFill/>
+          </a:ln>
+        </p:spPr>
+        <p:txBody>
+          <a:bodyPr spcFirstLastPara="1" wrap="square" lIns="94378" tIns="47176" rIns="94378" bIns="47176" anchor="t" anchorCtr="0">
+            <a:spAutoFit/>
+          </a:bodyPr>
+          <a:lstStyle/>
+          <a:p>
+            <a:pPr algn="ctr">
+              <a:buClr>
+                <a:srgbClr val="000000"/>
+              </a:buClr>
+              <a:buSzPts val="1200"/>
+            </a:pPr>
+            <a:r>
+              <a:rPr lang="pt-BR" sz="1400" b="1" dirty="0">
+                <a:solidFill>
+                  <a:srgbClr val="00B050"/>
+                </a:solidFill>
+                <a:latin typeface="Avenir"/>
+                <a:ea typeface="Arial"/>
+                <a:cs typeface="Arial"/>
+                <a:sym typeface="Avenir"/>
+              </a:rPr>
+              <a:t>3IDT</a:t>
             </a:r>
             <a:endParaRPr lang="pt-BR" sz="1600" dirty="0">
               <a:solidFill>

</xml_diff>

<commit_message>
Add new BB structures to image
</commit_message>
<xml_diff>
--- a/docs/Blocos_de_constru.pptx
+++ b/docs/Blocos_de_constru.pptx
@@ -122,7 +122,7 @@
   <pc:docChgLst>
     <pc:chgData name="Felipe Lopes de Oliveira" userId="7927722fe4027b30" providerId="LiveId" clId="{988CB3FB-85FE-4B18-8889-744054AB9037}"/>
     <pc:docChg chg="undo custSel addSld modSld">
-      <pc:chgData name="Felipe Lopes de Oliveira" userId="7927722fe4027b30" providerId="LiveId" clId="{988CB3FB-85FE-4B18-8889-744054AB9037}" dt="2023-03-05T15:39:33.443" v="1597" actId="5736"/>
+      <pc:chgData name="Felipe Lopes de Oliveira" userId="7927722fe4027b30" providerId="LiveId" clId="{988CB3FB-85FE-4B18-8889-744054AB9037}" dt="2023-03-05T16:26:04.879" v="2101" actId="5736"/>
       <pc:docMkLst>
         <pc:docMk/>
       </pc:docMkLst>
@@ -142,13 +142,13 @@
         </pc:spChg>
       </pc:sldChg>
       <pc:sldChg chg="addSp delSp modSp mod">
-        <pc:chgData name="Felipe Lopes de Oliveira" userId="7927722fe4027b30" providerId="LiveId" clId="{988CB3FB-85FE-4B18-8889-744054AB9037}" dt="2023-03-05T15:39:33.443" v="1597" actId="5736"/>
+        <pc:chgData name="Felipe Lopes de Oliveira" userId="7927722fe4027b30" providerId="LiveId" clId="{988CB3FB-85FE-4B18-8889-744054AB9037}" dt="2023-03-05T16:26:04.879" v="2101" actId="5736"/>
         <pc:sldMkLst>
           <pc:docMk/>
           <pc:sldMk cId="1480784656" sldId="257"/>
         </pc:sldMkLst>
         <pc:spChg chg="mod">
-          <ac:chgData name="Felipe Lopes de Oliveira" userId="7927722fe4027b30" providerId="LiveId" clId="{988CB3FB-85FE-4B18-8889-744054AB9037}" dt="2023-03-05T15:39:33.443" v="1597" actId="5736"/>
+          <ac:chgData name="Felipe Lopes de Oliveira" userId="7927722fe4027b30" providerId="LiveId" clId="{988CB3FB-85FE-4B18-8889-744054AB9037}" dt="2023-03-05T16:26:04.879" v="2101" actId="5736"/>
           <ac:spMkLst>
             <pc:docMk/>
             <pc:sldMk cId="1480784656" sldId="257"/>
@@ -156,7 +156,7 @@
           </ac:spMkLst>
         </pc:spChg>
         <pc:spChg chg="mod">
-          <ac:chgData name="Felipe Lopes de Oliveira" userId="7927722fe4027b30" providerId="LiveId" clId="{988CB3FB-85FE-4B18-8889-744054AB9037}" dt="2023-03-05T15:39:33.443" v="1597" actId="5736"/>
+          <ac:chgData name="Felipe Lopes de Oliveira" userId="7927722fe4027b30" providerId="LiveId" clId="{988CB3FB-85FE-4B18-8889-744054AB9037}" dt="2023-03-05T16:26:04.879" v="2101" actId="5736"/>
           <ac:spMkLst>
             <pc:docMk/>
             <pc:sldMk cId="1480784656" sldId="257"/>
@@ -164,7 +164,7 @@
           </ac:spMkLst>
         </pc:spChg>
         <pc:spChg chg="mod">
-          <ac:chgData name="Felipe Lopes de Oliveira" userId="7927722fe4027b30" providerId="LiveId" clId="{988CB3FB-85FE-4B18-8889-744054AB9037}" dt="2023-03-05T15:39:33.443" v="1597" actId="5736"/>
+          <ac:chgData name="Felipe Lopes de Oliveira" userId="7927722fe4027b30" providerId="LiveId" clId="{988CB3FB-85FE-4B18-8889-744054AB9037}" dt="2023-03-05T16:26:04.879" v="2101" actId="5736"/>
           <ac:spMkLst>
             <pc:docMk/>
             <pc:sldMk cId="1480784656" sldId="257"/>
@@ -172,7 +172,7 @@
           </ac:spMkLst>
         </pc:spChg>
         <pc:spChg chg="mod">
-          <ac:chgData name="Felipe Lopes de Oliveira" userId="7927722fe4027b30" providerId="LiveId" clId="{988CB3FB-85FE-4B18-8889-744054AB9037}" dt="2023-03-05T15:39:33.443" v="1597" actId="5736"/>
+          <ac:chgData name="Felipe Lopes de Oliveira" userId="7927722fe4027b30" providerId="LiveId" clId="{988CB3FB-85FE-4B18-8889-744054AB9037}" dt="2023-03-05T16:26:04.879" v="2101" actId="5736"/>
           <ac:spMkLst>
             <pc:docMk/>
             <pc:sldMk cId="1480784656" sldId="257"/>
@@ -180,7 +180,7 @@
           </ac:spMkLst>
         </pc:spChg>
         <pc:spChg chg="mod">
-          <ac:chgData name="Felipe Lopes de Oliveira" userId="7927722fe4027b30" providerId="LiveId" clId="{988CB3FB-85FE-4B18-8889-744054AB9037}" dt="2023-03-05T15:39:33.443" v="1597" actId="5736"/>
+          <ac:chgData name="Felipe Lopes de Oliveira" userId="7927722fe4027b30" providerId="LiveId" clId="{988CB3FB-85FE-4B18-8889-744054AB9037}" dt="2023-03-05T16:26:04.879" v="2101" actId="5736"/>
           <ac:spMkLst>
             <pc:docMk/>
             <pc:sldMk cId="1480784656" sldId="257"/>
@@ -188,7 +188,7 @@
           </ac:spMkLst>
         </pc:spChg>
         <pc:spChg chg="mod">
-          <ac:chgData name="Felipe Lopes de Oliveira" userId="7927722fe4027b30" providerId="LiveId" clId="{988CB3FB-85FE-4B18-8889-744054AB9037}" dt="2023-03-05T15:39:33.443" v="1597" actId="5736"/>
+          <ac:chgData name="Felipe Lopes de Oliveira" userId="7927722fe4027b30" providerId="LiveId" clId="{988CB3FB-85FE-4B18-8889-744054AB9037}" dt="2023-03-05T16:26:04.879" v="2101" actId="5736"/>
           <ac:spMkLst>
             <pc:docMk/>
             <pc:sldMk cId="1480784656" sldId="257"/>
@@ -196,7 +196,7 @@
           </ac:spMkLst>
         </pc:spChg>
         <pc:spChg chg="mod">
-          <ac:chgData name="Felipe Lopes de Oliveira" userId="7927722fe4027b30" providerId="LiveId" clId="{988CB3FB-85FE-4B18-8889-744054AB9037}" dt="2023-03-05T15:39:33.443" v="1597" actId="5736"/>
+          <ac:chgData name="Felipe Lopes de Oliveira" userId="7927722fe4027b30" providerId="LiveId" clId="{988CB3FB-85FE-4B18-8889-744054AB9037}" dt="2023-03-05T16:26:04.879" v="2101" actId="5736"/>
           <ac:spMkLst>
             <pc:docMk/>
             <pc:sldMk cId="1480784656" sldId="257"/>
@@ -204,7 +204,7 @@
           </ac:spMkLst>
         </pc:spChg>
         <pc:spChg chg="mod">
-          <ac:chgData name="Felipe Lopes de Oliveira" userId="7927722fe4027b30" providerId="LiveId" clId="{988CB3FB-85FE-4B18-8889-744054AB9037}" dt="2023-03-05T15:39:33.443" v="1597" actId="5736"/>
+          <ac:chgData name="Felipe Lopes de Oliveira" userId="7927722fe4027b30" providerId="LiveId" clId="{988CB3FB-85FE-4B18-8889-744054AB9037}" dt="2023-03-05T16:26:04.879" v="2101" actId="5736"/>
           <ac:spMkLst>
             <pc:docMk/>
             <pc:sldMk cId="1480784656" sldId="257"/>
@@ -212,7 +212,7 @@
           </ac:spMkLst>
         </pc:spChg>
         <pc:spChg chg="mod">
-          <ac:chgData name="Felipe Lopes de Oliveira" userId="7927722fe4027b30" providerId="LiveId" clId="{988CB3FB-85FE-4B18-8889-744054AB9037}" dt="2023-03-05T15:39:33.443" v="1597" actId="5736"/>
+          <ac:chgData name="Felipe Lopes de Oliveira" userId="7927722fe4027b30" providerId="LiveId" clId="{988CB3FB-85FE-4B18-8889-744054AB9037}" dt="2023-03-05T16:26:04.879" v="2101" actId="5736"/>
           <ac:spMkLst>
             <pc:docMk/>
             <pc:sldMk cId="1480784656" sldId="257"/>
@@ -220,7 +220,7 @@
           </ac:spMkLst>
         </pc:spChg>
         <pc:spChg chg="mod">
-          <ac:chgData name="Felipe Lopes de Oliveira" userId="7927722fe4027b30" providerId="LiveId" clId="{988CB3FB-85FE-4B18-8889-744054AB9037}" dt="2023-03-05T15:39:33.443" v="1597" actId="5736"/>
+          <ac:chgData name="Felipe Lopes de Oliveira" userId="7927722fe4027b30" providerId="LiveId" clId="{988CB3FB-85FE-4B18-8889-744054AB9037}" dt="2023-03-05T16:26:04.879" v="2101" actId="5736"/>
           <ac:spMkLst>
             <pc:docMk/>
             <pc:sldMk cId="1480784656" sldId="257"/>
@@ -228,7 +228,7 @@
           </ac:spMkLst>
         </pc:spChg>
         <pc:spChg chg="mod">
-          <ac:chgData name="Felipe Lopes de Oliveira" userId="7927722fe4027b30" providerId="LiveId" clId="{988CB3FB-85FE-4B18-8889-744054AB9037}" dt="2023-03-05T15:39:33.443" v="1597" actId="5736"/>
+          <ac:chgData name="Felipe Lopes de Oliveira" userId="7927722fe4027b30" providerId="LiveId" clId="{988CB3FB-85FE-4B18-8889-744054AB9037}" dt="2023-03-05T16:26:04.879" v="2101" actId="5736"/>
           <ac:spMkLst>
             <pc:docMk/>
             <pc:sldMk cId="1480784656" sldId="257"/>
@@ -236,7 +236,7 @@
           </ac:spMkLst>
         </pc:spChg>
         <pc:spChg chg="mod">
-          <ac:chgData name="Felipe Lopes de Oliveira" userId="7927722fe4027b30" providerId="LiveId" clId="{988CB3FB-85FE-4B18-8889-744054AB9037}" dt="2023-03-05T15:39:33.443" v="1597" actId="5736"/>
+          <ac:chgData name="Felipe Lopes de Oliveira" userId="7927722fe4027b30" providerId="LiveId" clId="{988CB3FB-85FE-4B18-8889-744054AB9037}" dt="2023-03-05T16:26:04.879" v="2101" actId="5736"/>
           <ac:spMkLst>
             <pc:docMk/>
             <pc:sldMk cId="1480784656" sldId="257"/>
@@ -244,7 +244,7 @@
           </ac:spMkLst>
         </pc:spChg>
         <pc:spChg chg="mod">
-          <ac:chgData name="Felipe Lopes de Oliveira" userId="7927722fe4027b30" providerId="LiveId" clId="{988CB3FB-85FE-4B18-8889-744054AB9037}" dt="2023-03-05T15:39:33.443" v="1597" actId="5736"/>
+          <ac:chgData name="Felipe Lopes de Oliveira" userId="7927722fe4027b30" providerId="LiveId" clId="{988CB3FB-85FE-4B18-8889-744054AB9037}" dt="2023-03-05T16:26:04.879" v="2101" actId="5736"/>
           <ac:spMkLst>
             <pc:docMk/>
             <pc:sldMk cId="1480784656" sldId="257"/>
@@ -252,7 +252,7 @@
           </ac:spMkLst>
         </pc:spChg>
         <pc:spChg chg="mod">
-          <ac:chgData name="Felipe Lopes de Oliveira" userId="7927722fe4027b30" providerId="LiveId" clId="{988CB3FB-85FE-4B18-8889-744054AB9037}" dt="2023-03-05T15:39:33.443" v="1597" actId="5736"/>
+          <ac:chgData name="Felipe Lopes de Oliveira" userId="7927722fe4027b30" providerId="LiveId" clId="{988CB3FB-85FE-4B18-8889-744054AB9037}" dt="2023-03-05T16:26:04.879" v="2101" actId="5736"/>
           <ac:spMkLst>
             <pc:docMk/>
             <pc:sldMk cId="1480784656" sldId="257"/>
@@ -260,7 +260,7 @@
           </ac:spMkLst>
         </pc:spChg>
         <pc:spChg chg="mod">
-          <ac:chgData name="Felipe Lopes de Oliveira" userId="7927722fe4027b30" providerId="LiveId" clId="{988CB3FB-85FE-4B18-8889-744054AB9037}" dt="2023-03-05T15:39:33.443" v="1597" actId="5736"/>
+          <ac:chgData name="Felipe Lopes de Oliveira" userId="7927722fe4027b30" providerId="LiveId" clId="{988CB3FB-85FE-4B18-8889-744054AB9037}" dt="2023-03-05T16:26:04.879" v="2101" actId="5736"/>
           <ac:spMkLst>
             <pc:docMk/>
             <pc:sldMk cId="1480784656" sldId="257"/>
@@ -268,7 +268,7 @@
           </ac:spMkLst>
         </pc:spChg>
         <pc:spChg chg="mod">
-          <ac:chgData name="Felipe Lopes de Oliveira" userId="7927722fe4027b30" providerId="LiveId" clId="{988CB3FB-85FE-4B18-8889-744054AB9037}" dt="2023-03-05T15:39:33.443" v="1597" actId="5736"/>
+          <ac:chgData name="Felipe Lopes de Oliveira" userId="7927722fe4027b30" providerId="LiveId" clId="{988CB3FB-85FE-4B18-8889-744054AB9037}" dt="2023-03-05T16:26:04.879" v="2101" actId="5736"/>
           <ac:spMkLst>
             <pc:docMk/>
             <pc:sldMk cId="1480784656" sldId="257"/>
@@ -276,7 +276,7 @@
           </ac:spMkLst>
         </pc:spChg>
         <pc:spChg chg="mod">
-          <ac:chgData name="Felipe Lopes de Oliveira" userId="7927722fe4027b30" providerId="LiveId" clId="{988CB3FB-85FE-4B18-8889-744054AB9037}" dt="2023-03-05T15:39:33.443" v="1597" actId="5736"/>
+          <ac:chgData name="Felipe Lopes de Oliveira" userId="7927722fe4027b30" providerId="LiveId" clId="{988CB3FB-85FE-4B18-8889-744054AB9037}" dt="2023-03-05T16:26:04.879" v="2101" actId="5736"/>
           <ac:spMkLst>
             <pc:docMk/>
             <pc:sldMk cId="1480784656" sldId="257"/>
@@ -284,7 +284,7 @@
           </ac:spMkLst>
         </pc:spChg>
         <pc:spChg chg="mod">
-          <ac:chgData name="Felipe Lopes de Oliveira" userId="7927722fe4027b30" providerId="LiveId" clId="{988CB3FB-85FE-4B18-8889-744054AB9037}" dt="2023-03-05T15:39:33.443" v="1597" actId="5736"/>
+          <ac:chgData name="Felipe Lopes de Oliveira" userId="7927722fe4027b30" providerId="LiveId" clId="{988CB3FB-85FE-4B18-8889-744054AB9037}" dt="2023-03-05T16:26:04.879" v="2101" actId="5736"/>
           <ac:spMkLst>
             <pc:docMk/>
             <pc:sldMk cId="1480784656" sldId="257"/>
@@ -292,7 +292,7 @@
           </ac:spMkLst>
         </pc:spChg>
         <pc:spChg chg="mod">
-          <ac:chgData name="Felipe Lopes de Oliveira" userId="7927722fe4027b30" providerId="LiveId" clId="{988CB3FB-85FE-4B18-8889-744054AB9037}" dt="2023-03-05T15:39:33.443" v="1597" actId="5736"/>
+          <ac:chgData name="Felipe Lopes de Oliveira" userId="7927722fe4027b30" providerId="LiveId" clId="{988CB3FB-85FE-4B18-8889-744054AB9037}" dt="2023-03-05T16:26:04.879" v="2101" actId="5736"/>
           <ac:spMkLst>
             <pc:docMk/>
             <pc:sldMk cId="1480784656" sldId="257"/>
@@ -300,7 +300,7 @@
           </ac:spMkLst>
         </pc:spChg>
         <pc:spChg chg="mod">
-          <ac:chgData name="Felipe Lopes de Oliveira" userId="7927722fe4027b30" providerId="LiveId" clId="{988CB3FB-85FE-4B18-8889-744054AB9037}" dt="2023-03-05T15:39:33.443" v="1597" actId="5736"/>
+          <ac:chgData name="Felipe Lopes de Oliveira" userId="7927722fe4027b30" providerId="LiveId" clId="{988CB3FB-85FE-4B18-8889-744054AB9037}" dt="2023-03-05T16:26:04.879" v="2101" actId="5736"/>
           <ac:spMkLst>
             <pc:docMk/>
             <pc:sldMk cId="1480784656" sldId="257"/>
@@ -308,7 +308,7 @@
           </ac:spMkLst>
         </pc:spChg>
         <pc:spChg chg="mod">
-          <ac:chgData name="Felipe Lopes de Oliveira" userId="7927722fe4027b30" providerId="LiveId" clId="{988CB3FB-85FE-4B18-8889-744054AB9037}" dt="2023-03-05T15:39:33.443" v="1597" actId="5736"/>
+          <ac:chgData name="Felipe Lopes de Oliveira" userId="7927722fe4027b30" providerId="LiveId" clId="{988CB3FB-85FE-4B18-8889-744054AB9037}" dt="2023-03-05T16:26:04.879" v="2101" actId="5736"/>
           <ac:spMkLst>
             <pc:docMk/>
             <pc:sldMk cId="1480784656" sldId="257"/>
@@ -316,7 +316,7 @@
           </ac:spMkLst>
         </pc:spChg>
         <pc:spChg chg="mod">
-          <ac:chgData name="Felipe Lopes de Oliveira" userId="7927722fe4027b30" providerId="LiveId" clId="{988CB3FB-85FE-4B18-8889-744054AB9037}" dt="2023-03-05T15:39:33.443" v="1597" actId="5736"/>
+          <ac:chgData name="Felipe Lopes de Oliveira" userId="7927722fe4027b30" providerId="LiveId" clId="{988CB3FB-85FE-4B18-8889-744054AB9037}" dt="2023-03-05T16:26:04.879" v="2101" actId="5736"/>
           <ac:spMkLst>
             <pc:docMk/>
             <pc:sldMk cId="1480784656" sldId="257"/>
@@ -324,7 +324,7 @@
           </ac:spMkLst>
         </pc:spChg>
         <pc:spChg chg="mod">
-          <ac:chgData name="Felipe Lopes de Oliveira" userId="7927722fe4027b30" providerId="LiveId" clId="{988CB3FB-85FE-4B18-8889-744054AB9037}" dt="2023-03-05T15:39:33.443" v="1597" actId="5736"/>
+          <ac:chgData name="Felipe Lopes de Oliveira" userId="7927722fe4027b30" providerId="LiveId" clId="{988CB3FB-85FE-4B18-8889-744054AB9037}" dt="2023-03-05T16:26:04.879" v="2101" actId="5736"/>
           <ac:spMkLst>
             <pc:docMk/>
             <pc:sldMk cId="1480784656" sldId="257"/>
@@ -332,7 +332,7 @@
           </ac:spMkLst>
         </pc:spChg>
         <pc:spChg chg="mod">
-          <ac:chgData name="Felipe Lopes de Oliveira" userId="7927722fe4027b30" providerId="LiveId" clId="{988CB3FB-85FE-4B18-8889-744054AB9037}" dt="2023-03-05T15:39:33.443" v="1597" actId="5736"/>
+          <ac:chgData name="Felipe Lopes de Oliveira" userId="7927722fe4027b30" providerId="LiveId" clId="{988CB3FB-85FE-4B18-8889-744054AB9037}" dt="2023-03-05T16:26:04.879" v="2101" actId="5736"/>
           <ac:spMkLst>
             <pc:docMk/>
             <pc:sldMk cId="1480784656" sldId="257"/>
@@ -348,7 +348,7 @@
           </ac:spMkLst>
         </pc:spChg>
         <pc:spChg chg="add mod">
-          <ac:chgData name="Felipe Lopes de Oliveira" userId="7927722fe4027b30" providerId="LiveId" clId="{988CB3FB-85FE-4B18-8889-744054AB9037}" dt="2023-03-05T15:39:33.443" v="1597" actId="5736"/>
+          <ac:chgData name="Felipe Lopes de Oliveira" userId="7927722fe4027b30" providerId="LiveId" clId="{988CB3FB-85FE-4B18-8889-744054AB9037}" dt="2023-03-05T16:26:04.879" v="2101" actId="5736"/>
           <ac:spMkLst>
             <pc:docMk/>
             <pc:sldMk cId="1480784656" sldId="257"/>
@@ -363,6 +363,22 @@
             <ac:spMk id="31" creationId="{38F127F7-3D0A-50AE-E278-1FD905142F83}"/>
           </ac:spMkLst>
         </pc:spChg>
+        <pc:spChg chg="add mod">
+          <ac:chgData name="Felipe Lopes de Oliveira" userId="7927722fe4027b30" providerId="LiveId" clId="{988CB3FB-85FE-4B18-8889-744054AB9037}" dt="2023-03-05T16:26:04.879" v="2101" actId="5736"/>
+          <ac:spMkLst>
+            <pc:docMk/>
+            <pc:sldMk cId="1480784656" sldId="257"/>
+            <ac:spMk id="31" creationId="{B1D8E011-A7F8-F513-1FBC-A16A061C4B8A}"/>
+          </ac:spMkLst>
+        </pc:spChg>
+        <pc:spChg chg="add mod">
+          <ac:chgData name="Felipe Lopes de Oliveira" userId="7927722fe4027b30" providerId="LiveId" clId="{988CB3FB-85FE-4B18-8889-744054AB9037}" dt="2023-03-05T16:26:04.879" v="2101" actId="5736"/>
+          <ac:spMkLst>
+            <pc:docMk/>
+            <pc:sldMk cId="1480784656" sldId="257"/>
+            <ac:spMk id="33" creationId="{673A35C1-7BFF-FF6D-DC1F-64E5D16AF7E2}"/>
+          </ac:spMkLst>
+        </pc:spChg>
         <pc:spChg chg="add del mod">
           <ac:chgData name="Felipe Lopes de Oliveira" userId="7927722fe4027b30" providerId="LiveId" clId="{988CB3FB-85FE-4B18-8889-744054AB9037}" dt="2023-03-05T15:20:44.498" v="1585" actId="478"/>
           <ac:spMkLst>
@@ -372,11 +388,19 @@
           </ac:spMkLst>
         </pc:spChg>
         <pc:spChg chg="add mod">
-          <ac:chgData name="Felipe Lopes de Oliveira" userId="7927722fe4027b30" providerId="LiveId" clId="{988CB3FB-85FE-4B18-8889-744054AB9037}" dt="2023-03-05T15:39:33.443" v="1597" actId="5736"/>
+          <ac:chgData name="Felipe Lopes de Oliveira" userId="7927722fe4027b30" providerId="LiveId" clId="{988CB3FB-85FE-4B18-8889-744054AB9037}" dt="2023-03-05T16:26:04.879" v="2101" actId="5736"/>
           <ac:spMkLst>
             <pc:docMk/>
             <pc:sldMk cId="1480784656" sldId="257"/>
             <ac:spMk id="36" creationId="{5ACE21A8-62E3-4DFA-B49F-C18BB0857009}"/>
+          </ac:spMkLst>
+        </pc:spChg>
+        <pc:spChg chg="add mod">
+          <ac:chgData name="Felipe Lopes de Oliveira" userId="7927722fe4027b30" providerId="LiveId" clId="{988CB3FB-85FE-4B18-8889-744054AB9037}" dt="2023-03-05T16:26:04.879" v="2101" actId="5736"/>
+          <ac:spMkLst>
+            <pc:docMk/>
+            <pc:sldMk cId="1480784656" sldId="257"/>
+            <ac:spMk id="37" creationId="{479C2F0E-317B-FA69-B7D3-2EEC26D3943F}"/>
           </ac:spMkLst>
         </pc:spChg>
         <pc:spChg chg="add del mod">
@@ -388,7 +412,7 @@
           </ac:spMkLst>
         </pc:spChg>
         <pc:spChg chg="mod">
-          <ac:chgData name="Felipe Lopes de Oliveira" userId="7927722fe4027b30" providerId="LiveId" clId="{988CB3FB-85FE-4B18-8889-744054AB9037}" dt="2023-03-05T15:39:33.443" v="1597" actId="5736"/>
+          <ac:chgData name="Felipe Lopes de Oliveira" userId="7927722fe4027b30" providerId="LiveId" clId="{988CB3FB-85FE-4B18-8889-744054AB9037}" dt="2023-03-05T16:26:04.879" v="2101" actId="5736"/>
           <ac:spMkLst>
             <pc:docMk/>
             <pc:sldMk cId="1480784656" sldId="257"/>
@@ -396,7 +420,7 @@
           </ac:spMkLst>
         </pc:spChg>
         <pc:spChg chg="mod">
-          <ac:chgData name="Felipe Lopes de Oliveira" userId="7927722fe4027b30" providerId="LiveId" clId="{988CB3FB-85FE-4B18-8889-744054AB9037}" dt="2023-03-05T15:39:33.443" v="1597" actId="5736"/>
+          <ac:chgData name="Felipe Lopes de Oliveira" userId="7927722fe4027b30" providerId="LiveId" clId="{988CB3FB-85FE-4B18-8889-744054AB9037}" dt="2023-03-05T16:26:04.879" v="2101" actId="5736"/>
           <ac:spMkLst>
             <pc:docMk/>
             <pc:sldMk cId="1480784656" sldId="257"/>
@@ -404,7 +428,7 @@
           </ac:spMkLst>
         </pc:spChg>
         <pc:spChg chg="mod">
-          <ac:chgData name="Felipe Lopes de Oliveira" userId="7927722fe4027b30" providerId="LiveId" clId="{988CB3FB-85FE-4B18-8889-744054AB9037}" dt="2023-03-05T15:39:33.443" v="1597" actId="5736"/>
+          <ac:chgData name="Felipe Lopes de Oliveira" userId="7927722fe4027b30" providerId="LiveId" clId="{988CB3FB-85FE-4B18-8889-744054AB9037}" dt="2023-03-05T16:26:04.879" v="2101" actId="5736"/>
           <ac:spMkLst>
             <pc:docMk/>
             <pc:sldMk cId="1480784656" sldId="257"/>
@@ -412,7 +436,7 @@
           </ac:spMkLst>
         </pc:spChg>
         <pc:spChg chg="mod">
-          <ac:chgData name="Felipe Lopes de Oliveira" userId="7927722fe4027b30" providerId="LiveId" clId="{988CB3FB-85FE-4B18-8889-744054AB9037}" dt="2023-03-05T15:39:33.443" v="1597" actId="5736"/>
+          <ac:chgData name="Felipe Lopes de Oliveira" userId="7927722fe4027b30" providerId="LiveId" clId="{988CB3FB-85FE-4B18-8889-744054AB9037}" dt="2023-03-05T16:26:04.879" v="2101" actId="5736"/>
           <ac:spMkLst>
             <pc:docMk/>
             <pc:sldMk cId="1480784656" sldId="257"/>
@@ -420,7 +444,7 @@
           </ac:spMkLst>
         </pc:spChg>
         <pc:spChg chg="mod">
-          <ac:chgData name="Felipe Lopes de Oliveira" userId="7927722fe4027b30" providerId="LiveId" clId="{988CB3FB-85FE-4B18-8889-744054AB9037}" dt="2023-03-05T15:39:33.443" v="1597" actId="5736"/>
+          <ac:chgData name="Felipe Lopes de Oliveira" userId="7927722fe4027b30" providerId="LiveId" clId="{988CB3FB-85FE-4B18-8889-744054AB9037}" dt="2023-03-05T16:26:04.879" v="2101" actId="5736"/>
           <ac:spMkLst>
             <pc:docMk/>
             <pc:sldMk cId="1480784656" sldId="257"/>
@@ -428,7 +452,7 @@
           </ac:spMkLst>
         </pc:spChg>
         <pc:spChg chg="mod">
-          <ac:chgData name="Felipe Lopes de Oliveira" userId="7927722fe4027b30" providerId="LiveId" clId="{988CB3FB-85FE-4B18-8889-744054AB9037}" dt="2023-03-05T15:39:33.443" v="1597" actId="5736"/>
+          <ac:chgData name="Felipe Lopes de Oliveira" userId="7927722fe4027b30" providerId="LiveId" clId="{988CB3FB-85FE-4B18-8889-744054AB9037}" dt="2023-03-05T16:26:04.879" v="2101" actId="5736"/>
           <ac:spMkLst>
             <pc:docMk/>
             <pc:sldMk cId="1480784656" sldId="257"/>
@@ -436,7 +460,7 @@
           </ac:spMkLst>
         </pc:spChg>
         <pc:graphicFrameChg chg="mod">
-          <ac:chgData name="Felipe Lopes de Oliveira" userId="7927722fe4027b30" providerId="LiveId" clId="{988CB3FB-85FE-4B18-8889-744054AB9037}" dt="2023-03-05T15:39:33.443" v="1597" actId="5736"/>
+          <ac:chgData name="Felipe Lopes de Oliveira" userId="7927722fe4027b30" providerId="LiveId" clId="{988CB3FB-85FE-4B18-8889-744054AB9037}" dt="2023-03-05T16:26:04.879" v="2101" actId="5736"/>
           <ac:graphicFrameMkLst>
             <pc:docMk/>
             <pc:sldMk cId="1480784656" sldId="257"/>
@@ -444,7 +468,7 @@
           </ac:graphicFrameMkLst>
         </pc:graphicFrameChg>
         <pc:graphicFrameChg chg="mod">
-          <ac:chgData name="Felipe Lopes de Oliveira" userId="7927722fe4027b30" providerId="LiveId" clId="{988CB3FB-85FE-4B18-8889-744054AB9037}" dt="2023-03-05T15:39:33.443" v="1597" actId="5736"/>
+          <ac:chgData name="Felipe Lopes de Oliveira" userId="7927722fe4027b30" providerId="LiveId" clId="{988CB3FB-85FE-4B18-8889-744054AB9037}" dt="2023-03-05T16:26:04.879" v="2101" actId="5736"/>
           <ac:graphicFrameMkLst>
             <pc:docMk/>
             <pc:sldMk cId="1480784656" sldId="257"/>
@@ -452,11 +476,27 @@
           </ac:graphicFrameMkLst>
         </pc:graphicFrameChg>
         <pc:graphicFrameChg chg="add mod">
-          <ac:chgData name="Felipe Lopes de Oliveira" userId="7927722fe4027b30" providerId="LiveId" clId="{988CB3FB-85FE-4B18-8889-744054AB9037}" dt="2023-03-05T15:39:33.443" v="1597" actId="5736"/>
+          <ac:chgData name="Felipe Lopes de Oliveira" userId="7927722fe4027b30" providerId="LiveId" clId="{988CB3FB-85FE-4B18-8889-744054AB9037}" dt="2023-03-05T16:26:04.879" v="2101" actId="5736"/>
+          <ac:graphicFrameMkLst>
+            <pc:docMk/>
+            <pc:sldMk cId="1480784656" sldId="257"/>
+            <ac:graphicFrameMk id="28" creationId="{365BB12C-762A-220D-6287-00D62C90D13C}"/>
+          </ac:graphicFrameMkLst>
+        </pc:graphicFrameChg>
+        <pc:graphicFrameChg chg="add mod">
+          <ac:chgData name="Felipe Lopes de Oliveira" userId="7927722fe4027b30" providerId="LiveId" clId="{988CB3FB-85FE-4B18-8889-744054AB9037}" dt="2023-03-05T16:26:04.879" v="2101" actId="5736"/>
           <ac:graphicFrameMkLst>
             <pc:docMk/>
             <pc:sldMk cId="1480784656" sldId="257"/>
             <ac:graphicFrameMk id="30" creationId="{39C4941F-48FF-076E-7407-1AD92AB3B841}"/>
+          </ac:graphicFrameMkLst>
+        </pc:graphicFrameChg>
+        <pc:graphicFrameChg chg="add mod">
+          <ac:chgData name="Felipe Lopes de Oliveira" userId="7927722fe4027b30" providerId="LiveId" clId="{988CB3FB-85FE-4B18-8889-744054AB9037}" dt="2023-03-05T16:26:04.879" v="2101" actId="5736"/>
+          <ac:graphicFrameMkLst>
+            <pc:docMk/>
+            <pc:sldMk cId="1480784656" sldId="257"/>
+            <ac:graphicFrameMk id="32" creationId="{5153DBB1-A1C7-18BA-CFBB-811747AE63A3}"/>
           </ac:graphicFrameMkLst>
         </pc:graphicFrameChg>
         <pc:graphicFrameChg chg="add del mod">
@@ -476,7 +516,15 @@
           </ac:graphicFrameMkLst>
         </pc:graphicFrameChg>
         <pc:graphicFrameChg chg="add mod">
-          <ac:chgData name="Felipe Lopes de Oliveira" userId="7927722fe4027b30" providerId="LiveId" clId="{988CB3FB-85FE-4B18-8889-744054AB9037}" dt="2023-03-05T15:39:33.443" v="1597" actId="5736"/>
+          <ac:chgData name="Felipe Lopes de Oliveira" userId="7927722fe4027b30" providerId="LiveId" clId="{988CB3FB-85FE-4B18-8889-744054AB9037}" dt="2023-03-05T16:26:04.879" v="2101" actId="5736"/>
+          <ac:graphicFrameMkLst>
+            <pc:docMk/>
+            <pc:sldMk cId="1480784656" sldId="257"/>
+            <ac:graphicFrameMk id="34" creationId="{711A7590-58C3-0BE3-C8AB-4FD7073B5C46}"/>
+          </ac:graphicFrameMkLst>
+        </pc:graphicFrameChg>
+        <pc:graphicFrameChg chg="add mod">
+          <ac:chgData name="Felipe Lopes de Oliveira" userId="7927722fe4027b30" providerId="LiveId" clId="{988CB3FB-85FE-4B18-8889-744054AB9037}" dt="2023-03-05T16:26:04.879" v="2101" actId="5736"/>
           <ac:graphicFrameMkLst>
             <pc:docMk/>
             <pc:sldMk cId="1480784656" sldId="257"/>
@@ -492,7 +540,7 @@
           </ac:graphicFrameMkLst>
         </pc:graphicFrameChg>
         <pc:graphicFrameChg chg="mod">
-          <ac:chgData name="Felipe Lopes de Oliveira" userId="7927722fe4027b30" providerId="LiveId" clId="{988CB3FB-85FE-4B18-8889-744054AB9037}" dt="2023-03-05T15:39:33.443" v="1597" actId="5736"/>
+          <ac:chgData name="Felipe Lopes de Oliveira" userId="7927722fe4027b30" providerId="LiveId" clId="{988CB3FB-85FE-4B18-8889-744054AB9037}" dt="2023-03-05T16:26:04.879" v="2101" actId="5736"/>
           <ac:graphicFrameMkLst>
             <pc:docMk/>
             <pc:sldMk cId="1480784656" sldId="257"/>
@@ -500,7 +548,7 @@
           </ac:graphicFrameMkLst>
         </pc:graphicFrameChg>
         <pc:graphicFrameChg chg="mod">
-          <ac:chgData name="Felipe Lopes de Oliveira" userId="7927722fe4027b30" providerId="LiveId" clId="{988CB3FB-85FE-4B18-8889-744054AB9037}" dt="2023-03-05T15:39:33.443" v="1597" actId="5736"/>
+          <ac:chgData name="Felipe Lopes de Oliveira" userId="7927722fe4027b30" providerId="LiveId" clId="{988CB3FB-85FE-4B18-8889-744054AB9037}" dt="2023-03-05T16:26:04.879" v="2101" actId="5736"/>
           <ac:graphicFrameMkLst>
             <pc:docMk/>
             <pc:sldMk cId="1480784656" sldId="257"/>
@@ -508,7 +556,7 @@
           </ac:graphicFrameMkLst>
         </pc:graphicFrameChg>
         <pc:graphicFrameChg chg="mod">
-          <ac:chgData name="Felipe Lopes de Oliveira" userId="7927722fe4027b30" providerId="LiveId" clId="{988CB3FB-85FE-4B18-8889-744054AB9037}" dt="2023-03-05T15:39:33.443" v="1597" actId="5736"/>
+          <ac:chgData name="Felipe Lopes de Oliveira" userId="7927722fe4027b30" providerId="LiveId" clId="{988CB3FB-85FE-4B18-8889-744054AB9037}" dt="2023-03-05T16:26:04.879" v="2101" actId="5736"/>
           <ac:graphicFrameMkLst>
             <pc:docMk/>
             <pc:sldMk cId="1480784656" sldId="257"/>
@@ -516,7 +564,7 @@
           </ac:graphicFrameMkLst>
         </pc:graphicFrameChg>
         <pc:graphicFrameChg chg="mod">
-          <ac:chgData name="Felipe Lopes de Oliveira" userId="7927722fe4027b30" providerId="LiveId" clId="{988CB3FB-85FE-4B18-8889-744054AB9037}" dt="2023-03-05T15:39:33.443" v="1597" actId="5736"/>
+          <ac:chgData name="Felipe Lopes de Oliveira" userId="7927722fe4027b30" providerId="LiveId" clId="{988CB3FB-85FE-4B18-8889-744054AB9037}" dt="2023-03-05T16:26:04.879" v="2101" actId="5736"/>
           <ac:graphicFrameMkLst>
             <pc:docMk/>
             <pc:sldMk cId="1480784656" sldId="257"/>
@@ -524,7 +572,7 @@
           </ac:graphicFrameMkLst>
         </pc:graphicFrameChg>
         <pc:graphicFrameChg chg="mod">
-          <ac:chgData name="Felipe Lopes de Oliveira" userId="7927722fe4027b30" providerId="LiveId" clId="{988CB3FB-85FE-4B18-8889-744054AB9037}" dt="2023-03-05T15:39:33.443" v="1597" actId="5736"/>
+          <ac:chgData name="Felipe Lopes de Oliveira" userId="7927722fe4027b30" providerId="LiveId" clId="{988CB3FB-85FE-4B18-8889-744054AB9037}" dt="2023-03-05T16:26:04.879" v="2101" actId="5736"/>
           <ac:graphicFrameMkLst>
             <pc:docMk/>
             <pc:sldMk cId="1480784656" sldId="257"/>
@@ -532,7 +580,7 @@
           </ac:graphicFrameMkLst>
         </pc:graphicFrameChg>
         <pc:graphicFrameChg chg="mod">
-          <ac:chgData name="Felipe Lopes de Oliveira" userId="7927722fe4027b30" providerId="LiveId" clId="{988CB3FB-85FE-4B18-8889-744054AB9037}" dt="2023-03-05T15:39:33.443" v="1597" actId="5736"/>
+          <ac:chgData name="Felipe Lopes de Oliveira" userId="7927722fe4027b30" providerId="LiveId" clId="{988CB3FB-85FE-4B18-8889-744054AB9037}" dt="2023-03-05T16:26:04.879" v="2101" actId="5736"/>
           <ac:graphicFrameMkLst>
             <pc:docMk/>
             <pc:sldMk cId="1480784656" sldId="257"/>
@@ -540,7 +588,7 @@
           </ac:graphicFrameMkLst>
         </pc:graphicFrameChg>
         <pc:graphicFrameChg chg="mod">
-          <ac:chgData name="Felipe Lopes de Oliveira" userId="7927722fe4027b30" providerId="LiveId" clId="{988CB3FB-85FE-4B18-8889-744054AB9037}" dt="2023-03-05T15:39:33.443" v="1597" actId="5736"/>
+          <ac:chgData name="Felipe Lopes de Oliveira" userId="7927722fe4027b30" providerId="LiveId" clId="{988CB3FB-85FE-4B18-8889-744054AB9037}" dt="2023-03-05T16:26:04.879" v="2101" actId="5736"/>
           <ac:graphicFrameMkLst>
             <pc:docMk/>
             <pc:sldMk cId="1480784656" sldId="257"/>
@@ -548,7 +596,7 @@
           </ac:graphicFrameMkLst>
         </pc:graphicFrameChg>
         <pc:graphicFrameChg chg="mod">
-          <ac:chgData name="Felipe Lopes de Oliveira" userId="7927722fe4027b30" providerId="LiveId" clId="{988CB3FB-85FE-4B18-8889-744054AB9037}" dt="2023-03-05T15:39:33.443" v="1597" actId="5736"/>
+          <ac:chgData name="Felipe Lopes de Oliveira" userId="7927722fe4027b30" providerId="LiveId" clId="{988CB3FB-85FE-4B18-8889-744054AB9037}" dt="2023-03-05T16:26:04.879" v="2101" actId="5736"/>
           <ac:graphicFrameMkLst>
             <pc:docMk/>
             <pc:sldMk cId="1480784656" sldId="257"/>
@@ -556,7 +604,7 @@
           </ac:graphicFrameMkLst>
         </pc:graphicFrameChg>
         <pc:graphicFrameChg chg="mod">
-          <ac:chgData name="Felipe Lopes de Oliveira" userId="7927722fe4027b30" providerId="LiveId" clId="{988CB3FB-85FE-4B18-8889-744054AB9037}" dt="2023-03-05T15:39:33.443" v="1597" actId="5736"/>
+          <ac:chgData name="Felipe Lopes de Oliveira" userId="7927722fe4027b30" providerId="LiveId" clId="{988CB3FB-85FE-4B18-8889-744054AB9037}" dt="2023-03-05T16:26:04.879" v="2101" actId="5736"/>
           <ac:graphicFrameMkLst>
             <pc:docMk/>
             <pc:sldMk cId="1480784656" sldId="257"/>
@@ -564,7 +612,7 @@
           </ac:graphicFrameMkLst>
         </pc:graphicFrameChg>
         <pc:graphicFrameChg chg="mod">
-          <ac:chgData name="Felipe Lopes de Oliveira" userId="7927722fe4027b30" providerId="LiveId" clId="{988CB3FB-85FE-4B18-8889-744054AB9037}" dt="2023-03-05T15:39:33.443" v="1597" actId="5736"/>
+          <ac:chgData name="Felipe Lopes de Oliveira" userId="7927722fe4027b30" providerId="LiveId" clId="{988CB3FB-85FE-4B18-8889-744054AB9037}" dt="2023-03-05T16:26:04.879" v="2101" actId="5736"/>
           <ac:graphicFrameMkLst>
             <pc:docMk/>
             <pc:sldMk cId="1480784656" sldId="257"/>
@@ -572,7 +620,7 @@
           </ac:graphicFrameMkLst>
         </pc:graphicFrameChg>
         <pc:graphicFrameChg chg="mod">
-          <ac:chgData name="Felipe Lopes de Oliveira" userId="7927722fe4027b30" providerId="LiveId" clId="{988CB3FB-85FE-4B18-8889-744054AB9037}" dt="2023-03-05T15:39:33.443" v="1597" actId="5736"/>
+          <ac:chgData name="Felipe Lopes de Oliveira" userId="7927722fe4027b30" providerId="LiveId" clId="{988CB3FB-85FE-4B18-8889-744054AB9037}" dt="2023-03-05T16:26:04.879" v="2101" actId="5736"/>
           <ac:graphicFrameMkLst>
             <pc:docMk/>
             <pc:sldMk cId="1480784656" sldId="257"/>
@@ -580,7 +628,7 @@
           </ac:graphicFrameMkLst>
         </pc:graphicFrameChg>
         <pc:graphicFrameChg chg="mod">
-          <ac:chgData name="Felipe Lopes de Oliveira" userId="7927722fe4027b30" providerId="LiveId" clId="{988CB3FB-85FE-4B18-8889-744054AB9037}" dt="2023-03-05T15:39:33.443" v="1597" actId="5736"/>
+          <ac:chgData name="Felipe Lopes de Oliveira" userId="7927722fe4027b30" providerId="LiveId" clId="{988CB3FB-85FE-4B18-8889-744054AB9037}" dt="2023-03-05T16:26:04.879" v="2101" actId="5736"/>
           <ac:graphicFrameMkLst>
             <pc:docMk/>
             <pc:sldMk cId="1480784656" sldId="257"/>
@@ -588,7 +636,7 @@
           </ac:graphicFrameMkLst>
         </pc:graphicFrameChg>
         <pc:graphicFrameChg chg="mod">
-          <ac:chgData name="Felipe Lopes de Oliveira" userId="7927722fe4027b30" providerId="LiveId" clId="{988CB3FB-85FE-4B18-8889-744054AB9037}" dt="2023-03-05T15:39:33.443" v="1597" actId="5736"/>
+          <ac:chgData name="Felipe Lopes de Oliveira" userId="7927722fe4027b30" providerId="LiveId" clId="{988CB3FB-85FE-4B18-8889-744054AB9037}" dt="2023-03-05T16:26:04.879" v="2101" actId="5736"/>
           <ac:graphicFrameMkLst>
             <pc:docMk/>
             <pc:sldMk cId="1480784656" sldId="257"/>
@@ -596,7 +644,7 @@
           </ac:graphicFrameMkLst>
         </pc:graphicFrameChg>
         <pc:graphicFrameChg chg="mod">
-          <ac:chgData name="Felipe Lopes de Oliveira" userId="7927722fe4027b30" providerId="LiveId" clId="{988CB3FB-85FE-4B18-8889-744054AB9037}" dt="2023-03-05T15:39:33.443" v="1597" actId="5736"/>
+          <ac:chgData name="Felipe Lopes de Oliveira" userId="7927722fe4027b30" providerId="LiveId" clId="{988CB3FB-85FE-4B18-8889-744054AB9037}" dt="2023-03-05T16:26:04.879" v="2101" actId="5736"/>
           <ac:graphicFrameMkLst>
             <pc:docMk/>
             <pc:sldMk cId="1480784656" sldId="257"/>
@@ -604,7 +652,7 @@
           </ac:graphicFrameMkLst>
         </pc:graphicFrameChg>
         <pc:graphicFrameChg chg="mod">
-          <ac:chgData name="Felipe Lopes de Oliveira" userId="7927722fe4027b30" providerId="LiveId" clId="{988CB3FB-85FE-4B18-8889-744054AB9037}" dt="2023-03-05T15:39:33.443" v="1597" actId="5736"/>
+          <ac:chgData name="Felipe Lopes de Oliveira" userId="7927722fe4027b30" providerId="LiveId" clId="{988CB3FB-85FE-4B18-8889-744054AB9037}" dt="2023-03-05T16:26:04.879" v="2101" actId="5736"/>
           <ac:graphicFrameMkLst>
             <pc:docMk/>
             <pc:sldMk cId="1480784656" sldId="257"/>
@@ -612,7 +660,7 @@
           </ac:graphicFrameMkLst>
         </pc:graphicFrameChg>
         <pc:graphicFrameChg chg="mod">
-          <ac:chgData name="Felipe Lopes de Oliveira" userId="7927722fe4027b30" providerId="LiveId" clId="{988CB3FB-85FE-4B18-8889-744054AB9037}" dt="2023-03-05T15:39:33.443" v="1597" actId="5736"/>
+          <ac:chgData name="Felipe Lopes de Oliveira" userId="7927722fe4027b30" providerId="LiveId" clId="{988CB3FB-85FE-4B18-8889-744054AB9037}" dt="2023-03-05T16:26:04.879" v="2101" actId="5736"/>
           <ac:graphicFrameMkLst>
             <pc:docMk/>
             <pc:sldMk cId="1480784656" sldId="257"/>
@@ -620,7 +668,7 @@
           </ac:graphicFrameMkLst>
         </pc:graphicFrameChg>
         <pc:graphicFrameChg chg="mod">
-          <ac:chgData name="Felipe Lopes de Oliveira" userId="7927722fe4027b30" providerId="LiveId" clId="{988CB3FB-85FE-4B18-8889-744054AB9037}" dt="2023-03-05T15:39:33.443" v="1597" actId="5736"/>
+          <ac:chgData name="Felipe Lopes de Oliveira" userId="7927722fe4027b30" providerId="LiveId" clId="{988CB3FB-85FE-4B18-8889-744054AB9037}" dt="2023-03-05T16:26:04.879" v="2101" actId="5736"/>
           <ac:graphicFrameMkLst>
             <pc:docMk/>
             <pc:sldMk cId="1480784656" sldId="257"/>
@@ -628,7 +676,7 @@
           </ac:graphicFrameMkLst>
         </pc:graphicFrameChg>
         <pc:graphicFrameChg chg="mod">
-          <ac:chgData name="Felipe Lopes de Oliveira" userId="7927722fe4027b30" providerId="LiveId" clId="{988CB3FB-85FE-4B18-8889-744054AB9037}" dt="2023-03-05T15:39:33.443" v="1597" actId="5736"/>
+          <ac:chgData name="Felipe Lopes de Oliveira" userId="7927722fe4027b30" providerId="LiveId" clId="{988CB3FB-85FE-4B18-8889-744054AB9037}" dt="2023-03-05T16:26:04.879" v="2101" actId="5736"/>
           <ac:graphicFrameMkLst>
             <pc:docMk/>
             <pc:sldMk cId="1480784656" sldId="257"/>
@@ -636,7 +684,7 @@
           </ac:graphicFrameMkLst>
         </pc:graphicFrameChg>
         <pc:graphicFrameChg chg="mod">
-          <ac:chgData name="Felipe Lopes de Oliveira" userId="7927722fe4027b30" providerId="LiveId" clId="{988CB3FB-85FE-4B18-8889-744054AB9037}" dt="2023-03-05T15:39:33.443" v="1597" actId="5736"/>
+          <ac:chgData name="Felipe Lopes de Oliveira" userId="7927722fe4027b30" providerId="LiveId" clId="{988CB3FB-85FE-4B18-8889-744054AB9037}" dt="2023-03-05T16:26:04.879" v="2101" actId="5736"/>
           <ac:graphicFrameMkLst>
             <pc:docMk/>
             <pc:sldMk cId="1480784656" sldId="257"/>
@@ -644,7 +692,7 @@
           </ac:graphicFrameMkLst>
         </pc:graphicFrameChg>
         <pc:graphicFrameChg chg="mod">
-          <ac:chgData name="Felipe Lopes de Oliveira" userId="7927722fe4027b30" providerId="LiveId" clId="{988CB3FB-85FE-4B18-8889-744054AB9037}" dt="2023-03-05T15:39:33.443" v="1597" actId="5736"/>
+          <ac:chgData name="Felipe Lopes de Oliveira" userId="7927722fe4027b30" providerId="LiveId" clId="{988CB3FB-85FE-4B18-8889-744054AB9037}" dt="2023-03-05T16:26:04.879" v="2101" actId="5736"/>
           <ac:graphicFrameMkLst>
             <pc:docMk/>
             <pc:sldMk cId="1480784656" sldId="257"/>
@@ -652,7 +700,7 @@
           </ac:graphicFrameMkLst>
         </pc:graphicFrameChg>
         <pc:graphicFrameChg chg="mod">
-          <ac:chgData name="Felipe Lopes de Oliveira" userId="7927722fe4027b30" providerId="LiveId" clId="{988CB3FB-85FE-4B18-8889-744054AB9037}" dt="2023-03-05T15:39:33.443" v="1597" actId="5736"/>
+          <ac:chgData name="Felipe Lopes de Oliveira" userId="7927722fe4027b30" providerId="LiveId" clId="{988CB3FB-85FE-4B18-8889-744054AB9037}" dt="2023-03-05T16:26:04.879" v="2101" actId="5736"/>
           <ac:graphicFrameMkLst>
             <pc:docMk/>
             <pc:sldMk cId="1480784656" sldId="257"/>
@@ -660,7 +708,7 @@
           </ac:graphicFrameMkLst>
         </pc:graphicFrameChg>
         <pc:graphicFrameChg chg="mod">
-          <ac:chgData name="Felipe Lopes de Oliveira" userId="7927722fe4027b30" providerId="LiveId" clId="{988CB3FB-85FE-4B18-8889-744054AB9037}" dt="2023-03-05T15:39:33.443" v="1597" actId="5736"/>
+          <ac:chgData name="Felipe Lopes de Oliveira" userId="7927722fe4027b30" providerId="LiveId" clId="{988CB3FB-85FE-4B18-8889-744054AB9037}" dt="2023-03-05T16:26:04.879" v="2101" actId="5736"/>
           <ac:graphicFrameMkLst>
             <pc:docMk/>
             <pc:sldMk cId="1480784656" sldId="257"/>
@@ -668,7 +716,7 @@
           </ac:graphicFrameMkLst>
         </pc:graphicFrameChg>
         <pc:graphicFrameChg chg="mod">
-          <ac:chgData name="Felipe Lopes de Oliveira" userId="7927722fe4027b30" providerId="LiveId" clId="{988CB3FB-85FE-4B18-8889-744054AB9037}" dt="2023-03-05T15:39:33.443" v="1597" actId="5736"/>
+          <ac:chgData name="Felipe Lopes de Oliveira" userId="7927722fe4027b30" providerId="LiveId" clId="{988CB3FB-85FE-4B18-8889-744054AB9037}" dt="2023-03-05T16:26:04.879" v="2101" actId="5736"/>
           <ac:graphicFrameMkLst>
             <pc:docMk/>
             <pc:sldMk cId="1480784656" sldId="257"/>
@@ -676,7 +724,7 @@
           </ac:graphicFrameMkLst>
         </pc:graphicFrameChg>
         <pc:graphicFrameChg chg="mod">
-          <ac:chgData name="Felipe Lopes de Oliveira" userId="7927722fe4027b30" providerId="LiveId" clId="{988CB3FB-85FE-4B18-8889-744054AB9037}" dt="2023-03-05T15:39:33.443" v="1597" actId="5736"/>
+          <ac:chgData name="Felipe Lopes de Oliveira" userId="7927722fe4027b30" providerId="LiveId" clId="{988CB3FB-85FE-4B18-8889-744054AB9037}" dt="2023-03-05T16:26:04.879" v="2101" actId="5736"/>
           <ac:graphicFrameMkLst>
             <pc:docMk/>
             <pc:sldMk cId="1480784656" sldId="257"/>
@@ -684,7 +732,7 @@
           </ac:graphicFrameMkLst>
         </pc:graphicFrameChg>
         <pc:graphicFrameChg chg="mod">
-          <ac:chgData name="Felipe Lopes de Oliveira" userId="7927722fe4027b30" providerId="LiveId" clId="{988CB3FB-85FE-4B18-8889-744054AB9037}" dt="2023-03-05T15:39:33.443" v="1597" actId="5736"/>
+          <ac:chgData name="Felipe Lopes de Oliveira" userId="7927722fe4027b30" providerId="LiveId" clId="{988CB3FB-85FE-4B18-8889-744054AB9037}" dt="2023-03-05T16:26:04.879" v="2101" actId="5736"/>
           <ac:graphicFrameMkLst>
             <pc:docMk/>
             <pc:sldMk cId="1480784656" sldId="257"/>
@@ -692,7 +740,7 @@
           </ac:graphicFrameMkLst>
         </pc:graphicFrameChg>
         <pc:graphicFrameChg chg="mod">
-          <ac:chgData name="Felipe Lopes de Oliveira" userId="7927722fe4027b30" providerId="LiveId" clId="{988CB3FB-85FE-4B18-8889-744054AB9037}" dt="2023-03-05T15:39:33.443" v="1597" actId="5736"/>
+          <ac:chgData name="Felipe Lopes de Oliveira" userId="7927722fe4027b30" providerId="LiveId" clId="{988CB3FB-85FE-4B18-8889-744054AB9037}" dt="2023-03-05T16:26:04.879" v="2101" actId="5736"/>
           <ac:graphicFrameMkLst>
             <pc:docMk/>
             <pc:sldMk cId="1480784656" sldId="257"/>
@@ -14762,7 +14810,7 @@
           <p:nvPr>
             <p:extLst>
               <p:ext uri="{D42A27DB-BD31-4B8C-83A1-F6EECF244321}">
-                <p14:modId xmlns:p14="http://schemas.microsoft.com/office/powerpoint/2010/main" val="2780011154"/>
+                <p14:modId xmlns:p14="http://schemas.microsoft.com/office/powerpoint/2010/main" val="1606883038"/>
               </p:ext>
             </p:extLst>
           </p:nvPr>
@@ -14831,7 +14879,7 @@
           <p:nvPr>
             <p:extLst>
               <p:ext uri="{D42A27DB-BD31-4B8C-83A1-F6EECF244321}">
-                <p14:modId xmlns:p14="http://schemas.microsoft.com/office/powerpoint/2010/main" val="4128172031"/>
+                <p14:modId xmlns:p14="http://schemas.microsoft.com/office/powerpoint/2010/main" val="4223606662"/>
               </p:ext>
             </p:extLst>
           </p:nvPr>
@@ -14900,7 +14948,7 @@
           <p:nvPr>
             <p:extLst>
               <p:ext uri="{D42A27DB-BD31-4B8C-83A1-F6EECF244321}">
-                <p14:modId xmlns:p14="http://schemas.microsoft.com/office/powerpoint/2010/main" val="1353492895"/>
+                <p14:modId xmlns:p14="http://schemas.microsoft.com/office/powerpoint/2010/main" val="1940290360"/>
               </p:ext>
             </p:extLst>
           </p:nvPr>
@@ -14969,7 +15017,7 @@
           <p:nvPr>
             <p:extLst>
               <p:ext uri="{D42A27DB-BD31-4B8C-83A1-F6EECF244321}">
-                <p14:modId xmlns:p14="http://schemas.microsoft.com/office/powerpoint/2010/main" val="3311433094"/>
+                <p14:modId xmlns:p14="http://schemas.microsoft.com/office/powerpoint/2010/main" val="4097348516"/>
               </p:ext>
             </p:extLst>
           </p:nvPr>
@@ -15038,7 +15086,7 @@
           <p:nvPr>
             <p:extLst>
               <p:ext uri="{D42A27DB-BD31-4B8C-83A1-F6EECF244321}">
-                <p14:modId xmlns:p14="http://schemas.microsoft.com/office/powerpoint/2010/main" val="975363099"/>
+                <p14:modId xmlns:p14="http://schemas.microsoft.com/office/powerpoint/2010/main" val="3589841387"/>
               </p:ext>
             </p:extLst>
           </p:nvPr>
@@ -15107,7 +15155,7 @@
           <p:nvPr>
             <p:extLst>
               <p:ext uri="{D42A27DB-BD31-4B8C-83A1-F6EECF244321}">
-                <p14:modId xmlns:p14="http://schemas.microsoft.com/office/powerpoint/2010/main" val="2159097979"/>
+                <p14:modId xmlns:p14="http://schemas.microsoft.com/office/powerpoint/2010/main" val="2064544720"/>
               </p:ext>
             </p:extLst>
           </p:nvPr>
@@ -15176,7 +15224,7 @@
           <p:nvPr>
             <p:extLst>
               <p:ext uri="{D42A27DB-BD31-4B8C-83A1-F6EECF244321}">
-                <p14:modId xmlns:p14="http://schemas.microsoft.com/office/powerpoint/2010/main" val="1952306663"/>
+                <p14:modId xmlns:p14="http://schemas.microsoft.com/office/powerpoint/2010/main" val="2410079207"/>
               </p:ext>
             </p:extLst>
           </p:nvPr>
@@ -15245,7 +15293,7 @@
           <p:nvPr>
             <p:extLst>
               <p:ext uri="{D42A27DB-BD31-4B8C-83A1-F6EECF244321}">
-                <p14:modId xmlns:p14="http://schemas.microsoft.com/office/powerpoint/2010/main" val="2411554531"/>
+                <p14:modId xmlns:p14="http://schemas.microsoft.com/office/powerpoint/2010/main" val="2727107203"/>
               </p:ext>
             </p:extLst>
           </p:nvPr>
@@ -15314,7 +15362,7 @@
           <p:nvPr>
             <p:extLst>
               <p:ext uri="{D42A27DB-BD31-4B8C-83A1-F6EECF244321}">
-                <p14:modId xmlns:p14="http://schemas.microsoft.com/office/powerpoint/2010/main" val="205462678"/>
+                <p14:modId xmlns:p14="http://schemas.microsoft.com/office/powerpoint/2010/main" val="1780246431"/>
               </p:ext>
             </p:extLst>
           </p:nvPr>
@@ -15383,7 +15431,7 @@
           <p:nvPr>
             <p:extLst>
               <p:ext uri="{D42A27DB-BD31-4B8C-83A1-F6EECF244321}">
-                <p14:modId xmlns:p14="http://schemas.microsoft.com/office/powerpoint/2010/main" val="3306555153"/>
+                <p14:modId xmlns:p14="http://schemas.microsoft.com/office/powerpoint/2010/main" val="228976629"/>
               </p:ext>
             </p:extLst>
           </p:nvPr>
@@ -15452,7 +15500,7 @@
           <p:nvPr>
             <p:extLst>
               <p:ext uri="{D42A27DB-BD31-4B8C-83A1-F6EECF244321}">
-                <p14:modId xmlns:p14="http://schemas.microsoft.com/office/powerpoint/2010/main" val="2645720185"/>
+                <p14:modId xmlns:p14="http://schemas.microsoft.com/office/powerpoint/2010/main" val="1983606596"/>
               </p:ext>
             </p:extLst>
           </p:nvPr>
@@ -15643,7 +15691,7 @@
           <p:nvPr>
             <p:extLst>
               <p:ext uri="{D42A27DB-BD31-4B8C-83A1-F6EECF244321}">
-                <p14:modId xmlns:p14="http://schemas.microsoft.com/office/powerpoint/2010/main" val="3336729559"/>
+                <p14:modId xmlns:p14="http://schemas.microsoft.com/office/powerpoint/2010/main" val="2288850832"/>
               </p:ext>
             </p:extLst>
           </p:nvPr>
@@ -15712,7 +15760,7 @@
           <p:nvPr>
             <p:extLst>
               <p:ext uri="{D42A27DB-BD31-4B8C-83A1-F6EECF244321}">
-                <p14:modId xmlns:p14="http://schemas.microsoft.com/office/powerpoint/2010/main" val="3805378128"/>
+                <p14:modId xmlns:p14="http://schemas.microsoft.com/office/powerpoint/2010/main" val="2431850386"/>
               </p:ext>
             </p:extLst>
           </p:nvPr>
@@ -15781,7 +15829,7 @@
           <p:nvPr>
             <p:extLst>
               <p:ext uri="{D42A27DB-BD31-4B8C-83A1-F6EECF244321}">
-                <p14:modId xmlns:p14="http://schemas.microsoft.com/office/powerpoint/2010/main" val="877189896"/>
+                <p14:modId xmlns:p14="http://schemas.microsoft.com/office/powerpoint/2010/main" val="1132015582"/>
               </p:ext>
             </p:extLst>
           </p:nvPr>
@@ -15850,7 +15898,7 @@
           <p:nvPr>
             <p:extLst>
               <p:ext uri="{D42A27DB-BD31-4B8C-83A1-F6EECF244321}">
-                <p14:modId xmlns:p14="http://schemas.microsoft.com/office/powerpoint/2010/main" val="3487502287"/>
+                <p14:modId xmlns:p14="http://schemas.microsoft.com/office/powerpoint/2010/main" val="588669790"/>
               </p:ext>
             </p:extLst>
           </p:nvPr>
@@ -15919,7 +15967,7 @@
           <p:nvPr>
             <p:extLst>
               <p:ext uri="{D42A27DB-BD31-4B8C-83A1-F6EECF244321}">
-                <p14:modId xmlns:p14="http://schemas.microsoft.com/office/powerpoint/2010/main" val="1825233770"/>
+                <p14:modId xmlns:p14="http://schemas.microsoft.com/office/powerpoint/2010/main" val="571510622"/>
               </p:ext>
             </p:extLst>
           </p:nvPr>
@@ -15988,7 +16036,7 @@
           <p:nvPr>
             <p:extLst>
               <p:ext uri="{D42A27DB-BD31-4B8C-83A1-F6EECF244321}">
-                <p14:modId xmlns:p14="http://schemas.microsoft.com/office/powerpoint/2010/main" val="3523646049"/>
+                <p14:modId xmlns:p14="http://schemas.microsoft.com/office/powerpoint/2010/main" val="1243148973"/>
               </p:ext>
             </p:extLst>
           </p:nvPr>
@@ -16116,7 +16164,7 @@
           <p:nvPr>
             <p:extLst>
               <p:ext uri="{D42A27DB-BD31-4B8C-83A1-F6EECF244321}">
-                <p14:modId xmlns:p14="http://schemas.microsoft.com/office/powerpoint/2010/main" val="1452776677"/>
+                <p14:modId xmlns:p14="http://schemas.microsoft.com/office/powerpoint/2010/main" val="2469468086"/>
               </p:ext>
             </p:extLst>
           </p:nvPr>
@@ -16185,7 +16233,7 @@
           <p:nvPr>
             <p:extLst>
               <p:ext uri="{D42A27DB-BD31-4B8C-83A1-F6EECF244321}">
-                <p14:modId xmlns:p14="http://schemas.microsoft.com/office/powerpoint/2010/main" val="925958175"/>
+                <p14:modId xmlns:p14="http://schemas.microsoft.com/office/powerpoint/2010/main" val="49256312"/>
               </p:ext>
             </p:extLst>
           </p:nvPr>
@@ -16254,7 +16302,7 @@
           <p:nvPr>
             <p:extLst>
               <p:ext uri="{D42A27DB-BD31-4B8C-83A1-F6EECF244321}">
-                <p14:modId xmlns:p14="http://schemas.microsoft.com/office/powerpoint/2010/main" val="4260217256"/>
+                <p14:modId xmlns:p14="http://schemas.microsoft.com/office/powerpoint/2010/main" val="2042099313"/>
               </p:ext>
             </p:extLst>
           </p:nvPr>
@@ -16382,7 +16430,7 @@
           <p:nvPr>
             <p:extLst>
               <p:ext uri="{D42A27DB-BD31-4B8C-83A1-F6EECF244321}">
-                <p14:modId xmlns:p14="http://schemas.microsoft.com/office/powerpoint/2010/main" val="1936296822"/>
+                <p14:modId xmlns:p14="http://schemas.microsoft.com/office/powerpoint/2010/main" val="1152985555"/>
               </p:ext>
             </p:extLst>
           </p:nvPr>
@@ -16451,7 +16499,7 @@
           <p:nvPr>
             <p:extLst>
               <p:ext uri="{D42A27DB-BD31-4B8C-83A1-F6EECF244321}">
-                <p14:modId xmlns:p14="http://schemas.microsoft.com/office/powerpoint/2010/main" val="290607452"/>
+                <p14:modId xmlns:p14="http://schemas.microsoft.com/office/powerpoint/2010/main" val="3089947205"/>
               </p:ext>
             </p:extLst>
           </p:nvPr>
@@ -16579,7 +16627,7 @@
           <p:nvPr>
             <p:extLst>
               <p:ext uri="{D42A27DB-BD31-4B8C-83A1-F6EECF244321}">
-                <p14:modId xmlns:p14="http://schemas.microsoft.com/office/powerpoint/2010/main" val="3196254933"/>
+                <p14:modId xmlns:p14="http://schemas.microsoft.com/office/powerpoint/2010/main" val="2888481262"/>
               </p:ext>
             </p:extLst>
           </p:nvPr>
@@ -16648,7 +16696,7 @@
           <p:nvPr>
             <p:extLst>
               <p:ext uri="{D42A27DB-BD31-4B8C-83A1-F6EECF244321}">
-                <p14:modId xmlns:p14="http://schemas.microsoft.com/office/powerpoint/2010/main" val="2056410047"/>
+                <p14:modId xmlns:p14="http://schemas.microsoft.com/office/powerpoint/2010/main" val="1043315418"/>
               </p:ext>
             </p:extLst>
           </p:nvPr>
@@ -16717,7 +16765,7 @@
           <p:nvPr>
             <p:extLst>
               <p:ext uri="{D42A27DB-BD31-4B8C-83A1-F6EECF244321}">
-                <p14:modId xmlns:p14="http://schemas.microsoft.com/office/powerpoint/2010/main" val="3624977403"/>
+                <p14:modId xmlns:p14="http://schemas.microsoft.com/office/powerpoint/2010/main" val="3004197233"/>
               </p:ext>
             </p:extLst>
           </p:nvPr>
@@ -16845,7 +16893,7 @@
           <p:nvPr>
             <p:extLst>
               <p:ext uri="{D42A27DB-BD31-4B8C-83A1-F6EECF244321}">
-                <p14:modId xmlns:p14="http://schemas.microsoft.com/office/powerpoint/2010/main" val="3038709702"/>
+                <p14:modId xmlns:p14="http://schemas.microsoft.com/office/powerpoint/2010/main" val="78511122"/>
               </p:ext>
             </p:extLst>
           </p:nvPr>
@@ -16914,7 +16962,7 @@
           <p:nvPr>
             <p:extLst>
               <p:ext uri="{D42A27DB-BD31-4B8C-83A1-F6EECF244321}">
-                <p14:modId xmlns:p14="http://schemas.microsoft.com/office/powerpoint/2010/main" val="261117778"/>
+                <p14:modId xmlns:p14="http://schemas.microsoft.com/office/powerpoint/2010/main" val="2994050709"/>
               </p:ext>
             </p:extLst>
           </p:nvPr>
@@ -17044,7 +17092,7 @@
           <p:nvPr>
             <p:extLst>
               <p:ext uri="{D42A27DB-BD31-4B8C-83A1-F6EECF244321}">
-                <p14:modId xmlns:p14="http://schemas.microsoft.com/office/powerpoint/2010/main" val="3094500091"/>
+                <p14:modId xmlns:p14="http://schemas.microsoft.com/office/powerpoint/2010/main" val="2898632262"/>
               </p:ext>
             </p:extLst>
           </p:nvPr>
@@ -17235,7 +17283,7 @@
           <p:nvPr>
             <p:extLst>
               <p:ext uri="{D42A27DB-BD31-4B8C-83A1-F6EECF244321}">
-                <p14:modId xmlns:p14="http://schemas.microsoft.com/office/powerpoint/2010/main" val="481804114"/>
+                <p14:modId xmlns:p14="http://schemas.microsoft.com/office/powerpoint/2010/main" val="3361331494"/>
               </p:ext>
             </p:extLst>
           </p:nvPr>
@@ -17304,13 +17352,13 @@
           <p:nvPr>
             <p:extLst>
               <p:ext uri="{D42A27DB-BD31-4B8C-83A1-F6EECF244321}">
-                <p14:modId xmlns:p14="http://schemas.microsoft.com/office/powerpoint/2010/main" val="1520965472"/>
+                <p14:modId xmlns:p14="http://schemas.microsoft.com/office/powerpoint/2010/main" val="4248539534"/>
               </p:ext>
             </p:extLst>
           </p:nvPr>
         </p:nvGraphicFramePr>
         <p:xfrm>
-          <a:off x="8534511" y="8016389"/>
+          <a:off x="8313971" y="7794465"/>
           <a:ext cx="1809750" cy="1493838"/>
         </p:xfrm>
         <a:graphic>
@@ -17344,7 +17392,7 @@
                     </p:blipFill>
                     <p:spPr>
                       <a:xfrm>
-                        <a:off x="8534511" y="8016389"/>
+                        <a:off x="8313971" y="7794465"/>
                         <a:ext cx="1809750" cy="1493838"/>
                       </a:xfrm>
                       <a:prstGeom prst="rect">
@@ -17372,7 +17420,7 @@
         </p:nvSpPr>
         <p:spPr>
           <a:xfrm>
-            <a:off x="9019805" y="9573705"/>
+            <a:off x="9492657" y="8698189"/>
             <a:ext cx="631426" cy="310717"/>
           </a:xfrm>
           <a:prstGeom prst="rect">
@@ -17406,6 +17454,396 @@
                 <a:sym typeface="Avenir"/>
               </a:rPr>
               <a:t>3IDT</a:t>
+            </a:r>
+            <a:endParaRPr lang="pt-BR" sz="1600" dirty="0">
+              <a:solidFill>
+                <a:srgbClr val="00B050"/>
+              </a:solidFill>
+              <a:latin typeface="Arial"/>
+              <a:ea typeface="Arial"/>
+              <a:cs typeface="Arial"/>
+              <a:sym typeface="Arial"/>
+            </a:endParaRPr>
+          </a:p>
+        </p:txBody>
+      </p:sp>
+      <p:graphicFrame>
+        <p:nvGraphicFramePr>
+          <p:cNvPr id="28" name="Objeto 27">
+            <a:extLst>
+              <a:ext uri="{FF2B5EF4-FFF2-40B4-BE49-F238E27FC236}">
+                <a16:creationId xmlns:a16="http://schemas.microsoft.com/office/drawing/2014/main" id="{365BB12C-762A-220D-6287-00D62C90D13C}"/>
+              </a:ext>
+            </a:extLst>
+          </p:cNvPr>
+          <p:cNvGraphicFramePr>
+            <a:graphicFrameLocks noChangeAspect="1"/>
+          </p:cNvGraphicFramePr>
+          <p:nvPr>
+            <p:extLst>
+              <p:ext uri="{D42A27DB-BD31-4B8C-83A1-F6EECF244321}">
+                <p14:modId xmlns:p14="http://schemas.microsoft.com/office/powerpoint/2010/main" val="2666716626"/>
+              </p:ext>
+            </p:extLst>
+          </p:nvPr>
+        </p:nvGraphicFramePr>
+        <p:xfrm>
+          <a:off x="4495800" y="9513888"/>
+          <a:ext cx="2200275" cy="1536700"/>
+        </p:xfrm>
+        <a:graphic>
+          <a:graphicData uri="http://schemas.openxmlformats.org/presentationml/2006/ole">
+            <mc:AlternateContent xmlns:mc="http://schemas.openxmlformats.org/markup-compatibility/2006">
+              <mc:Choice xmlns:v="urn:schemas-microsoft-com:vml" Requires="v">
+                <p:oleObj name="CS ChemDraw Drawing" r:id="rId62" imgW="2200311" imgH="1537292" progId="ChemDraw.Document.6.0">
+                  <p:embed/>
+                </p:oleObj>
+              </mc:Choice>
+              <mc:Fallback>
+                <p:oleObj name="CS ChemDraw Drawing" r:id="rId62" imgW="2200311" imgH="1537292" progId="ChemDraw.Document.6.0">
+                  <p:embed/>
+                  <p:pic>
+                    <p:nvPicPr>
+                      <p:cNvPr id="28" name="Objeto 27">
+                        <a:extLst>
+                          <a:ext uri="{FF2B5EF4-FFF2-40B4-BE49-F238E27FC236}">
+                            <a16:creationId xmlns:a16="http://schemas.microsoft.com/office/drawing/2014/main" id="{365BB12C-762A-220D-6287-00D62C90D13C}"/>
+                          </a:ext>
+                        </a:extLst>
+                      </p:cNvPr>
+                      <p:cNvPicPr/>
+                      <p:nvPr/>
+                    </p:nvPicPr>
+                    <p:blipFill>
+                      <a:blip r:embed="rId63"/>
+                      <a:stretch>
+                        <a:fillRect/>
+                      </a:stretch>
+                    </p:blipFill>
+                    <p:spPr>
+                      <a:xfrm>
+                        <a:off x="4495800" y="9513888"/>
+                        <a:ext cx="2200275" cy="1536700"/>
+                      </a:xfrm>
+                      <a:prstGeom prst="rect">
+                        <a:avLst/>
+                      </a:prstGeom>
+                    </p:spPr>
+                  </p:pic>
+                </p:oleObj>
+              </mc:Fallback>
+            </mc:AlternateContent>
+          </a:graphicData>
+        </a:graphic>
+      </p:graphicFrame>
+      <p:sp>
+        <p:nvSpPr>
+          <p:cNvPr id="31" name="Google Shape;298;p9">
+            <a:extLst>
+              <a:ext uri="{FF2B5EF4-FFF2-40B4-BE49-F238E27FC236}">
+                <a16:creationId xmlns:a16="http://schemas.microsoft.com/office/drawing/2014/main" id="{B1D8E011-A7F8-F513-1FBC-A16A061C4B8A}"/>
+              </a:ext>
+            </a:extLst>
+          </p:cNvPr>
+          <p:cNvSpPr txBox="1"/>
+          <p:nvPr/>
+        </p:nvSpPr>
+        <p:spPr>
+          <a:xfrm>
+            <a:off x="5934756" y="10544986"/>
+            <a:ext cx="631426" cy="310717"/>
+          </a:xfrm>
+          <a:prstGeom prst="rect">
+            <a:avLst/>
+          </a:prstGeom>
+          <a:noFill/>
+          <a:ln>
+            <a:noFill/>
+          </a:ln>
+        </p:spPr>
+        <p:txBody>
+          <a:bodyPr spcFirstLastPara="1" wrap="square" lIns="94378" tIns="47176" rIns="94378" bIns="47176" anchor="t" anchorCtr="0">
+            <a:spAutoFit/>
+          </a:bodyPr>
+          <a:lstStyle/>
+          <a:p>
+            <a:pPr algn="ctr">
+              <a:buClr>
+                <a:srgbClr val="000000"/>
+              </a:buClr>
+              <a:buSzPts val="1200"/>
+            </a:pPr>
+            <a:r>
+              <a:rPr lang="pt-BR" sz="1400" b="1" dirty="0">
+                <a:solidFill>
+                  <a:srgbClr val="00B050"/>
+                </a:solidFill>
+                <a:latin typeface="Avenir"/>
+                <a:ea typeface="Arial"/>
+                <a:cs typeface="Arial"/>
+                <a:sym typeface="Avenir"/>
+              </a:rPr>
+              <a:t>DFFE</a:t>
+            </a:r>
+            <a:endParaRPr lang="pt-BR" sz="1600" dirty="0">
+              <a:solidFill>
+                <a:srgbClr val="00B050"/>
+              </a:solidFill>
+              <a:latin typeface="Arial"/>
+              <a:ea typeface="Arial"/>
+              <a:cs typeface="Arial"/>
+              <a:sym typeface="Arial"/>
+            </a:endParaRPr>
+          </a:p>
+        </p:txBody>
+      </p:sp>
+      <p:graphicFrame>
+        <p:nvGraphicFramePr>
+          <p:cNvPr id="32" name="Objeto 31">
+            <a:extLst>
+              <a:ext uri="{FF2B5EF4-FFF2-40B4-BE49-F238E27FC236}">
+                <a16:creationId xmlns:a16="http://schemas.microsoft.com/office/drawing/2014/main" id="{5153DBB1-A1C7-18BA-CFBB-811747AE63A3}"/>
+              </a:ext>
+            </a:extLst>
+          </p:cNvPr>
+          <p:cNvGraphicFramePr>
+            <a:graphicFrameLocks noChangeAspect="1"/>
+          </p:cNvGraphicFramePr>
+          <p:nvPr>
+            <p:extLst>
+              <p:ext uri="{D42A27DB-BD31-4B8C-83A1-F6EECF244321}">
+                <p14:modId xmlns:p14="http://schemas.microsoft.com/office/powerpoint/2010/main" val="1573075279"/>
+              </p:ext>
+            </p:extLst>
+          </p:nvPr>
+        </p:nvGraphicFramePr>
+        <p:xfrm>
+          <a:off x="7275513" y="9515475"/>
+          <a:ext cx="2052637" cy="1570038"/>
+        </p:xfrm>
+        <a:graphic>
+          <a:graphicData uri="http://schemas.openxmlformats.org/presentationml/2006/ole">
+            <mc:AlternateContent xmlns:mc="http://schemas.openxmlformats.org/markup-compatibility/2006">
+              <mc:Choice xmlns:v="urn:schemas-microsoft-com:vml" Requires="v">
+                <p:oleObj name="CS ChemDraw Drawing" r:id="rId64" imgW="2052320" imgH="1570687" progId="ChemDraw.Document.6.0">
+                  <p:embed/>
+                </p:oleObj>
+              </mc:Choice>
+              <mc:Fallback>
+                <p:oleObj name="CS ChemDraw Drawing" r:id="rId64" imgW="2052320" imgH="1570687" progId="ChemDraw.Document.6.0">
+                  <p:embed/>
+                  <p:pic>
+                    <p:nvPicPr>
+                      <p:cNvPr id="32" name="Objeto 31">
+                        <a:extLst>
+                          <a:ext uri="{FF2B5EF4-FFF2-40B4-BE49-F238E27FC236}">
+                            <a16:creationId xmlns:a16="http://schemas.microsoft.com/office/drawing/2014/main" id="{5153DBB1-A1C7-18BA-CFBB-811747AE63A3}"/>
+                          </a:ext>
+                        </a:extLst>
+                      </p:cNvPr>
+                      <p:cNvPicPr/>
+                      <p:nvPr/>
+                    </p:nvPicPr>
+                    <p:blipFill>
+                      <a:blip r:embed="rId65"/>
+                      <a:stretch>
+                        <a:fillRect/>
+                      </a:stretch>
+                    </p:blipFill>
+                    <p:spPr>
+                      <a:xfrm>
+                        <a:off x="7275513" y="9515475"/>
+                        <a:ext cx="2052637" cy="1570038"/>
+                      </a:xfrm>
+                      <a:prstGeom prst="rect">
+                        <a:avLst/>
+                      </a:prstGeom>
+                    </p:spPr>
+                  </p:pic>
+                </p:oleObj>
+              </mc:Fallback>
+            </mc:AlternateContent>
+          </a:graphicData>
+        </a:graphic>
+      </p:graphicFrame>
+      <p:sp>
+        <p:nvSpPr>
+          <p:cNvPr id="33" name="Google Shape;298;p9">
+            <a:extLst>
+              <a:ext uri="{FF2B5EF4-FFF2-40B4-BE49-F238E27FC236}">
+                <a16:creationId xmlns:a16="http://schemas.microsoft.com/office/drawing/2014/main" id="{673A35C1-7BFF-FF6D-DC1F-64E5D16AF7E2}"/>
+              </a:ext>
+            </a:extLst>
+          </p:cNvPr>
+          <p:cNvSpPr txBox="1"/>
+          <p:nvPr/>
+        </p:nvSpPr>
+        <p:spPr>
+          <a:xfrm>
+            <a:off x="8403036" y="10468248"/>
+            <a:ext cx="631426" cy="310717"/>
+          </a:xfrm>
+          <a:prstGeom prst="rect">
+            <a:avLst/>
+          </a:prstGeom>
+          <a:noFill/>
+          <a:ln>
+            <a:noFill/>
+          </a:ln>
+        </p:spPr>
+        <p:txBody>
+          <a:bodyPr spcFirstLastPara="1" wrap="square" lIns="94378" tIns="47176" rIns="94378" bIns="47176" anchor="t" anchorCtr="0">
+            <a:spAutoFit/>
+          </a:bodyPr>
+          <a:lstStyle/>
+          <a:p>
+            <a:pPr algn="ctr">
+              <a:buClr>
+                <a:srgbClr val="000000"/>
+              </a:buClr>
+              <a:buSzPts val="1200"/>
+            </a:pPr>
+            <a:r>
+              <a:rPr lang="pt-BR" sz="1400" b="1" dirty="0">
+                <a:solidFill>
+                  <a:srgbClr val="00B050"/>
+                </a:solidFill>
+                <a:latin typeface="Avenir"/>
+                <a:ea typeface="Arial"/>
+                <a:cs typeface="Arial"/>
+                <a:sym typeface="Avenir"/>
+              </a:rPr>
+              <a:t>TPDI</a:t>
+            </a:r>
+            <a:endParaRPr lang="pt-BR" sz="1600" dirty="0">
+              <a:solidFill>
+                <a:srgbClr val="00B050"/>
+              </a:solidFill>
+              <a:latin typeface="Arial"/>
+              <a:ea typeface="Arial"/>
+              <a:cs typeface="Arial"/>
+              <a:sym typeface="Arial"/>
+            </a:endParaRPr>
+          </a:p>
+        </p:txBody>
+      </p:sp>
+      <p:graphicFrame>
+        <p:nvGraphicFramePr>
+          <p:cNvPr id="34" name="Objeto 33">
+            <a:extLst>
+              <a:ext uri="{FF2B5EF4-FFF2-40B4-BE49-F238E27FC236}">
+                <a16:creationId xmlns:a16="http://schemas.microsoft.com/office/drawing/2014/main" id="{711A7590-58C3-0BE3-C8AB-4FD7073B5C46}"/>
+              </a:ext>
+            </a:extLst>
+          </p:cNvPr>
+          <p:cNvGraphicFramePr>
+            <a:graphicFrameLocks noChangeAspect="1"/>
+          </p:cNvGraphicFramePr>
+          <p:nvPr>
+            <p:extLst>
+              <p:ext uri="{D42A27DB-BD31-4B8C-83A1-F6EECF244321}">
+                <p14:modId xmlns:p14="http://schemas.microsoft.com/office/powerpoint/2010/main" val="4270140625"/>
+              </p:ext>
+            </p:extLst>
+          </p:nvPr>
+        </p:nvGraphicFramePr>
+        <p:xfrm>
+          <a:off x="9326563" y="9204325"/>
+          <a:ext cx="2052637" cy="1570038"/>
+        </p:xfrm>
+        <a:graphic>
+          <a:graphicData uri="http://schemas.openxmlformats.org/presentationml/2006/ole">
+            <mc:AlternateContent xmlns:mc="http://schemas.openxmlformats.org/markup-compatibility/2006">
+              <mc:Choice xmlns:v="urn:schemas-microsoft-com:vml" Requires="v">
+                <p:oleObj name="CS ChemDraw Drawing" r:id="rId66" imgW="2052320" imgH="1570687" progId="ChemDraw.Document.6.0">
+                  <p:embed/>
+                </p:oleObj>
+              </mc:Choice>
+              <mc:Fallback>
+                <p:oleObj name="CS ChemDraw Drawing" r:id="rId66" imgW="2052320" imgH="1570687" progId="ChemDraw.Document.6.0">
+                  <p:embed/>
+                  <p:pic>
+                    <p:nvPicPr>
+                      <p:cNvPr id="34" name="Objeto 33">
+                        <a:extLst>
+                          <a:ext uri="{FF2B5EF4-FFF2-40B4-BE49-F238E27FC236}">
+                            <a16:creationId xmlns:a16="http://schemas.microsoft.com/office/drawing/2014/main" id="{711A7590-58C3-0BE3-C8AB-4FD7073B5C46}"/>
+                          </a:ext>
+                        </a:extLst>
+                      </p:cNvPr>
+                      <p:cNvPicPr/>
+                      <p:nvPr/>
+                    </p:nvPicPr>
+                    <p:blipFill>
+                      <a:blip r:embed="rId67"/>
+                      <a:stretch>
+                        <a:fillRect/>
+                      </a:stretch>
+                    </p:blipFill>
+                    <p:spPr>
+                      <a:xfrm>
+                        <a:off x="9326563" y="9204325"/>
+                        <a:ext cx="2052637" cy="1570038"/>
+                      </a:xfrm>
+                      <a:prstGeom prst="rect">
+                        <a:avLst/>
+                      </a:prstGeom>
+                    </p:spPr>
+                  </p:pic>
+                </p:oleObj>
+              </mc:Fallback>
+            </mc:AlternateContent>
+          </a:graphicData>
+        </a:graphic>
+      </p:graphicFrame>
+      <p:sp>
+        <p:nvSpPr>
+          <p:cNvPr id="37" name="Google Shape;298;p9">
+            <a:extLst>
+              <a:ext uri="{FF2B5EF4-FFF2-40B4-BE49-F238E27FC236}">
+                <a16:creationId xmlns:a16="http://schemas.microsoft.com/office/drawing/2014/main" id="{479C2F0E-317B-FA69-B7D3-2EEC26D3943F}"/>
+              </a:ext>
+            </a:extLst>
+          </p:cNvPr>
+          <p:cNvSpPr txBox="1"/>
+          <p:nvPr/>
+        </p:nvSpPr>
+        <p:spPr>
+          <a:xfrm>
+            <a:off x="10455673" y="10155307"/>
+            <a:ext cx="631426" cy="310717"/>
+          </a:xfrm>
+          <a:prstGeom prst="rect">
+            <a:avLst/>
+          </a:prstGeom>
+          <a:noFill/>
+          <a:ln>
+            <a:noFill/>
+          </a:ln>
+        </p:spPr>
+        <p:txBody>
+          <a:bodyPr spcFirstLastPara="1" wrap="square" lIns="94378" tIns="47176" rIns="94378" bIns="47176" anchor="t" anchorCtr="0">
+            <a:spAutoFit/>
+          </a:bodyPr>
+          <a:lstStyle/>
+          <a:p>
+            <a:pPr algn="ctr">
+              <a:buClr>
+                <a:srgbClr val="000000"/>
+              </a:buClr>
+              <a:buSzPts val="1200"/>
+            </a:pPr>
+            <a:r>
+              <a:rPr lang="pt-BR" sz="1400" b="1" dirty="0">
+                <a:solidFill>
+                  <a:srgbClr val="00B050"/>
+                </a:solidFill>
+                <a:latin typeface="Avenir"/>
+                <a:ea typeface="Arial"/>
+                <a:cs typeface="Arial"/>
+                <a:sym typeface="Avenir"/>
+              </a:rPr>
+              <a:t>IITT</a:t>
             </a:r>
             <a:endParaRPr lang="pt-BR" sz="1600" dirty="0">
               <a:solidFill>

</xml_diff>